<commit_message>
Update basic test preparation
</commit_message>
<xml_diff>
--- a/doc/test/PositionsLab/PositionsLabDuplicateAndRotate.pptx
+++ b/doc/test/PositionsLab/PositionsLabDuplicateAndRotate.pptx
@@ -9232,6 +9232,13 @@
   <p:clrMapOvr>
     <a:masterClrMapping/>
   </p:clrMapOvr>
+  <p:timing>
+    <p:tnLst>
+      <p:par>
+        <p:cTn id="1" dur="indefinite" restart="never" nodeType="tmRoot"/>
+      </p:par>
+    </p:tnLst>
+  </p:timing>
 </p:sld>
 </file>
 
@@ -9318,6 +9325,13 @@
       <p:transition spd="slow"/>
     </mc:Fallback>
   </mc:AlternateContent>
+  <p:timing>
+    <p:tnLst>
+      <p:par>
+        <p:cTn id="1" dur="indefinite" restart="never" nodeType="tmRoot"/>
+      </p:par>
+    </p:tnLst>
+  </p:timing>
 </p:sld>
 </file>
 
@@ -9638,7 +9652,7 @@
         </p:nvSpPr>
         <p:spPr>
           <a:xfrm>
-            <a:off x="6248400" y="1981200"/>
+            <a:off x="6269182" y="2590800"/>
             <a:ext cx="1066800" cy="1066800"/>
           </a:xfrm>
           <a:prstGeom prst="ellipse">
@@ -9678,7 +9692,7 @@
         </p:nvSpPr>
         <p:spPr>
           <a:xfrm>
-            <a:off x="6077712" y="3774583"/>
+            <a:off x="3838956" y="4724400"/>
             <a:ext cx="1237488" cy="1066800"/>
           </a:xfrm>
           <a:prstGeom prst="triangle">
@@ -9840,7 +9854,7 @@
       </p:grpSpPr>
       <p:sp>
         <p:nvSpPr>
-          <p:cNvPr id="9" name="Rectangle 1"/>
+          <p:cNvPr id="34" name="Rectangle 1"/>
           <p:cNvSpPr/>
           <p:nvPr/>
         </p:nvSpPr>
@@ -9880,13 +9894,13 @@
       </p:sp>
       <p:sp>
         <p:nvSpPr>
-          <p:cNvPr id="10" name="Oval 2"/>
+          <p:cNvPr id="35" name="Oval 2"/>
           <p:cNvSpPr/>
           <p:nvPr/>
         </p:nvSpPr>
         <p:spPr>
-          <a:xfrm rot="16455449">
-            <a:off x="3488918" y="227858"/>
+          <a:xfrm rot="16306935">
+            <a:off x="3997227" y="247050"/>
             <a:ext cx="1066800" cy="1066800"/>
           </a:xfrm>
           <a:prstGeom prst="ellipse">
@@ -9920,13 +9934,13 @@
       </p:sp>
       <p:sp>
         <p:nvSpPr>
-          <p:cNvPr id="12" name="Oval 2"/>
+          <p:cNvPr id="45" name="Oval 2"/>
           <p:cNvSpPr/>
           <p:nvPr/>
         </p:nvSpPr>
         <p:spPr>
-          <a:xfrm>
-            <a:off x="6248400" y="1981200"/>
+          <a:xfrm rot="10725280">
+            <a:off x="1579973" y="2641764"/>
             <a:ext cx="1066800" cy="1066800"/>
           </a:xfrm>
           <a:prstGeom prst="ellipse">
@@ -9960,13 +9974,13 @@
       </p:sp>
       <p:sp>
         <p:nvSpPr>
-          <p:cNvPr id="13" name="Oval 2"/>
+          <p:cNvPr id="47" name="Oval 2"/>
           <p:cNvSpPr/>
           <p:nvPr/>
         </p:nvSpPr>
         <p:spPr>
-          <a:xfrm rot="19156891">
-            <a:off x="5288123" y="612659"/>
+          <a:xfrm>
+            <a:off x="6269182" y="2590800"/>
             <a:ext cx="1066800" cy="1066800"/>
           </a:xfrm>
           <a:prstGeom prst="ellipse">
@@ -10000,13 +10014,13 @@
       </p:sp>
       <p:sp>
         <p:nvSpPr>
-          <p:cNvPr id="11" name="Isosceles Triangle 3"/>
+          <p:cNvPr id="36" name="Isosceles Triangle 3"/>
           <p:cNvSpPr/>
           <p:nvPr/>
         </p:nvSpPr>
         <p:spPr>
           <a:xfrm>
-            <a:off x="6077712" y="3774583"/>
+            <a:off x="3838956" y="4724400"/>
             <a:ext cx="1237488" cy="1066800"/>
           </a:xfrm>
           <a:prstGeom prst="triangle">
@@ -10077,7 +10091,7 @@
       </p:grpSpPr>
       <p:sp>
         <p:nvSpPr>
-          <p:cNvPr id="9" name="Rectangle 1"/>
+          <p:cNvPr id="14" name="Rectangle 1"/>
           <p:cNvSpPr/>
           <p:nvPr/>
         </p:nvSpPr>
@@ -10117,13 +10131,13 @@
       </p:sp>
       <p:sp>
         <p:nvSpPr>
-          <p:cNvPr id="10" name="Oval 2"/>
+          <p:cNvPr id="15" name="Oval 2"/>
           <p:cNvSpPr/>
           <p:nvPr/>
         </p:nvSpPr>
         <p:spPr>
-          <a:xfrm rot="16455449">
-            <a:off x="3488918" y="227858"/>
+          <a:xfrm rot="8212442">
+            <a:off x="2212882" y="4193773"/>
             <a:ext cx="1066800" cy="1066800"/>
           </a:xfrm>
           <a:prstGeom prst="ellipse">
@@ -10157,13 +10171,13 @@
       </p:sp>
       <p:sp>
         <p:nvSpPr>
-          <p:cNvPr id="12" name="Oval 2"/>
+          <p:cNvPr id="16" name="Oval 2"/>
           <p:cNvSpPr/>
           <p:nvPr/>
         </p:nvSpPr>
         <p:spPr>
-          <a:xfrm rot="8905228">
-            <a:off x="2263601" y="4327214"/>
+          <a:xfrm rot="10725280">
+            <a:off x="1579973" y="2641764"/>
             <a:ext cx="1066800" cy="1066800"/>
           </a:xfrm>
           <a:prstGeom prst="ellipse">
@@ -10197,13 +10211,13 @@
       </p:sp>
       <p:sp>
         <p:nvSpPr>
-          <p:cNvPr id="13" name="Oval 2"/>
+          <p:cNvPr id="17" name="Oval 2"/>
           <p:cNvSpPr/>
           <p:nvPr/>
         </p:nvSpPr>
         <p:spPr>
-          <a:xfrm rot="19156891">
-            <a:off x="5288123" y="612659"/>
+          <a:xfrm>
+            <a:off x="6269182" y="2590800"/>
             <a:ext cx="1066800" cy="1066800"/>
           </a:xfrm>
           <a:prstGeom prst="ellipse">
@@ -10237,13 +10251,13 @@
       </p:sp>
       <p:sp>
         <p:nvSpPr>
-          <p:cNvPr id="7" name="Oval 2"/>
+          <p:cNvPr id="19" name="Oval 2"/>
           <p:cNvSpPr/>
           <p:nvPr/>
         </p:nvSpPr>
         <p:spPr>
-          <a:xfrm>
-            <a:off x="6248400" y="1981200"/>
+          <a:xfrm rot="16306935">
+            <a:off x="3997227" y="247050"/>
             <a:ext cx="1066800" cy="1066800"/>
           </a:xfrm>
           <a:prstGeom prst="ellipse">
@@ -10277,13 +10291,13 @@
       </p:sp>
       <p:sp>
         <p:nvSpPr>
-          <p:cNvPr id="8" name="Oval 2"/>
+          <p:cNvPr id="20" name="Oval 2"/>
           <p:cNvSpPr/>
           <p:nvPr/>
         </p:nvSpPr>
         <p:spPr>
-          <a:xfrm rot="5935763">
-            <a:off x="4165771" y="4981354"/>
+          <a:xfrm rot="13418522">
+            <a:off x="2227386" y="972479"/>
             <a:ext cx="1066800" cy="1066800"/>
           </a:xfrm>
           <a:prstGeom prst="ellipse">
@@ -10317,13 +10331,13 @@
       </p:sp>
       <p:sp>
         <p:nvSpPr>
-          <p:cNvPr id="11" name="Isosceles Triangle 3"/>
+          <p:cNvPr id="18" name="Isosceles Triangle 3"/>
           <p:cNvSpPr/>
           <p:nvPr/>
         </p:nvSpPr>
         <p:spPr>
           <a:xfrm>
-            <a:off x="6077712" y="3774583"/>
+            <a:off x="3838956" y="4724400"/>
             <a:ext cx="1237488" cy="1066800"/>
           </a:xfrm>
           <a:prstGeom prst="triangle">
@@ -10493,7 +10507,7 @@
       </p:grpSpPr>
       <p:sp>
         <p:nvSpPr>
-          <p:cNvPr id="2" name="Rectangle 1"/>
+          <p:cNvPr id="11" name="Rectangle 1"/>
           <p:cNvSpPr/>
           <p:nvPr/>
         </p:nvSpPr>
@@ -10533,13 +10547,13 @@
       </p:sp>
       <p:sp>
         <p:nvSpPr>
-          <p:cNvPr id="3" name="Oval 2"/>
+          <p:cNvPr id="14" name="Oval 2"/>
           <p:cNvSpPr/>
           <p:nvPr/>
         </p:nvSpPr>
         <p:spPr>
-          <a:xfrm rot="5657316">
-            <a:off x="4358397" y="4953977"/>
+          <a:xfrm rot="10848176">
+            <a:off x="1579648" y="2557934"/>
             <a:ext cx="1066800" cy="1066800"/>
           </a:xfrm>
           <a:prstGeom prst="ellipse">
@@ -10573,13 +10587,13 @@
       </p:sp>
       <p:sp>
         <p:nvSpPr>
-          <p:cNvPr id="5" name="Oval 2"/>
+          <p:cNvPr id="19" name="Oval 2"/>
           <p:cNvSpPr/>
           <p:nvPr/>
         </p:nvSpPr>
         <p:spPr>
           <a:xfrm>
-            <a:off x="6248400" y="1981200"/>
+            <a:off x="6269182" y="2590800"/>
             <a:ext cx="1066800" cy="1066800"/>
           </a:xfrm>
           <a:prstGeom prst="ellipse">
@@ -10613,13 +10627,13 @@
       </p:sp>
       <p:sp>
         <p:nvSpPr>
-          <p:cNvPr id="6" name="Isosceles Triangle 3"/>
+          <p:cNvPr id="20" name="Isosceles Triangle 3"/>
           <p:cNvSpPr/>
           <p:nvPr/>
         </p:nvSpPr>
         <p:spPr>
           <a:xfrm>
-            <a:off x="6077712" y="3774583"/>
+            <a:off x="3838956" y="4724400"/>
             <a:ext cx="1237488" cy="1066800"/>
           </a:xfrm>
           <a:prstGeom prst="triangle">
@@ -10653,13 +10667,13 @@
       </p:sp>
       <p:sp>
         <p:nvSpPr>
-          <p:cNvPr id="4" name="Isosceles Triangle 3"/>
+          <p:cNvPr id="15" name="Isosceles Triangle 3"/>
           <p:cNvSpPr/>
           <p:nvPr/>
         </p:nvSpPr>
         <p:spPr>
-          <a:xfrm rot="5657316">
-            <a:off x="2491074" y="4734763"/>
+          <a:xfrm rot="10848176">
+            <a:off x="3868859" y="457409"/>
             <a:ext cx="1237488" cy="1066800"/>
           </a:xfrm>
           <a:prstGeom prst="triangle">
@@ -10730,7 +10744,7 @@
       </p:grpSpPr>
       <p:sp>
         <p:nvSpPr>
-          <p:cNvPr id="2" name="Rectangle 1"/>
+          <p:cNvPr id="11" name="Rectangle 1"/>
           <p:cNvSpPr/>
           <p:nvPr/>
         </p:nvSpPr>
@@ -10770,13 +10784,13 @@
       </p:sp>
       <p:sp>
         <p:nvSpPr>
-          <p:cNvPr id="3" name="Oval 2"/>
+          <p:cNvPr id="12" name="Oval 2"/>
           <p:cNvSpPr/>
           <p:nvPr/>
         </p:nvSpPr>
         <p:spPr>
-          <a:xfrm rot="16559553">
-            <a:off x="3560666" y="215757"/>
+          <a:xfrm rot="13498768">
+            <a:off x="2265628" y="933306"/>
             <a:ext cx="1066800" cy="1066800"/>
           </a:xfrm>
           <a:prstGeom prst="ellipse">
@@ -10810,13 +10824,13 @@
       </p:sp>
       <p:sp>
         <p:nvSpPr>
-          <p:cNvPr id="5" name="Oval 2"/>
+          <p:cNvPr id="13" name="Oval 2"/>
           <p:cNvSpPr/>
           <p:nvPr/>
         </p:nvSpPr>
         <p:spPr>
           <a:xfrm>
-            <a:off x="6248400" y="1981200"/>
+            <a:off x="6269182" y="2590800"/>
             <a:ext cx="1066800" cy="1066800"/>
           </a:xfrm>
           <a:prstGeom prst="ellipse">
@@ -10850,13 +10864,13 @@
       </p:sp>
       <p:sp>
         <p:nvSpPr>
-          <p:cNvPr id="6" name="Isosceles Triangle 3"/>
+          <p:cNvPr id="14" name="Isosceles Triangle 3"/>
           <p:cNvSpPr/>
           <p:nvPr/>
         </p:nvSpPr>
         <p:spPr>
           <a:xfrm>
-            <a:off x="6077712" y="3774583"/>
+            <a:off x="3838956" y="4724400"/>
             <a:ext cx="1237488" cy="1066800"/>
           </a:xfrm>
           <a:prstGeom prst="triangle">
@@ -10890,13 +10904,53 @@
       </p:sp>
       <p:sp>
         <p:nvSpPr>
-          <p:cNvPr id="7" name="Oval 2"/>
+          <p:cNvPr id="16" name="Isosceles Triangle 3"/>
           <p:cNvSpPr/>
           <p:nvPr/>
         </p:nvSpPr>
         <p:spPr>
-          <a:xfrm rot="5657316">
-            <a:off x="4358397" y="4953977"/>
+          <a:xfrm rot="10848176">
+            <a:off x="3868859" y="457409"/>
+            <a:ext cx="1237488" cy="1066800"/>
+          </a:xfrm>
+          <a:prstGeom prst="triangle">
+            <a:avLst/>
+          </a:prstGeom>
+        </p:spPr>
+        <p:style>
+          <a:lnRef idx="2">
+            <a:schemeClr val="accent1">
+              <a:shade val="50000"/>
+            </a:schemeClr>
+          </a:lnRef>
+          <a:fillRef idx="1">
+            <a:schemeClr val="accent1"/>
+          </a:fillRef>
+          <a:effectRef idx="0">
+            <a:schemeClr val="accent1"/>
+          </a:effectRef>
+          <a:fontRef idx="minor">
+            <a:schemeClr val="lt1"/>
+          </a:fontRef>
+        </p:style>
+        <p:txBody>
+          <a:bodyPr rtlCol="0" anchor="ctr"/>
+          <a:lstStyle/>
+          <a:p>
+            <a:pPr algn="ctr"/>
+            <a:endParaRPr lang="zh-CN" altLang="en-US"/>
+          </a:p>
+        </p:txBody>
+      </p:sp>
+      <p:sp>
+        <p:nvSpPr>
+          <p:cNvPr id="17" name="Oval 2"/>
+          <p:cNvSpPr/>
+          <p:nvPr/>
+        </p:nvSpPr>
+        <p:spPr>
+          <a:xfrm rot="10848176">
+            <a:off x="1579648" y="2557934"/>
             <a:ext cx="1066800" cy="1066800"/>
           </a:xfrm>
           <a:prstGeom prst="ellipse">
@@ -10930,13 +10984,13 @@
       </p:sp>
       <p:sp>
         <p:nvSpPr>
-          <p:cNvPr id="8" name="Isosceles Triangle 3"/>
+          <p:cNvPr id="18" name="Isosceles Triangle 3"/>
           <p:cNvSpPr/>
           <p:nvPr/>
         </p:nvSpPr>
         <p:spPr>
-          <a:xfrm rot="5657316">
-            <a:off x="2491074" y="4734763"/>
+          <a:xfrm rot="2932399">
+            <a:off x="2231804" y="3994128"/>
             <a:ext cx="1237488" cy="1066800"/>
           </a:xfrm>
           <a:prstGeom prst="triangle">
@@ -10970,13 +11024,13 @@
       </p:sp>
       <p:sp>
         <p:nvSpPr>
-          <p:cNvPr id="9" name="Oval 2"/>
+          <p:cNvPr id="19" name="Oval 2"/>
           <p:cNvSpPr/>
           <p:nvPr/>
         </p:nvSpPr>
         <p:spPr>
-          <a:xfrm rot="11044596">
-            <a:off x="1562744" y="3033636"/>
+          <a:xfrm rot="2932399">
+            <a:off x="5466586" y="4357103"/>
             <a:ext cx="1066800" cy="1066800"/>
           </a:xfrm>
           <a:prstGeom prst="ellipse">
@@ -11010,53 +11064,13 @@
       </p:sp>
       <p:sp>
         <p:nvSpPr>
-          <p:cNvPr id="10" name="Isosceles Triangle 3"/>
+          <p:cNvPr id="15" name="Isosceles Triangle 3"/>
           <p:cNvSpPr/>
           <p:nvPr/>
         </p:nvSpPr>
         <p:spPr>
-          <a:xfrm rot="11044596">
-            <a:off x="1690020" y="1250857"/>
-            <a:ext cx="1237488" cy="1066800"/>
-          </a:xfrm>
-          <a:prstGeom prst="triangle">
-            <a:avLst/>
-          </a:prstGeom>
-        </p:spPr>
-        <p:style>
-          <a:lnRef idx="2">
-            <a:schemeClr val="accent1">
-              <a:shade val="50000"/>
-            </a:schemeClr>
-          </a:lnRef>
-          <a:fillRef idx="1">
-            <a:schemeClr val="accent1"/>
-          </a:fillRef>
-          <a:effectRef idx="0">
-            <a:schemeClr val="accent1"/>
-          </a:effectRef>
-          <a:fontRef idx="minor">
-            <a:schemeClr val="lt1"/>
-          </a:fontRef>
-        </p:style>
-        <p:txBody>
-          <a:bodyPr rtlCol="0" anchor="ctr"/>
-          <a:lstStyle/>
-          <a:p>
-            <a:pPr algn="ctr"/>
-            <a:endParaRPr lang="zh-CN" altLang="en-US"/>
-          </a:p>
-        </p:txBody>
-      </p:sp>
-      <p:sp>
-        <p:nvSpPr>
-          <p:cNvPr id="4" name="Isosceles Triangle 3"/>
-          <p:cNvSpPr/>
-          <p:nvPr/>
-        </p:nvSpPr>
-        <p:spPr>
-          <a:xfrm rot="16559553">
-            <a:off x="5249995" y="487865"/>
+          <a:xfrm rot="13498768">
+            <a:off x="5347102" y="1081574"/>
             <a:ext cx="1237488" cy="1066800"/>
           </a:xfrm>
           <a:prstGeom prst="triangle">

</xml_diff>

<commit_message>
Add FT for Duplicate and Rotate
</commit_message>
<xml_diff>
--- a/doc/test/PositionsLab/PositionsLabDuplicateAndRotate.pptx
+++ b/doc/test/PositionsLab/PositionsLabDuplicateAndRotate.pptx
@@ -6,17 +6,25 @@
     <p:sldMasterId id="2147483660" r:id="rId2"/>
     <p:sldMasterId id="2147483672" r:id="rId3"/>
   </p:sldMasterIdLst>
+  <p:notesMasterIdLst>
+    <p:notesMasterId r:id="rId19"/>
+  </p:notesMasterIdLst>
   <p:sldIdLst>
     <p:sldId id="287" r:id="rId4"/>
     <p:sldId id="256" r:id="rId5"/>
-    <p:sldId id="288" r:id="rId6"/>
-    <p:sldId id="292" r:id="rId7"/>
-    <p:sldId id="290" r:id="rId8"/>
-    <p:sldId id="294" r:id="rId9"/>
-    <p:sldId id="293" r:id="rId10"/>
-    <p:sldId id="291" r:id="rId11"/>
-    <p:sldId id="295" r:id="rId12"/>
-    <p:sldId id="274" r:id="rId13"/>
+    <p:sldId id="292" r:id="rId6"/>
+    <p:sldId id="311" r:id="rId7"/>
+    <p:sldId id="312" r:id="rId8"/>
+    <p:sldId id="299" r:id="rId9"/>
+    <p:sldId id="313" r:id="rId10"/>
+    <p:sldId id="314" r:id="rId11"/>
+    <p:sldId id="293" r:id="rId12"/>
+    <p:sldId id="315" r:id="rId13"/>
+    <p:sldId id="316" r:id="rId14"/>
+    <p:sldId id="301" r:id="rId15"/>
+    <p:sldId id="317" r:id="rId16"/>
+    <p:sldId id="318" r:id="rId17"/>
+    <p:sldId id="274" r:id="rId18"/>
   </p:sldIdLst>
   <p:sldSz cx="9144000" cy="6858000" type="screen4x3"/>
   <p:notesSz cx="6858000" cy="9144000"/>
@@ -126,13 +134,18 @@
         <p14:section name="Align by Slide" id="{A3A2B0AB-762C-4281-AA7B-EF7E134E0DC4}">
           <p14:sldIdLst>
             <p14:sldId id="256"/>
-            <p14:sldId id="288"/>
             <p14:sldId id="292"/>
-            <p14:sldId id="290"/>
-            <p14:sldId id="294"/>
+            <p14:sldId id="311"/>
+            <p14:sldId id="312"/>
+            <p14:sldId id="299"/>
+            <p14:sldId id="313"/>
+            <p14:sldId id="314"/>
             <p14:sldId id="293"/>
-            <p14:sldId id="291"/>
-            <p14:sldId id="295"/>
+            <p14:sldId id="315"/>
+            <p14:sldId id="316"/>
+            <p14:sldId id="301"/>
+            <p14:sldId id="317"/>
+            <p14:sldId id="318"/>
             <p14:sldId id="274"/>
           </p14:sldIdLst>
         </p14:section>
@@ -143,6 +156,1040 @@
     </p:ext>
   </p:extLst>
 </p:presentation>
+</file>
+
+<file path=ppt/notesMasters/notesMaster1.xml><?xml version="1.0" encoding="utf-8"?>
+<p:notesMaster xmlns:a="http://schemas.openxmlformats.org/drawingml/2006/main" xmlns:r="http://schemas.openxmlformats.org/officeDocument/2006/relationships" xmlns:p="http://schemas.openxmlformats.org/presentationml/2006/main">
+  <p:cSld>
+    <p:bg>
+      <p:bgRef idx="1001">
+        <a:schemeClr val="bg1"/>
+      </p:bgRef>
+    </p:bg>
+    <p:spTree>
+      <p:nvGrpSpPr>
+        <p:cNvPr id="1" name=""/>
+        <p:cNvGrpSpPr/>
+        <p:nvPr/>
+      </p:nvGrpSpPr>
+      <p:grpSpPr>
+        <a:xfrm>
+          <a:off x="0" y="0"/>
+          <a:ext cx="0" cy="0"/>
+          <a:chOff x="0" y="0"/>
+          <a:chExt cx="0" cy="0"/>
+        </a:xfrm>
+      </p:grpSpPr>
+      <p:sp>
+        <p:nvSpPr>
+          <p:cNvPr id="2" name="Header Placeholder 1"/>
+          <p:cNvSpPr>
+            <a:spLocks noGrp="1"/>
+          </p:cNvSpPr>
+          <p:nvPr>
+            <p:ph type="hdr" sz="quarter"/>
+          </p:nvPr>
+        </p:nvSpPr>
+        <p:spPr>
+          <a:xfrm>
+            <a:off x="0" y="0"/>
+            <a:ext cx="2971800" cy="458788"/>
+          </a:xfrm>
+          <a:prstGeom prst="rect">
+            <a:avLst/>
+          </a:prstGeom>
+        </p:spPr>
+        <p:txBody>
+          <a:bodyPr vert="horz" lIns="91440" tIns="45720" rIns="91440" bIns="45720" rtlCol="0"/>
+          <a:lstStyle>
+            <a:lvl1pPr algn="l">
+              <a:defRPr sz="1200"/>
+            </a:lvl1pPr>
+          </a:lstStyle>
+          <a:p>
+            <a:endParaRPr lang="en-US"/>
+          </a:p>
+        </p:txBody>
+      </p:sp>
+      <p:sp>
+        <p:nvSpPr>
+          <p:cNvPr id="3" name="Date Placeholder 2"/>
+          <p:cNvSpPr>
+            <a:spLocks noGrp="1"/>
+          </p:cNvSpPr>
+          <p:nvPr>
+            <p:ph type="dt" idx="1"/>
+          </p:nvPr>
+        </p:nvSpPr>
+        <p:spPr>
+          <a:xfrm>
+            <a:off x="3884613" y="0"/>
+            <a:ext cx="2971800" cy="458788"/>
+          </a:xfrm>
+          <a:prstGeom prst="rect">
+            <a:avLst/>
+          </a:prstGeom>
+        </p:spPr>
+        <p:txBody>
+          <a:bodyPr vert="horz" lIns="91440" tIns="45720" rIns="91440" bIns="45720" rtlCol="0"/>
+          <a:lstStyle>
+            <a:lvl1pPr algn="r">
+              <a:defRPr sz="1200"/>
+            </a:lvl1pPr>
+          </a:lstStyle>
+          <a:p>
+            <a:fld id="{9A2C7DD3-3792-403E-9984-1895DFC9D0FA}" type="datetimeFigureOut">
+              <a:rPr lang="en-US" smtClean="0"/>
+              <a:t>1/29/2017</a:t>
+            </a:fld>
+            <a:endParaRPr lang="en-US"/>
+          </a:p>
+        </p:txBody>
+      </p:sp>
+      <p:sp>
+        <p:nvSpPr>
+          <p:cNvPr id="4" name="Slide Image Placeholder 3"/>
+          <p:cNvSpPr>
+            <a:spLocks noGrp="1" noRot="1" noChangeAspect="1"/>
+          </p:cNvSpPr>
+          <p:nvPr>
+            <p:ph type="sldImg" idx="2"/>
+          </p:nvPr>
+        </p:nvSpPr>
+        <p:spPr>
+          <a:xfrm>
+            <a:off x="1371600" y="1143000"/>
+            <a:ext cx="4114800" cy="3086100"/>
+          </a:xfrm>
+          <a:prstGeom prst="rect">
+            <a:avLst/>
+          </a:prstGeom>
+          <a:noFill/>
+          <a:ln w="12700">
+            <a:solidFill>
+              <a:prstClr val="black"/>
+            </a:solidFill>
+          </a:ln>
+        </p:spPr>
+        <p:txBody>
+          <a:bodyPr vert="horz" lIns="91440" tIns="45720" rIns="91440" bIns="45720" rtlCol="0" anchor="ctr"/>
+          <a:lstStyle/>
+          <a:p>
+            <a:endParaRPr lang="en-US"/>
+          </a:p>
+        </p:txBody>
+      </p:sp>
+      <p:sp>
+        <p:nvSpPr>
+          <p:cNvPr id="5" name="Notes Placeholder 4"/>
+          <p:cNvSpPr>
+            <a:spLocks noGrp="1"/>
+          </p:cNvSpPr>
+          <p:nvPr>
+            <p:ph type="body" sz="quarter" idx="3"/>
+          </p:nvPr>
+        </p:nvSpPr>
+        <p:spPr>
+          <a:xfrm>
+            <a:off x="685800" y="4400550"/>
+            <a:ext cx="5486400" cy="3600450"/>
+          </a:xfrm>
+          <a:prstGeom prst="rect">
+            <a:avLst/>
+          </a:prstGeom>
+        </p:spPr>
+        <p:txBody>
+          <a:bodyPr vert="horz" lIns="91440" tIns="45720" rIns="91440" bIns="45720" rtlCol="0"/>
+          <a:lstStyle/>
+          <a:p>
+            <a:pPr lvl="0"/>
+            <a:r>
+              <a:rPr lang="en-US" smtClean="0"/>
+              <a:t>Click to edit Master text styles</a:t>
+            </a:r>
+          </a:p>
+          <a:p>
+            <a:pPr lvl="1"/>
+            <a:r>
+              <a:rPr lang="en-US" smtClean="0"/>
+              <a:t>Second level</a:t>
+            </a:r>
+          </a:p>
+          <a:p>
+            <a:pPr lvl="2"/>
+            <a:r>
+              <a:rPr lang="en-US" smtClean="0"/>
+              <a:t>Third level</a:t>
+            </a:r>
+          </a:p>
+          <a:p>
+            <a:pPr lvl="3"/>
+            <a:r>
+              <a:rPr lang="en-US" smtClean="0"/>
+              <a:t>Fourth level</a:t>
+            </a:r>
+          </a:p>
+          <a:p>
+            <a:pPr lvl="4"/>
+            <a:r>
+              <a:rPr lang="en-US" smtClean="0"/>
+              <a:t>Fifth level</a:t>
+            </a:r>
+            <a:endParaRPr lang="en-US"/>
+          </a:p>
+        </p:txBody>
+      </p:sp>
+      <p:sp>
+        <p:nvSpPr>
+          <p:cNvPr id="6" name="Footer Placeholder 5"/>
+          <p:cNvSpPr>
+            <a:spLocks noGrp="1"/>
+          </p:cNvSpPr>
+          <p:nvPr>
+            <p:ph type="ftr" sz="quarter" idx="4"/>
+          </p:nvPr>
+        </p:nvSpPr>
+        <p:spPr>
+          <a:xfrm>
+            <a:off x="0" y="8685213"/>
+            <a:ext cx="2971800" cy="458787"/>
+          </a:xfrm>
+          <a:prstGeom prst="rect">
+            <a:avLst/>
+          </a:prstGeom>
+        </p:spPr>
+        <p:txBody>
+          <a:bodyPr vert="horz" lIns="91440" tIns="45720" rIns="91440" bIns="45720" rtlCol="0" anchor="b"/>
+          <a:lstStyle>
+            <a:lvl1pPr algn="l">
+              <a:defRPr sz="1200"/>
+            </a:lvl1pPr>
+          </a:lstStyle>
+          <a:p>
+            <a:endParaRPr lang="en-US"/>
+          </a:p>
+        </p:txBody>
+      </p:sp>
+      <p:sp>
+        <p:nvSpPr>
+          <p:cNvPr id="7" name="Slide Number Placeholder 6"/>
+          <p:cNvSpPr>
+            <a:spLocks noGrp="1"/>
+          </p:cNvSpPr>
+          <p:nvPr>
+            <p:ph type="sldNum" sz="quarter" idx="5"/>
+          </p:nvPr>
+        </p:nvSpPr>
+        <p:spPr>
+          <a:xfrm>
+            <a:off x="3884613" y="8685213"/>
+            <a:ext cx="2971800" cy="458787"/>
+          </a:xfrm>
+          <a:prstGeom prst="rect">
+            <a:avLst/>
+          </a:prstGeom>
+        </p:spPr>
+        <p:txBody>
+          <a:bodyPr vert="horz" lIns="91440" tIns="45720" rIns="91440" bIns="45720" rtlCol="0" anchor="b"/>
+          <a:lstStyle>
+            <a:lvl1pPr algn="r">
+              <a:defRPr sz="1200"/>
+            </a:lvl1pPr>
+          </a:lstStyle>
+          <a:p>
+            <a:fld id="{346D4081-EEB2-4E49-BA5D-A61F53586F7A}" type="slidenum">
+              <a:rPr lang="en-US" smtClean="0"/>
+              <a:t>‹#›</a:t>
+            </a:fld>
+            <a:endParaRPr lang="en-US"/>
+          </a:p>
+        </p:txBody>
+      </p:sp>
+    </p:spTree>
+    <p:extLst>
+      <p:ext uri="{BB962C8B-B14F-4D97-AF65-F5344CB8AC3E}">
+        <p14:creationId xmlns:p14="http://schemas.microsoft.com/office/powerpoint/2010/main" val="3231443570"/>
+      </p:ext>
+    </p:extLst>
+  </p:cSld>
+  <p:clrMap bg1="lt1" tx1="dk1" bg2="lt2" tx2="dk2" accent1="accent1" accent2="accent2" accent3="accent3" accent4="accent4" accent5="accent5" accent6="accent6" hlink="hlink" folHlink="folHlink"/>
+  <p:notesStyle>
+    <a:lvl1pPr marL="0" algn="l" defTabSz="914400" rtl="0" eaLnBrk="1" latinLnBrk="0" hangingPunct="1">
+      <a:defRPr sz="1200" kern="1200">
+        <a:solidFill>
+          <a:schemeClr val="tx1"/>
+        </a:solidFill>
+        <a:latin typeface="+mn-lt"/>
+        <a:ea typeface="+mn-ea"/>
+        <a:cs typeface="+mn-cs"/>
+      </a:defRPr>
+    </a:lvl1pPr>
+    <a:lvl2pPr marL="457200" algn="l" defTabSz="914400" rtl="0" eaLnBrk="1" latinLnBrk="0" hangingPunct="1">
+      <a:defRPr sz="1200" kern="1200">
+        <a:solidFill>
+          <a:schemeClr val="tx1"/>
+        </a:solidFill>
+        <a:latin typeface="+mn-lt"/>
+        <a:ea typeface="+mn-ea"/>
+        <a:cs typeface="+mn-cs"/>
+      </a:defRPr>
+    </a:lvl2pPr>
+    <a:lvl3pPr marL="914400" algn="l" defTabSz="914400" rtl="0" eaLnBrk="1" latinLnBrk="0" hangingPunct="1">
+      <a:defRPr sz="1200" kern="1200">
+        <a:solidFill>
+          <a:schemeClr val="tx1"/>
+        </a:solidFill>
+        <a:latin typeface="+mn-lt"/>
+        <a:ea typeface="+mn-ea"/>
+        <a:cs typeface="+mn-cs"/>
+      </a:defRPr>
+    </a:lvl3pPr>
+    <a:lvl4pPr marL="1371600" algn="l" defTabSz="914400" rtl="0" eaLnBrk="1" latinLnBrk="0" hangingPunct="1">
+      <a:defRPr sz="1200" kern="1200">
+        <a:solidFill>
+          <a:schemeClr val="tx1"/>
+        </a:solidFill>
+        <a:latin typeface="+mn-lt"/>
+        <a:ea typeface="+mn-ea"/>
+        <a:cs typeface="+mn-cs"/>
+      </a:defRPr>
+    </a:lvl4pPr>
+    <a:lvl5pPr marL="1828800" algn="l" defTabSz="914400" rtl="0" eaLnBrk="1" latinLnBrk="0" hangingPunct="1">
+      <a:defRPr sz="1200" kern="1200">
+        <a:solidFill>
+          <a:schemeClr val="tx1"/>
+        </a:solidFill>
+        <a:latin typeface="+mn-lt"/>
+        <a:ea typeface="+mn-ea"/>
+        <a:cs typeface="+mn-cs"/>
+      </a:defRPr>
+    </a:lvl5pPr>
+    <a:lvl6pPr marL="2286000" algn="l" defTabSz="914400" rtl="0" eaLnBrk="1" latinLnBrk="0" hangingPunct="1">
+      <a:defRPr sz="1200" kern="1200">
+        <a:solidFill>
+          <a:schemeClr val="tx1"/>
+        </a:solidFill>
+        <a:latin typeface="+mn-lt"/>
+        <a:ea typeface="+mn-ea"/>
+        <a:cs typeface="+mn-cs"/>
+      </a:defRPr>
+    </a:lvl6pPr>
+    <a:lvl7pPr marL="2743200" algn="l" defTabSz="914400" rtl="0" eaLnBrk="1" latinLnBrk="0" hangingPunct="1">
+      <a:defRPr sz="1200" kern="1200">
+        <a:solidFill>
+          <a:schemeClr val="tx1"/>
+        </a:solidFill>
+        <a:latin typeface="+mn-lt"/>
+        <a:ea typeface="+mn-ea"/>
+        <a:cs typeface="+mn-cs"/>
+      </a:defRPr>
+    </a:lvl7pPr>
+    <a:lvl8pPr marL="3200400" algn="l" defTabSz="914400" rtl="0" eaLnBrk="1" latinLnBrk="0" hangingPunct="1">
+      <a:defRPr sz="1200" kern="1200">
+        <a:solidFill>
+          <a:schemeClr val="tx1"/>
+        </a:solidFill>
+        <a:latin typeface="+mn-lt"/>
+        <a:ea typeface="+mn-ea"/>
+        <a:cs typeface="+mn-cs"/>
+      </a:defRPr>
+    </a:lvl8pPr>
+    <a:lvl9pPr marL="3657600" algn="l" defTabSz="914400" rtl="0" eaLnBrk="1" latinLnBrk="0" hangingPunct="1">
+      <a:defRPr sz="1200" kern="1200">
+        <a:solidFill>
+          <a:schemeClr val="tx1"/>
+        </a:solidFill>
+        <a:latin typeface="+mn-lt"/>
+        <a:ea typeface="+mn-ea"/>
+        <a:cs typeface="+mn-cs"/>
+      </a:defRPr>
+    </a:lvl9pPr>
+  </p:notesStyle>
+</p:notesMaster>
+</file>
+
+<file path=ppt/notesSlides/notesSlide1.xml><?xml version="1.0" encoding="utf-8"?>
+<p:notes xmlns:a="http://schemas.openxmlformats.org/drawingml/2006/main" xmlns:r="http://schemas.openxmlformats.org/officeDocument/2006/relationships" xmlns:p="http://schemas.openxmlformats.org/presentationml/2006/main">
+  <p:cSld>
+    <p:spTree>
+      <p:nvGrpSpPr>
+        <p:cNvPr id="1" name=""/>
+        <p:cNvGrpSpPr/>
+        <p:nvPr/>
+      </p:nvGrpSpPr>
+      <p:grpSpPr>
+        <a:xfrm>
+          <a:off x="0" y="0"/>
+          <a:ext cx="0" cy="0"/>
+          <a:chOff x="0" y="0"/>
+          <a:chExt cx="0" cy="0"/>
+        </a:xfrm>
+      </p:grpSpPr>
+      <p:sp>
+        <p:nvSpPr>
+          <p:cNvPr id="2" name="Slide Image Placeholder 1"/>
+          <p:cNvSpPr>
+            <a:spLocks noGrp="1" noRot="1" noChangeAspect="1"/>
+          </p:cNvSpPr>
+          <p:nvPr>
+            <p:ph type="sldImg"/>
+          </p:nvPr>
+        </p:nvSpPr>
+        <p:spPr/>
+      </p:sp>
+      <p:sp>
+        <p:nvSpPr>
+          <p:cNvPr id="3" name="Notes Placeholder 2"/>
+          <p:cNvSpPr>
+            <a:spLocks noGrp="1"/>
+          </p:cNvSpPr>
+          <p:nvPr>
+            <p:ph type="body" idx="1"/>
+          </p:nvPr>
+        </p:nvSpPr>
+        <p:spPr/>
+        <p:txBody>
+          <a:bodyPr/>
+          <a:lstStyle/>
+          <a:p>
+            <a:r>
+              <a:rPr lang="en-US" dirty="0" smtClean="0"/>
+              <a:t>Original Shapes</a:t>
+            </a:r>
+            <a:endParaRPr lang="en-US" dirty="0"/>
+          </a:p>
+        </p:txBody>
+      </p:sp>
+      <p:sp>
+        <p:nvSpPr>
+          <p:cNvPr id="4" name="Slide Number Placeholder 3"/>
+          <p:cNvSpPr>
+            <a:spLocks noGrp="1"/>
+          </p:cNvSpPr>
+          <p:nvPr>
+            <p:ph type="sldNum" sz="quarter" idx="10"/>
+          </p:nvPr>
+        </p:nvSpPr>
+        <p:spPr/>
+        <p:txBody>
+          <a:bodyPr/>
+          <a:lstStyle/>
+          <a:p>
+            <a:fld id="{346D4081-EEB2-4E49-BA5D-A61F53586F7A}" type="slidenum">
+              <a:rPr lang="en-US" smtClean="0"/>
+              <a:t>4</a:t>
+            </a:fld>
+            <a:endParaRPr lang="en-US"/>
+          </a:p>
+        </p:txBody>
+      </p:sp>
+    </p:spTree>
+    <p:extLst>
+      <p:ext uri="{BB962C8B-B14F-4D97-AF65-F5344CB8AC3E}">
+        <p14:creationId xmlns:p14="http://schemas.microsoft.com/office/powerpoint/2010/main" val="2759255730"/>
+      </p:ext>
+    </p:extLst>
+  </p:cSld>
+  <p:clrMapOvr>
+    <a:masterClrMapping/>
+  </p:clrMapOvr>
+</p:notes>
+</file>
+
+<file path=ppt/notesSlides/notesSlide2.xml><?xml version="1.0" encoding="utf-8"?>
+<p:notes xmlns:a="http://schemas.openxmlformats.org/drawingml/2006/main" xmlns:r="http://schemas.openxmlformats.org/officeDocument/2006/relationships" xmlns:p="http://schemas.openxmlformats.org/presentationml/2006/main">
+  <p:cSld>
+    <p:spTree>
+      <p:nvGrpSpPr>
+        <p:cNvPr id="1" name=""/>
+        <p:cNvGrpSpPr/>
+        <p:nvPr/>
+      </p:nvGrpSpPr>
+      <p:grpSpPr>
+        <a:xfrm>
+          <a:off x="0" y="0"/>
+          <a:ext cx="0" cy="0"/>
+          <a:chOff x="0" y="0"/>
+          <a:chExt cx="0" cy="0"/>
+        </a:xfrm>
+      </p:grpSpPr>
+      <p:sp>
+        <p:nvSpPr>
+          <p:cNvPr id="2" name="Slide Image Placeholder 1"/>
+          <p:cNvSpPr>
+            <a:spLocks noGrp="1" noRot="1" noChangeAspect="1"/>
+          </p:cNvSpPr>
+          <p:nvPr>
+            <p:ph type="sldImg"/>
+          </p:nvPr>
+        </p:nvSpPr>
+        <p:spPr/>
+      </p:sp>
+      <p:sp>
+        <p:nvSpPr>
+          <p:cNvPr id="3" name="Notes Placeholder 2"/>
+          <p:cNvSpPr>
+            <a:spLocks noGrp="1"/>
+          </p:cNvSpPr>
+          <p:nvPr>
+            <p:ph type="body" idx="1"/>
+          </p:nvPr>
+        </p:nvSpPr>
+        <p:spPr/>
+        <p:txBody>
+          <a:bodyPr/>
+          <a:lstStyle/>
+          <a:p>
+            <a:r>
+              <a:rPr lang="en-US" dirty="0" smtClean="0"/>
+              <a:t>Click red square, blue</a:t>
+            </a:r>
+            <a:r>
+              <a:rPr lang="en-US" baseline="0" dirty="0" smtClean="0"/>
+              <a:t> circle.</a:t>
+            </a:r>
+          </a:p>
+          <a:p>
+            <a:r>
+              <a:rPr lang="en-US" baseline="0" dirty="0" smtClean="0"/>
+              <a:t>Open Positions Lab, click settings for reorient, </a:t>
+            </a:r>
+            <a:r>
+              <a:rPr lang="en-US" baseline="0" smtClean="0"/>
+              <a:t>select fixed, click ok and click Duplicate and Rotate.</a:t>
+            </a:r>
+          </a:p>
+          <a:p>
+            <a:r>
+              <a:rPr lang="en-US" baseline="0" dirty="0" smtClean="0"/>
+              <a:t>Drag center of blue circle to center of green circle</a:t>
+            </a:r>
+            <a:endParaRPr lang="en-US" dirty="0"/>
+          </a:p>
+        </p:txBody>
+      </p:sp>
+      <p:sp>
+        <p:nvSpPr>
+          <p:cNvPr id="4" name="Slide Number Placeholder 3"/>
+          <p:cNvSpPr>
+            <a:spLocks noGrp="1"/>
+          </p:cNvSpPr>
+          <p:nvPr>
+            <p:ph type="sldNum" sz="quarter" idx="10"/>
+          </p:nvPr>
+        </p:nvSpPr>
+        <p:spPr/>
+        <p:txBody>
+          <a:bodyPr/>
+          <a:lstStyle/>
+          <a:p>
+            <a:fld id="{346D4081-EEB2-4E49-BA5D-A61F53586F7A}" type="slidenum">
+              <a:rPr lang="en-US" smtClean="0"/>
+              <a:t>5</a:t>
+            </a:fld>
+            <a:endParaRPr lang="en-US"/>
+          </a:p>
+        </p:txBody>
+      </p:sp>
+    </p:spTree>
+    <p:extLst>
+      <p:ext uri="{BB962C8B-B14F-4D97-AF65-F5344CB8AC3E}">
+        <p14:creationId xmlns:p14="http://schemas.microsoft.com/office/powerpoint/2010/main" val="3700532857"/>
+      </p:ext>
+    </p:extLst>
+  </p:cSld>
+  <p:clrMapOvr>
+    <a:masterClrMapping/>
+  </p:clrMapOvr>
+</p:notes>
+</file>
+
+<file path=ppt/notesSlides/notesSlide3.xml><?xml version="1.0" encoding="utf-8"?>
+<p:notes xmlns:a="http://schemas.openxmlformats.org/drawingml/2006/main" xmlns:r="http://schemas.openxmlformats.org/officeDocument/2006/relationships" xmlns:p="http://schemas.openxmlformats.org/presentationml/2006/main">
+  <p:cSld>
+    <p:spTree>
+      <p:nvGrpSpPr>
+        <p:cNvPr id="1" name=""/>
+        <p:cNvGrpSpPr/>
+        <p:nvPr/>
+      </p:nvGrpSpPr>
+      <p:grpSpPr>
+        <a:xfrm>
+          <a:off x="0" y="0"/>
+          <a:ext cx="0" cy="0"/>
+          <a:chOff x="0" y="0"/>
+          <a:chExt cx="0" cy="0"/>
+        </a:xfrm>
+      </p:grpSpPr>
+      <p:sp>
+        <p:nvSpPr>
+          <p:cNvPr id="2" name="Slide Image Placeholder 1"/>
+          <p:cNvSpPr>
+            <a:spLocks noGrp="1" noRot="1" noChangeAspect="1"/>
+          </p:cNvSpPr>
+          <p:nvPr>
+            <p:ph type="sldImg"/>
+          </p:nvPr>
+        </p:nvSpPr>
+        <p:spPr/>
+      </p:sp>
+      <p:sp>
+        <p:nvSpPr>
+          <p:cNvPr id="3" name="Notes Placeholder 2"/>
+          <p:cNvSpPr>
+            <a:spLocks noGrp="1"/>
+          </p:cNvSpPr>
+          <p:nvPr>
+            <p:ph type="body" idx="1"/>
+          </p:nvPr>
+        </p:nvSpPr>
+        <p:spPr/>
+        <p:txBody>
+          <a:bodyPr/>
+          <a:lstStyle/>
+          <a:p>
+            <a:r>
+              <a:rPr lang="en-US" dirty="0" smtClean="0"/>
+              <a:t>Original Shapes</a:t>
+            </a:r>
+            <a:endParaRPr lang="en-US" dirty="0"/>
+          </a:p>
+        </p:txBody>
+      </p:sp>
+      <p:sp>
+        <p:nvSpPr>
+          <p:cNvPr id="4" name="Slide Number Placeholder 3"/>
+          <p:cNvSpPr>
+            <a:spLocks noGrp="1"/>
+          </p:cNvSpPr>
+          <p:nvPr>
+            <p:ph type="sldNum" sz="quarter" idx="10"/>
+          </p:nvPr>
+        </p:nvSpPr>
+        <p:spPr/>
+        <p:txBody>
+          <a:bodyPr/>
+          <a:lstStyle/>
+          <a:p>
+            <a:fld id="{346D4081-EEB2-4E49-BA5D-A61F53586F7A}" type="slidenum">
+              <a:rPr lang="en-US" smtClean="0"/>
+              <a:t>7</a:t>
+            </a:fld>
+            <a:endParaRPr lang="en-US"/>
+          </a:p>
+        </p:txBody>
+      </p:sp>
+    </p:spTree>
+    <p:extLst>
+      <p:ext uri="{BB962C8B-B14F-4D97-AF65-F5344CB8AC3E}">
+        <p14:creationId xmlns:p14="http://schemas.microsoft.com/office/powerpoint/2010/main" val="2205033840"/>
+      </p:ext>
+    </p:extLst>
+  </p:cSld>
+  <p:clrMapOvr>
+    <a:masterClrMapping/>
+  </p:clrMapOvr>
+</p:notes>
+</file>
+
+<file path=ppt/notesSlides/notesSlide4.xml><?xml version="1.0" encoding="utf-8"?>
+<p:notes xmlns:a="http://schemas.openxmlformats.org/drawingml/2006/main" xmlns:r="http://schemas.openxmlformats.org/officeDocument/2006/relationships" xmlns:p="http://schemas.openxmlformats.org/presentationml/2006/main">
+  <p:cSld>
+    <p:spTree>
+      <p:nvGrpSpPr>
+        <p:cNvPr id="1" name=""/>
+        <p:cNvGrpSpPr/>
+        <p:nvPr/>
+      </p:nvGrpSpPr>
+      <p:grpSpPr>
+        <a:xfrm>
+          <a:off x="0" y="0"/>
+          <a:ext cx="0" cy="0"/>
+          <a:chOff x="0" y="0"/>
+          <a:chExt cx="0" cy="0"/>
+        </a:xfrm>
+      </p:grpSpPr>
+      <p:sp>
+        <p:nvSpPr>
+          <p:cNvPr id="2" name="Slide Image Placeholder 1"/>
+          <p:cNvSpPr>
+            <a:spLocks noGrp="1" noRot="1" noChangeAspect="1"/>
+          </p:cNvSpPr>
+          <p:nvPr>
+            <p:ph type="sldImg"/>
+          </p:nvPr>
+        </p:nvSpPr>
+        <p:spPr/>
+      </p:sp>
+      <p:sp>
+        <p:nvSpPr>
+          <p:cNvPr id="3" name="Notes Placeholder 2"/>
+          <p:cNvSpPr>
+            <a:spLocks noGrp="1"/>
+          </p:cNvSpPr>
+          <p:nvPr>
+            <p:ph type="body" idx="1"/>
+          </p:nvPr>
+        </p:nvSpPr>
+        <p:spPr/>
+        <p:txBody>
+          <a:bodyPr/>
+          <a:lstStyle/>
+          <a:p>
+            <a:r>
+              <a:rPr lang="en-US" dirty="0" smtClean="0"/>
+              <a:t>Click red square, blue</a:t>
+            </a:r>
+            <a:r>
+              <a:rPr lang="en-US" baseline="0" dirty="0" smtClean="0"/>
+              <a:t> triangle.</a:t>
+            </a:r>
+          </a:p>
+          <a:p>
+            <a:r>
+              <a:rPr lang="en-US" baseline="0" dirty="0" smtClean="0"/>
+              <a:t>Open Positions Lab, click settings for reorient, select dynamic, click ok and click Duplicate and Rotate.</a:t>
+            </a:r>
+          </a:p>
+          <a:p>
+            <a:r>
+              <a:rPr lang="en-US" baseline="0" dirty="0" smtClean="0"/>
+              <a:t>Drag center of blue triangle to center of green circle</a:t>
+            </a:r>
+            <a:endParaRPr lang="en-US" dirty="0" smtClean="0"/>
+          </a:p>
+        </p:txBody>
+      </p:sp>
+      <p:sp>
+        <p:nvSpPr>
+          <p:cNvPr id="4" name="Slide Number Placeholder 3"/>
+          <p:cNvSpPr>
+            <a:spLocks noGrp="1"/>
+          </p:cNvSpPr>
+          <p:nvPr>
+            <p:ph type="sldNum" sz="quarter" idx="10"/>
+          </p:nvPr>
+        </p:nvSpPr>
+        <p:spPr/>
+        <p:txBody>
+          <a:bodyPr/>
+          <a:lstStyle/>
+          <a:p>
+            <a:fld id="{346D4081-EEB2-4E49-BA5D-A61F53586F7A}" type="slidenum">
+              <a:rPr lang="en-US" smtClean="0"/>
+              <a:t>8</a:t>
+            </a:fld>
+            <a:endParaRPr lang="en-US"/>
+          </a:p>
+        </p:txBody>
+      </p:sp>
+    </p:spTree>
+    <p:extLst>
+      <p:ext uri="{BB962C8B-B14F-4D97-AF65-F5344CB8AC3E}">
+        <p14:creationId xmlns:p14="http://schemas.microsoft.com/office/powerpoint/2010/main" val="2619369860"/>
+      </p:ext>
+    </p:extLst>
+  </p:cSld>
+  <p:clrMapOvr>
+    <a:masterClrMapping/>
+  </p:clrMapOvr>
+</p:notes>
+</file>
+
+<file path=ppt/notesSlides/notesSlide5.xml><?xml version="1.0" encoding="utf-8"?>
+<p:notes xmlns:a="http://schemas.openxmlformats.org/drawingml/2006/main" xmlns:r="http://schemas.openxmlformats.org/officeDocument/2006/relationships" xmlns:p="http://schemas.openxmlformats.org/presentationml/2006/main">
+  <p:cSld>
+    <p:spTree>
+      <p:nvGrpSpPr>
+        <p:cNvPr id="1" name=""/>
+        <p:cNvGrpSpPr/>
+        <p:nvPr/>
+      </p:nvGrpSpPr>
+      <p:grpSpPr>
+        <a:xfrm>
+          <a:off x="0" y="0"/>
+          <a:ext cx="0" cy="0"/>
+          <a:chOff x="0" y="0"/>
+          <a:chExt cx="0" cy="0"/>
+        </a:xfrm>
+      </p:grpSpPr>
+      <p:sp>
+        <p:nvSpPr>
+          <p:cNvPr id="2" name="Slide Image Placeholder 1"/>
+          <p:cNvSpPr>
+            <a:spLocks noGrp="1" noRot="1" noChangeAspect="1"/>
+          </p:cNvSpPr>
+          <p:nvPr>
+            <p:ph type="sldImg"/>
+          </p:nvPr>
+        </p:nvSpPr>
+        <p:spPr/>
+      </p:sp>
+      <p:sp>
+        <p:nvSpPr>
+          <p:cNvPr id="3" name="Notes Placeholder 2"/>
+          <p:cNvSpPr>
+            <a:spLocks noGrp="1"/>
+          </p:cNvSpPr>
+          <p:nvPr>
+            <p:ph type="body" idx="1"/>
+          </p:nvPr>
+        </p:nvSpPr>
+        <p:spPr/>
+        <p:txBody>
+          <a:bodyPr/>
+          <a:lstStyle/>
+          <a:p>
+            <a:r>
+              <a:rPr lang="en-US" dirty="0" smtClean="0"/>
+              <a:t>Original Shapes</a:t>
+            </a:r>
+            <a:endParaRPr lang="en-US" dirty="0"/>
+          </a:p>
+        </p:txBody>
+      </p:sp>
+      <p:sp>
+        <p:nvSpPr>
+          <p:cNvPr id="4" name="Slide Number Placeholder 3"/>
+          <p:cNvSpPr>
+            <a:spLocks noGrp="1"/>
+          </p:cNvSpPr>
+          <p:nvPr>
+            <p:ph type="sldNum" sz="quarter" idx="10"/>
+          </p:nvPr>
+        </p:nvSpPr>
+        <p:spPr/>
+        <p:txBody>
+          <a:bodyPr/>
+          <a:lstStyle/>
+          <a:p>
+            <a:fld id="{346D4081-EEB2-4E49-BA5D-A61F53586F7A}" type="slidenum">
+              <a:rPr lang="en-US" smtClean="0"/>
+              <a:t>10</a:t>
+            </a:fld>
+            <a:endParaRPr lang="en-US"/>
+          </a:p>
+        </p:txBody>
+      </p:sp>
+    </p:spTree>
+    <p:extLst>
+      <p:ext uri="{BB962C8B-B14F-4D97-AF65-F5344CB8AC3E}">
+        <p14:creationId xmlns:p14="http://schemas.microsoft.com/office/powerpoint/2010/main" val="4228603248"/>
+      </p:ext>
+    </p:extLst>
+  </p:cSld>
+  <p:clrMapOvr>
+    <a:masterClrMapping/>
+  </p:clrMapOvr>
+</p:notes>
+</file>
+
+<file path=ppt/notesSlides/notesSlide6.xml><?xml version="1.0" encoding="utf-8"?>
+<p:notes xmlns:a="http://schemas.openxmlformats.org/drawingml/2006/main" xmlns:r="http://schemas.openxmlformats.org/officeDocument/2006/relationships" xmlns:p="http://schemas.openxmlformats.org/presentationml/2006/main">
+  <p:cSld>
+    <p:spTree>
+      <p:nvGrpSpPr>
+        <p:cNvPr id="1" name=""/>
+        <p:cNvGrpSpPr/>
+        <p:nvPr/>
+      </p:nvGrpSpPr>
+      <p:grpSpPr>
+        <a:xfrm>
+          <a:off x="0" y="0"/>
+          <a:ext cx="0" cy="0"/>
+          <a:chOff x="0" y="0"/>
+          <a:chExt cx="0" cy="0"/>
+        </a:xfrm>
+      </p:grpSpPr>
+      <p:sp>
+        <p:nvSpPr>
+          <p:cNvPr id="2" name="Slide Image Placeholder 1"/>
+          <p:cNvSpPr>
+            <a:spLocks noGrp="1" noRot="1" noChangeAspect="1"/>
+          </p:cNvSpPr>
+          <p:nvPr>
+            <p:ph type="sldImg"/>
+          </p:nvPr>
+        </p:nvSpPr>
+        <p:spPr/>
+      </p:sp>
+      <p:sp>
+        <p:nvSpPr>
+          <p:cNvPr id="3" name="Notes Placeholder 2"/>
+          <p:cNvSpPr>
+            <a:spLocks noGrp="1"/>
+          </p:cNvSpPr>
+          <p:nvPr>
+            <p:ph type="body" idx="1"/>
+          </p:nvPr>
+        </p:nvSpPr>
+        <p:spPr/>
+        <p:txBody>
+          <a:bodyPr/>
+          <a:lstStyle/>
+          <a:p>
+            <a:r>
+              <a:rPr lang="en-US" dirty="0" smtClean="0"/>
+              <a:t>Click red square, blue</a:t>
+            </a:r>
+            <a:r>
+              <a:rPr lang="en-US" baseline="0" dirty="0" smtClean="0"/>
+              <a:t> circle, blue triangle.</a:t>
+            </a:r>
+          </a:p>
+          <a:p>
+            <a:r>
+              <a:rPr lang="en-US" baseline="0" dirty="0" smtClean="0"/>
+              <a:t>Open Positions Lab, click settings for reorient, select fixed, click ok and click Duplicate and Rotate.</a:t>
+            </a:r>
+          </a:p>
+          <a:p>
+            <a:r>
+              <a:rPr lang="en-US" baseline="0" dirty="0" smtClean="0"/>
+              <a:t>Drag center of blue circle to center of green circle</a:t>
+            </a:r>
+            <a:endParaRPr lang="en-US" dirty="0" smtClean="0"/>
+          </a:p>
+        </p:txBody>
+      </p:sp>
+      <p:sp>
+        <p:nvSpPr>
+          <p:cNvPr id="4" name="Slide Number Placeholder 3"/>
+          <p:cNvSpPr>
+            <a:spLocks noGrp="1"/>
+          </p:cNvSpPr>
+          <p:nvPr>
+            <p:ph type="sldNum" sz="quarter" idx="10"/>
+          </p:nvPr>
+        </p:nvSpPr>
+        <p:spPr/>
+        <p:txBody>
+          <a:bodyPr/>
+          <a:lstStyle/>
+          <a:p>
+            <a:fld id="{346D4081-EEB2-4E49-BA5D-A61F53586F7A}" type="slidenum">
+              <a:rPr lang="en-US" smtClean="0"/>
+              <a:t>11</a:t>
+            </a:fld>
+            <a:endParaRPr lang="en-US"/>
+          </a:p>
+        </p:txBody>
+      </p:sp>
+    </p:spTree>
+    <p:extLst>
+      <p:ext uri="{BB962C8B-B14F-4D97-AF65-F5344CB8AC3E}">
+        <p14:creationId xmlns:p14="http://schemas.microsoft.com/office/powerpoint/2010/main" val="424337380"/>
+      </p:ext>
+    </p:extLst>
+  </p:cSld>
+  <p:clrMapOvr>
+    <a:masterClrMapping/>
+  </p:clrMapOvr>
+</p:notes>
+</file>
+
+<file path=ppt/notesSlides/notesSlide7.xml><?xml version="1.0" encoding="utf-8"?>
+<p:notes xmlns:a="http://schemas.openxmlformats.org/drawingml/2006/main" xmlns:r="http://schemas.openxmlformats.org/officeDocument/2006/relationships" xmlns:p="http://schemas.openxmlformats.org/presentationml/2006/main">
+  <p:cSld>
+    <p:spTree>
+      <p:nvGrpSpPr>
+        <p:cNvPr id="1" name=""/>
+        <p:cNvGrpSpPr/>
+        <p:nvPr/>
+      </p:nvGrpSpPr>
+      <p:grpSpPr>
+        <a:xfrm>
+          <a:off x="0" y="0"/>
+          <a:ext cx="0" cy="0"/>
+          <a:chOff x="0" y="0"/>
+          <a:chExt cx="0" cy="0"/>
+        </a:xfrm>
+      </p:grpSpPr>
+      <p:sp>
+        <p:nvSpPr>
+          <p:cNvPr id="2" name="Slide Image Placeholder 1"/>
+          <p:cNvSpPr>
+            <a:spLocks noGrp="1" noRot="1" noChangeAspect="1"/>
+          </p:cNvSpPr>
+          <p:nvPr>
+            <p:ph type="sldImg"/>
+          </p:nvPr>
+        </p:nvSpPr>
+        <p:spPr/>
+      </p:sp>
+      <p:sp>
+        <p:nvSpPr>
+          <p:cNvPr id="3" name="Notes Placeholder 2"/>
+          <p:cNvSpPr>
+            <a:spLocks noGrp="1"/>
+          </p:cNvSpPr>
+          <p:nvPr>
+            <p:ph type="body" idx="1"/>
+          </p:nvPr>
+        </p:nvSpPr>
+        <p:spPr/>
+        <p:txBody>
+          <a:bodyPr/>
+          <a:lstStyle/>
+          <a:p>
+            <a:r>
+              <a:rPr lang="en-US" dirty="0" smtClean="0"/>
+              <a:t>Click red square, blue circle, blue</a:t>
+            </a:r>
+            <a:r>
+              <a:rPr lang="en-US" baseline="0" dirty="0" smtClean="0"/>
+              <a:t> triangle.</a:t>
+            </a:r>
+          </a:p>
+          <a:p>
+            <a:r>
+              <a:rPr lang="en-US" baseline="0" dirty="0" smtClean="0"/>
+              <a:t>Open Positions Lab, click settings for reorient, select dynamic, click ok and click Duplicate and Rotate.</a:t>
+            </a:r>
+          </a:p>
+          <a:p>
+            <a:r>
+              <a:rPr lang="en-US" baseline="0" dirty="0" smtClean="0"/>
+              <a:t>Drag center of blue triangle to center of green circle</a:t>
+            </a:r>
+            <a:endParaRPr lang="en-US" dirty="0" smtClean="0"/>
+          </a:p>
+        </p:txBody>
+      </p:sp>
+      <p:sp>
+        <p:nvSpPr>
+          <p:cNvPr id="4" name="Slide Number Placeholder 3"/>
+          <p:cNvSpPr>
+            <a:spLocks noGrp="1"/>
+          </p:cNvSpPr>
+          <p:nvPr>
+            <p:ph type="sldNum" sz="quarter" idx="10"/>
+          </p:nvPr>
+        </p:nvSpPr>
+        <p:spPr/>
+        <p:txBody>
+          <a:bodyPr/>
+          <a:lstStyle/>
+          <a:p>
+            <a:fld id="{346D4081-EEB2-4E49-BA5D-A61F53586F7A}" type="slidenum">
+              <a:rPr lang="en-US" smtClean="0"/>
+              <a:t>14</a:t>
+            </a:fld>
+            <a:endParaRPr lang="en-US"/>
+          </a:p>
+        </p:txBody>
+      </p:sp>
+    </p:spTree>
+    <p:extLst>
+      <p:ext uri="{BB962C8B-B14F-4D97-AF65-F5344CB8AC3E}">
+        <p14:creationId xmlns:p14="http://schemas.microsoft.com/office/powerpoint/2010/main" val="4000562717"/>
+      </p:ext>
+    </p:extLst>
+  </p:cSld>
+  <p:clrMapOvr>
+    <a:masterClrMapping/>
+  </p:clrMapOvr>
+</p:notes>
 </file>
 
 <file path=ppt/slideLayouts/slideLayout1.xml><?xml version="1.0" encoding="utf-8"?>
@@ -324,7 +1371,7 @@
           <a:p>
             <a:fld id="{699DC775-C286-4358-8C92-D7E584E969B3}" type="datetimeFigureOut">
               <a:rPr lang="en-US" smtClean="0"/>
-              <a:t>7/5/2016</a:t>
+              <a:t>1/29/2017</a:t>
             </a:fld>
             <a:endParaRPr lang="en-US"/>
           </a:p>
@@ -492,7 +1539,7 @@
           <a:p>
             <a:fld id="{699DC775-C286-4358-8C92-D7E584E969B3}" type="datetimeFigureOut">
               <a:rPr lang="en-US" smtClean="0"/>
-              <a:t>7/5/2016</a:t>
+              <a:t>1/29/2017</a:t>
             </a:fld>
             <a:endParaRPr lang="en-US"/>
           </a:p>
@@ -670,7 +1717,7 @@
           <a:p>
             <a:fld id="{699DC775-C286-4358-8C92-D7E584E969B3}" type="datetimeFigureOut">
               <a:rPr lang="en-US" smtClean="0"/>
-              <a:t>7/5/2016</a:t>
+              <a:t>1/29/2017</a:t>
             </a:fld>
             <a:endParaRPr lang="en-US"/>
           </a:p>
@@ -910,7 +1957,7 @@
           <a:p>
             <a:fld id="{699DC775-C286-4358-8C92-D7E584E969B3}" type="datetimeFigureOut">
               <a:rPr lang="en-US" smtClean="0"/>
-              <a:t>7/5/2016</a:t>
+              <a:t>1/29/2017</a:t>
             </a:fld>
             <a:endParaRPr lang="en-US"/>
           </a:p>
@@ -1078,7 +2125,7 @@
           <a:p>
             <a:fld id="{699DC775-C286-4358-8C92-D7E584E969B3}" type="datetimeFigureOut">
               <a:rPr lang="en-US" smtClean="0"/>
-              <a:t>7/5/2016</a:t>
+              <a:t>1/29/2017</a:t>
             </a:fld>
             <a:endParaRPr lang="en-US"/>
           </a:p>
@@ -1323,7 +2370,7 @@
           <a:p>
             <a:fld id="{699DC775-C286-4358-8C92-D7E584E969B3}" type="datetimeFigureOut">
               <a:rPr lang="en-US" smtClean="0"/>
-              <a:t>7/5/2016</a:t>
+              <a:t>1/29/2017</a:t>
             </a:fld>
             <a:endParaRPr lang="en-US"/>
           </a:p>
@@ -1608,7 +2655,7 @@
           <a:p>
             <a:fld id="{699DC775-C286-4358-8C92-D7E584E969B3}" type="datetimeFigureOut">
               <a:rPr lang="en-US" smtClean="0"/>
-              <a:t>7/5/2016</a:t>
+              <a:t>1/29/2017</a:t>
             </a:fld>
             <a:endParaRPr lang="en-US"/>
           </a:p>
@@ -2027,7 +3074,7 @@
           <a:p>
             <a:fld id="{699DC775-C286-4358-8C92-D7E584E969B3}" type="datetimeFigureOut">
               <a:rPr lang="en-US" smtClean="0"/>
-              <a:t>7/5/2016</a:t>
+              <a:t>1/29/2017</a:t>
             </a:fld>
             <a:endParaRPr lang="en-US"/>
           </a:p>
@@ -2144,7 +3191,7 @@
           <a:p>
             <a:fld id="{699DC775-C286-4358-8C92-D7E584E969B3}" type="datetimeFigureOut">
               <a:rPr lang="en-US" smtClean="0"/>
-              <a:t>7/5/2016</a:t>
+              <a:t>1/29/2017</a:t>
             </a:fld>
             <a:endParaRPr lang="en-US"/>
           </a:p>
@@ -2239,7 +3286,7 @@
           <a:p>
             <a:fld id="{699DC775-C286-4358-8C92-D7E584E969B3}" type="datetimeFigureOut">
               <a:rPr lang="en-US" smtClean="0"/>
-              <a:t>7/5/2016</a:t>
+              <a:t>1/29/2017</a:t>
             </a:fld>
             <a:endParaRPr lang="en-US"/>
           </a:p>
@@ -2514,7 +3561,7 @@
           <a:p>
             <a:fld id="{699DC775-C286-4358-8C92-D7E584E969B3}" type="datetimeFigureOut">
               <a:rPr lang="en-US" smtClean="0"/>
-              <a:t>7/5/2016</a:t>
+              <a:t>1/29/2017</a:t>
             </a:fld>
             <a:endParaRPr lang="en-US"/>
           </a:p>
@@ -2682,7 +3729,7 @@
           <a:p>
             <a:fld id="{699DC775-C286-4358-8C92-D7E584E969B3}" type="datetimeFigureOut">
               <a:rPr lang="en-US" smtClean="0"/>
-              <a:t>7/5/2016</a:t>
+              <a:t>1/29/2017</a:t>
             </a:fld>
             <a:endParaRPr lang="en-US"/>
           </a:p>
@@ -2934,7 +3981,7 @@
           <a:p>
             <a:fld id="{699DC775-C286-4358-8C92-D7E584E969B3}" type="datetimeFigureOut">
               <a:rPr lang="en-US" smtClean="0"/>
-              <a:t>7/5/2016</a:t>
+              <a:t>1/29/2017</a:t>
             </a:fld>
             <a:endParaRPr lang="en-US"/>
           </a:p>
@@ -3102,7 +4149,7 @@
           <a:p>
             <a:fld id="{699DC775-C286-4358-8C92-D7E584E969B3}" type="datetimeFigureOut">
               <a:rPr lang="en-US" smtClean="0"/>
-              <a:t>7/5/2016</a:t>
+              <a:t>1/29/2017</a:t>
             </a:fld>
             <a:endParaRPr lang="en-US"/>
           </a:p>
@@ -3280,7 +4327,7 @@
           <a:p>
             <a:fld id="{699DC775-C286-4358-8C92-D7E584E969B3}" type="datetimeFigureOut">
               <a:rPr lang="en-US" smtClean="0"/>
-              <a:t>7/5/2016</a:t>
+              <a:t>1/29/2017</a:t>
             </a:fld>
             <a:endParaRPr lang="en-US"/>
           </a:p>
@@ -3528,7 +4575,7 @@
           <a:p>
             <a:fld id="{699DC775-C286-4358-8C92-D7E584E969B3}" type="datetimeFigureOut">
               <a:rPr lang="en-US" smtClean="0"/>
-              <a:t>7/5/2016</a:t>
+              <a:t>1/29/2017</a:t>
             </a:fld>
             <a:endParaRPr lang="en-US"/>
           </a:p>
@@ -3704,7 +4751,7 @@
           <a:p>
             <a:fld id="{699DC775-C286-4358-8C92-D7E584E969B3}" type="datetimeFigureOut">
               <a:rPr lang="en-US" smtClean="0"/>
-              <a:t>7/5/2016</a:t>
+              <a:t>1/29/2017</a:t>
             </a:fld>
             <a:endParaRPr lang="en-US"/>
           </a:p>
@@ -3957,7 +5004,7 @@
           <a:p>
             <a:fld id="{699DC775-C286-4358-8C92-D7E584E969B3}" type="datetimeFigureOut">
               <a:rPr lang="en-US" smtClean="0"/>
-              <a:t>7/5/2016</a:t>
+              <a:t>1/29/2017</a:t>
             </a:fld>
             <a:endParaRPr lang="en-US"/>
           </a:p>
@@ -4250,7 +5297,7 @@
           <a:p>
             <a:fld id="{699DC775-C286-4358-8C92-D7E584E969B3}" type="datetimeFigureOut">
               <a:rPr lang="en-US" smtClean="0"/>
-              <a:t>7/5/2016</a:t>
+              <a:t>1/29/2017</a:t>
             </a:fld>
             <a:endParaRPr lang="en-US"/>
           </a:p>
@@ -4677,7 +5724,7 @@
           <a:p>
             <a:fld id="{699DC775-C286-4358-8C92-D7E584E969B3}" type="datetimeFigureOut">
               <a:rPr lang="en-US" smtClean="0"/>
-              <a:t>7/5/2016</a:t>
+              <a:t>1/29/2017</a:t>
             </a:fld>
             <a:endParaRPr lang="en-US"/>
           </a:p>
@@ -4802,7 +5849,7 @@
           <a:p>
             <a:fld id="{699DC775-C286-4358-8C92-D7E584E969B3}" type="datetimeFigureOut">
               <a:rPr lang="en-US" smtClean="0"/>
-              <a:t>7/5/2016</a:t>
+              <a:t>1/29/2017</a:t>
             </a:fld>
             <a:endParaRPr lang="en-US"/>
           </a:p>
@@ -4905,7 +5952,7 @@
           <a:p>
             <a:fld id="{699DC775-C286-4358-8C92-D7E584E969B3}" type="datetimeFigureOut">
               <a:rPr lang="en-US" smtClean="0"/>
-              <a:t>7/5/2016</a:t>
+              <a:t>1/29/2017</a:t>
             </a:fld>
             <a:endParaRPr lang="en-US"/>
           </a:p>
@@ -5150,7 +6197,7 @@
           <a:p>
             <a:fld id="{699DC775-C286-4358-8C92-D7E584E969B3}" type="datetimeFigureOut">
               <a:rPr lang="en-US" smtClean="0"/>
-              <a:t>7/5/2016</a:t>
+              <a:t>1/29/2017</a:t>
             </a:fld>
             <a:endParaRPr lang="en-US"/>
           </a:p>
@@ -5433,7 +6480,7 @@
           <a:p>
             <a:fld id="{699DC775-C286-4358-8C92-D7E584E969B3}" type="datetimeFigureOut">
               <a:rPr lang="en-US" smtClean="0"/>
-              <a:t>7/5/2016</a:t>
+              <a:t>1/29/2017</a:t>
             </a:fld>
             <a:endParaRPr lang="en-US"/>
           </a:p>
@@ -5693,7 +6740,7 @@
           <a:p>
             <a:fld id="{699DC775-C286-4358-8C92-D7E584E969B3}" type="datetimeFigureOut">
               <a:rPr lang="en-US" smtClean="0"/>
-              <a:t>7/5/2016</a:t>
+              <a:t>1/29/2017</a:t>
             </a:fld>
             <a:endParaRPr lang="en-US"/>
           </a:p>
@@ -5869,7 +6916,7 @@
           <a:p>
             <a:fld id="{699DC775-C286-4358-8C92-D7E584E969B3}" type="datetimeFigureOut">
               <a:rPr lang="en-US" smtClean="0"/>
-              <a:t>7/5/2016</a:t>
+              <a:t>1/29/2017</a:t>
             </a:fld>
             <a:endParaRPr lang="en-US"/>
           </a:p>
@@ -6055,7 +7102,7 @@
           <a:p>
             <a:fld id="{699DC775-C286-4358-8C92-D7E584E969B3}" type="datetimeFigureOut">
               <a:rPr lang="en-US" smtClean="0"/>
-              <a:t>7/5/2016</a:t>
+              <a:t>1/29/2017</a:t>
             </a:fld>
             <a:endParaRPr lang="en-US"/>
           </a:p>
@@ -6340,7 +7387,7 @@
           <a:p>
             <a:fld id="{699DC775-C286-4358-8C92-D7E584E969B3}" type="datetimeFigureOut">
               <a:rPr lang="en-US" smtClean="0"/>
-              <a:t>7/5/2016</a:t>
+              <a:t>1/29/2017</a:t>
             </a:fld>
             <a:endParaRPr lang="en-US"/>
           </a:p>
@@ -6759,7 +7806,7 @@
           <a:p>
             <a:fld id="{699DC775-C286-4358-8C92-D7E584E969B3}" type="datetimeFigureOut">
               <a:rPr lang="en-US" smtClean="0"/>
-              <a:t>7/5/2016</a:t>
+              <a:t>1/29/2017</a:t>
             </a:fld>
             <a:endParaRPr lang="en-US"/>
           </a:p>
@@ -6876,7 +7923,7 @@
           <a:p>
             <a:fld id="{699DC775-C286-4358-8C92-D7E584E969B3}" type="datetimeFigureOut">
               <a:rPr lang="en-US" smtClean="0"/>
-              <a:t>7/5/2016</a:t>
+              <a:t>1/29/2017</a:t>
             </a:fld>
             <a:endParaRPr lang="en-US"/>
           </a:p>
@@ -6971,7 +8018,7 @@
           <a:p>
             <a:fld id="{699DC775-C286-4358-8C92-D7E584E969B3}" type="datetimeFigureOut">
               <a:rPr lang="en-US" smtClean="0"/>
-              <a:t>7/5/2016</a:t>
+              <a:t>1/29/2017</a:t>
             </a:fld>
             <a:endParaRPr lang="en-US"/>
           </a:p>
@@ -7246,7 +8293,7 @@
           <a:p>
             <a:fld id="{699DC775-C286-4358-8C92-D7E584E969B3}" type="datetimeFigureOut">
               <a:rPr lang="en-US" smtClean="0"/>
-              <a:t>7/5/2016</a:t>
+              <a:t>1/29/2017</a:t>
             </a:fld>
             <a:endParaRPr lang="en-US"/>
           </a:p>
@@ -7498,7 +8545,7 @@
           <a:p>
             <a:fld id="{699DC775-C286-4358-8C92-D7E584E969B3}" type="datetimeFigureOut">
               <a:rPr lang="en-US" smtClean="0"/>
-              <a:t>7/5/2016</a:t>
+              <a:t>1/29/2017</a:t>
             </a:fld>
             <a:endParaRPr lang="en-US"/>
           </a:p>
@@ -7709,7 +8756,7 @@
           <a:p>
             <a:fld id="{699DC775-C286-4358-8C92-D7E584E969B3}" type="datetimeFigureOut">
               <a:rPr lang="en-US" smtClean="0"/>
-              <a:t>7/5/2016</a:t>
+              <a:t>1/29/2017</a:t>
             </a:fld>
             <a:endParaRPr lang="en-US"/>
           </a:p>
@@ -8222,7 +9269,7 @@
           <a:p>
             <a:fld id="{699DC775-C286-4358-8C92-D7E584E969B3}" type="datetimeFigureOut">
               <a:rPr lang="en-US" smtClean="0"/>
-              <a:t>7/5/2016</a:t>
+              <a:t>1/29/2017</a:t>
             </a:fld>
             <a:endParaRPr lang="en-US"/>
           </a:p>
@@ -8733,7 +9780,7 @@
           <a:p>
             <a:fld id="{699DC775-C286-4358-8C92-D7E584E969B3}" type="datetimeFigureOut">
               <a:rPr lang="en-US" smtClean="0"/>
-              <a:t>7/5/2016</a:t>
+              <a:t>1/29/2017</a:t>
             </a:fld>
             <a:endParaRPr lang="en-US"/>
           </a:p>
@@ -9243,6 +10290,1069 @@
 </file>
 
 <file path=ppt/slides/slide10.xml><?xml version="1.0" encoding="utf-8"?>
+<p:sld xmlns:a="http://schemas.openxmlformats.org/drawingml/2006/main" xmlns:r="http://schemas.openxmlformats.org/officeDocument/2006/relationships" xmlns:p="http://schemas.openxmlformats.org/presentationml/2006/main">
+  <p:cSld>
+    <p:spTree>
+      <p:nvGrpSpPr>
+        <p:cNvPr id="1" name=""/>
+        <p:cNvGrpSpPr/>
+        <p:nvPr/>
+      </p:nvGrpSpPr>
+      <p:grpSpPr>
+        <a:xfrm>
+          <a:off x="0" y="0"/>
+          <a:ext cx="0" cy="0"/>
+          <a:chOff x="0" y="0"/>
+          <a:chExt cx="0" cy="0"/>
+        </a:xfrm>
+      </p:grpSpPr>
+      <p:sp>
+        <p:nvSpPr>
+          <p:cNvPr id="18" name="Triangle"/>
+          <p:cNvSpPr/>
+          <p:nvPr/>
+        </p:nvSpPr>
+        <p:spPr>
+          <a:xfrm>
+            <a:off x="3086100" y="3962400"/>
+            <a:ext cx="2743200" cy="2743200"/>
+          </a:xfrm>
+          <a:prstGeom prst="triangle">
+            <a:avLst/>
+          </a:prstGeom>
+        </p:spPr>
+        <p:style>
+          <a:lnRef idx="2">
+            <a:schemeClr val="accent1">
+              <a:shade val="50000"/>
+            </a:schemeClr>
+          </a:lnRef>
+          <a:fillRef idx="1">
+            <a:schemeClr val="accent1"/>
+          </a:fillRef>
+          <a:effectRef idx="0">
+            <a:schemeClr val="accent1"/>
+          </a:effectRef>
+          <a:fontRef idx="minor">
+            <a:schemeClr val="lt1"/>
+          </a:fontRef>
+        </p:style>
+        <p:txBody>
+          <a:bodyPr rtlCol="0" anchor="ctr"/>
+          <a:lstStyle/>
+          <a:p>
+            <a:pPr algn="ctr"/>
+            <a:endParaRPr lang="zh-CN" altLang="en-US"/>
+          </a:p>
+        </p:txBody>
+      </p:sp>
+      <p:sp>
+        <p:nvSpPr>
+          <p:cNvPr id="16" name="Target"/>
+          <p:cNvSpPr/>
+          <p:nvPr/>
+        </p:nvSpPr>
+        <p:spPr>
+          <a:xfrm rot="10725280">
+            <a:off x="1579973" y="2641764"/>
+            <a:ext cx="1066800" cy="1066800"/>
+          </a:xfrm>
+          <a:prstGeom prst="ellipse">
+            <a:avLst/>
+          </a:prstGeom>
+          <a:solidFill>
+            <a:srgbClr val="00B050"/>
+          </a:solidFill>
+        </p:spPr>
+        <p:style>
+          <a:lnRef idx="2">
+            <a:schemeClr val="accent1">
+              <a:shade val="50000"/>
+            </a:schemeClr>
+          </a:lnRef>
+          <a:fillRef idx="1">
+            <a:schemeClr val="accent1"/>
+          </a:fillRef>
+          <a:effectRef idx="0">
+            <a:schemeClr val="accent1"/>
+          </a:effectRef>
+          <a:fontRef idx="minor">
+            <a:schemeClr val="lt1"/>
+          </a:fontRef>
+        </p:style>
+        <p:txBody>
+          <a:bodyPr rtlCol="0" anchor="ctr"/>
+          <a:lstStyle/>
+          <a:p>
+            <a:pPr algn="ctr"/>
+            <a:endParaRPr lang="zh-CN" altLang="en-US"/>
+          </a:p>
+        </p:txBody>
+      </p:sp>
+      <p:sp>
+        <p:nvSpPr>
+          <p:cNvPr id="14" name="Rectangle"/>
+          <p:cNvSpPr/>
+          <p:nvPr/>
+        </p:nvSpPr>
+        <p:spPr>
+          <a:xfrm>
+            <a:off x="3429000" y="2438400"/>
+            <a:ext cx="2057400" cy="1371600"/>
+          </a:xfrm>
+          <a:prstGeom prst="rect">
+            <a:avLst/>
+          </a:prstGeom>
+          <a:solidFill>
+            <a:srgbClr val="FF0000"/>
+          </a:solidFill>
+        </p:spPr>
+        <p:style>
+          <a:lnRef idx="2">
+            <a:schemeClr val="accent1">
+              <a:shade val="50000"/>
+            </a:schemeClr>
+          </a:lnRef>
+          <a:fillRef idx="1">
+            <a:schemeClr val="accent1"/>
+          </a:fillRef>
+          <a:effectRef idx="0">
+            <a:schemeClr val="accent1"/>
+          </a:effectRef>
+          <a:fontRef idx="minor">
+            <a:schemeClr val="lt1"/>
+          </a:fontRef>
+        </p:style>
+        <p:txBody>
+          <a:bodyPr rtlCol="0" anchor="ctr"/>
+          <a:lstStyle/>
+          <a:p>
+            <a:pPr algn="ctr"/>
+            <a:endParaRPr lang="zh-CN" altLang="en-US"/>
+          </a:p>
+        </p:txBody>
+      </p:sp>
+      <p:sp>
+        <p:nvSpPr>
+          <p:cNvPr id="17" name="Oval"/>
+          <p:cNvSpPr/>
+          <p:nvPr/>
+        </p:nvSpPr>
+        <p:spPr>
+          <a:xfrm>
+            <a:off x="6269182" y="2590800"/>
+            <a:ext cx="1066800" cy="1066800"/>
+          </a:xfrm>
+          <a:prstGeom prst="ellipse">
+            <a:avLst/>
+          </a:prstGeom>
+        </p:spPr>
+        <p:style>
+          <a:lnRef idx="2">
+            <a:schemeClr val="accent1">
+              <a:shade val="50000"/>
+            </a:schemeClr>
+          </a:lnRef>
+          <a:fillRef idx="1">
+            <a:schemeClr val="accent1"/>
+          </a:fillRef>
+          <a:effectRef idx="0">
+            <a:schemeClr val="accent1"/>
+          </a:effectRef>
+          <a:fontRef idx="minor">
+            <a:schemeClr val="lt1"/>
+          </a:fontRef>
+        </p:style>
+        <p:txBody>
+          <a:bodyPr rtlCol="0" anchor="ctr"/>
+          <a:lstStyle/>
+          <a:p>
+            <a:pPr algn="ctr"/>
+            <a:endParaRPr lang="zh-CN" altLang="en-US"/>
+          </a:p>
+        </p:txBody>
+      </p:sp>
+    </p:spTree>
+    <p:extLst>
+      <p:ext uri="{BB962C8B-B14F-4D97-AF65-F5344CB8AC3E}">
+        <p14:creationId xmlns:p14="http://schemas.microsoft.com/office/powerpoint/2010/main" val="2402637234"/>
+      </p:ext>
+    </p:extLst>
+  </p:cSld>
+  <p:clrMapOvr>
+    <a:masterClrMapping/>
+  </p:clrMapOvr>
+  <p:timing>
+    <p:tnLst>
+      <p:par>
+        <p:cTn id="1" dur="indefinite" restart="never" nodeType="tmRoot"/>
+      </p:par>
+    </p:tnLst>
+  </p:timing>
+</p:sld>
+</file>
+
+<file path=ppt/slides/slide11.xml><?xml version="1.0" encoding="utf-8"?>
+<p:sld xmlns:a="http://schemas.openxmlformats.org/drawingml/2006/main" xmlns:r="http://schemas.openxmlformats.org/officeDocument/2006/relationships" xmlns:p="http://schemas.openxmlformats.org/presentationml/2006/main">
+  <p:cSld>
+    <p:spTree>
+      <p:nvGrpSpPr>
+        <p:cNvPr id="1" name=""/>
+        <p:cNvGrpSpPr/>
+        <p:nvPr/>
+      </p:nvGrpSpPr>
+      <p:grpSpPr>
+        <a:xfrm>
+          <a:off x="0" y="0"/>
+          <a:ext cx="0" cy="0"/>
+          <a:chOff x="0" y="0"/>
+          <a:chExt cx="0" cy="0"/>
+        </a:xfrm>
+      </p:grpSpPr>
+      <p:sp>
+        <p:nvSpPr>
+          <p:cNvPr id="9" name="Triangle"/>
+          <p:cNvSpPr/>
+          <p:nvPr/>
+        </p:nvSpPr>
+        <p:spPr>
+          <a:xfrm>
+            <a:off x="3086100" y="3962400"/>
+            <a:ext cx="2743200" cy="2743200"/>
+          </a:xfrm>
+          <a:prstGeom prst="triangle">
+            <a:avLst/>
+          </a:prstGeom>
+        </p:spPr>
+        <p:style>
+          <a:lnRef idx="2">
+            <a:schemeClr val="accent1">
+              <a:shade val="50000"/>
+            </a:schemeClr>
+          </a:lnRef>
+          <a:fillRef idx="1">
+            <a:schemeClr val="accent1"/>
+          </a:fillRef>
+          <a:effectRef idx="0">
+            <a:schemeClr val="accent1"/>
+          </a:effectRef>
+          <a:fontRef idx="minor">
+            <a:schemeClr val="lt1"/>
+          </a:fontRef>
+        </p:style>
+        <p:txBody>
+          <a:bodyPr rtlCol="0" anchor="ctr"/>
+          <a:lstStyle/>
+          <a:p>
+            <a:pPr algn="ctr"/>
+            <a:endParaRPr lang="zh-CN" altLang="en-US"/>
+          </a:p>
+        </p:txBody>
+      </p:sp>
+      <p:sp>
+        <p:nvSpPr>
+          <p:cNvPr id="18" name="Triangle"/>
+          <p:cNvSpPr/>
+          <p:nvPr/>
+        </p:nvSpPr>
+        <p:spPr>
+          <a:xfrm>
+            <a:off x="3034558" y="-456598"/>
+            <a:ext cx="2743200" cy="2743200"/>
+          </a:xfrm>
+          <a:prstGeom prst="triangle">
+            <a:avLst/>
+          </a:prstGeom>
+        </p:spPr>
+        <p:style>
+          <a:lnRef idx="2">
+            <a:schemeClr val="accent1">
+              <a:shade val="50000"/>
+            </a:schemeClr>
+          </a:lnRef>
+          <a:fillRef idx="1">
+            <a:schemeClr val="accent1"/>
+          </a:fillRef>
+          <a:effectRef idx="0">
+            <a:schemeClr val="accent1"/>
+          </a:effectRef>
+          <a:fontRef idx="minor">
+            <a:schemeClr val="lt1"/>
+          </a:fontRef>
+        </p:style>
+        <p:txBody>
+          <a:bodyPr rtlCol="0" anchor="ctr"/>
+          <a:lstStyle/>
+          <a:p>
+            <a:pPr algn="ctr"/>
+            <a:endParaRPr lang="zh-CN" altLang="en-US"/>
+          </a:p>
+        </p:txBody>
+      </p:sp>
+      <p:sp>
+        <p:nvSpPr>
+          <p:cNvPr id="16" name="Target"/>
+          <p:cNvSpPr/>
+          <p:nvPr/>
+        </p:nvSpPr>
+        <p:spPr>
+          <a:xfrm rot="10725280">
+            <a:off x="1579973" y="2641764"/>
+            <a:ext cx="1066800" cy="1066800"/>
+          </a:xfrm>
+          <a:prstGeom prst="ellipse">
+            <a:avLst/>
+          </a:prstGeom>
+          <a:solidFill>
+            <a:srgbClr val="00B050"/>
+          </a:solidFill>
+        </p:spPr>
+        <p:style>
+          <a:lnRef idx="2">
+            <a:schemeClr val="accent1">
+              <a:shade val="50000"/>
+            </a:schemeClr>
+          </a:lnRef>
+          <a:fillRef idx="1">
+            <a:schemeClr val="accent1"/>
+          </a:fillRef>
+          <a:effectRef idx="0">
+            <a:schemeClr val="accent1"/>
+          </a:effectRef>
+          <a:fontRef idx="minor">
+            <a:schemeClr val="lt1"/>
+          </a:fontRef>
+        </p:style>
+        <p:txBody>
+          <a:bodyPr rtlCol="0" anchor="ctr"/>
+          <a:lstStyle/>
+          <a:p>
+            <a:pPr algn="ctr"/>
+            <a:endParaRPr lang="zh-CN" altLang="en-US"/>
+          </a:p>
+        </p:txBody>
+      </p:sp>
+      <p:sp>
+        <p:nvSpPr>
+          <p:cNvPr id="14" name="Rectangle"/>
+          <p:cNvSpPr/>
+          <p:nvPr/>
+        </p:nvSpPr>
+        <p:spPr>
+          <a:xfrm>
+            <a:off x="3429000" y="2438400"/>
+            <a:ext cx="2057400" cy="1371600"/>
+          </a:xfrm>
+          <a:prstGeom prst="rect">
+            <a:avLst/>
+          </a:prstGeom>
+          <a:solidFill>
+            <a:srgbClr val="FF0000"/>
+          </a:solidFill>
+        </p:spPr>
+        <p:style>
+          <a:lnRef idx="2">
+            <a:schemeClr val="accent1">
+              <a:shade val="50000"/>
+            </a:schemeClr>
+          </a:lnRef>
+          <a:fillRef idx="1">
+            <a:schemeClr val="accent1"/>
+          </a:fillRef>
+          <a:effectRef idx="0">
+            <a:schemeClr val="accent1"/>
+          </a:effectRef>
+          <a:fontRef idx="minor">
+            <a:schemeClr val="lt1"/>
+          </a:fontRef>
+        </p:style>
+        <p:txBody>
+          <a:bodyPr rtlCol="0" anchor="ctr"/>
+          <a:lstStyle/>
+          <a:p>
+            <a:pPr algn="ctr"/>
+            <a:endParaRPr lang="zh-CN" altLang="en-US"/>
+          </a:p>
+        </p:txBody>
+      </p:sp>
+      <p:sp>
+        <p:nvSpPr>
+          <p:cNvPr id="8" name="Oval"/>
+          <p:cNvSpPr/>
+          <p:nvPr/>
+        </p:nvSpPr>
+        <p:spPr>
+          <a:xfrm>
+            <a:off x="6269182" y="2590800"/>
+            <a:ext cx="1066800" cy="1066800"/>
+          </a:xfrm>
+          <a:prstGeom prst="ellipse">
+            <a:avLst/>
+          </a:prstGeom>
+        </p:spPr>
+        <p:style>
+          <a:lnRef idx="2">
+            <a:schemeClr val="accent1">
+              <a:shade val="50000"/>
+            </a:schemeClr>
+          </a:lnRef>
+          <a:fillRef idx="1">
+            <a:schemeClr val="accent1"/>
+          </a:fillRef>
+          <a:effectRef idx="0">
+            <a:schemeClr val="accent1"/>
+          </a:effectRef>
+          <a:fontRef idx="minor">
+            <a:schemeClr val="lt1"/>
+          </a:fontRef>
+        </p:style>
+        <p:txBody>
+          <a:bodyPr rtlCol="0" anchor="ctr"/>
+          <a:lstStyle/>
+          <a:p>
+            <a:pPr algn="ctr"/>
+            <a:endParaRPr lang="zh-CN" altLang="en-US"/>
+          </a:p>
+        </p:txBody>
+      </p:sp>
+      <p:sp>
+        <p:nvSpPr>
+          <p:cNvPr id="17" name="Oval"/>
+          <p:cNvSpPr/>
+          <p:nvPr/>
+        </p:nvSpPr>
+        <p:spPr>
+          <a:xfrm>
+            <a:off x="1580059" y="2645492"/>
+            <a:ext cx="1066800" cy="1066800"/>
+          </a:xfrm>
+          <a:prstGeom prst="ellipse">
+            <a:avLst/>
+          </a:prstGeom>
+        </p:spPr>
+        <p:style>
+          <a:lnRef idx="2">
+            <a:schemeClr val="accent1">
+              <a:shade val="50000"/>
+            </a:schemeClr>
+          </a:lnRef>
+          <a:fillRef idx="1">
+            <a:schemeClr val="accent1"/>
+          </a:fillRef>
+          <a:effectRef idx="0">
+            <a:schemeClr val="accent1"/>
+          </a:effectRef>
+          <a:fontRef idx="minor">
+            <a:schemeClr val="lt1"/>
+          </a:fontRef>
+        </p:style>
+        <p:txBody>
+          <a:bodyPr rtlCol="0" anchor="ctr"/>
+          <a:lstStyle/>
+          <a:p>
+            <a:pPr algn="ctr"/>
+            <a:endParaRPr lang="zh-CN" altLang="en-US"/>
+          </a:p>
+        </p:txBody>
+      </p:sp>
+    </p:spTree>
+    <p:extLst>
+      <p:ext uri="{BB962C8B-B14F-4D97-AF65-F5344CB8AC3E}">
+        <p14:creationId xmlns:p14="http://schemas.microsoft.com/office/powerpoint/2010/main" val="3779085156"/>
+      </p:ext>
+    </p:extLst>
+  </p:cSld>
+  <p:clrMapOvr>
+    <a:masterClrMapping/>
+  </p:clrMapOvr>
+  <p:timing>
+    <p:tnLst>
+      <p:par>
+        <p:cTn id="1" dur="indefinite" restart="never" nodeType="tmRoot"/>
+      </p:par>
+    </p:tnLst>
+  </p:timing>
+</p:sld>
+</file>
+
+<file path=ppt/slides/slide12.xml><?xml version="1.0" encoding="utf-8"?>
+<p:sld xmlns:a="http://schemas.openxmlformats.org/drawingml/2006/main" xmlns:r="http://schemas.openxmlformats.org/officeDocument/2006/relationships" xmlns:p="http://schemas.openxmlformats.org/presentationml/2006/main">
+  <p:cSld>
+    <p:bg>
+      <p:bgPr>
+        <a:solidFill>
+          <a:srgbClr val="0070C0"/>
+        </a:solidFill>
+        <a:effectLst/>
+      </p:bgPr>
+    </p:bg>
+    <p:spTree>
+      <p:nvGrpSpPr>
+        <p:cNvPr id="1" name=""/>
+        <p:cNvGrpSpPr/>
+        <p:nvPr/>
+      </p:nvGrpSpPr>
+      <p:grpSpPr>
+        <a:xfrm>
+          <a:off x="0" y="0"/>
+          <a:ext cx="0" cy="0"/>
+          <a:chOff x="0" y="0"/>
+          <a:chExt cx="0" cy="0"/>
+        </a:xfrm>
+      </p:grpSpPr>
+      <p:sp>
+        <p:nvSpPr>
+          <p:cNvPr id="4" name="Title 1"/>
+          <p:cNvSpPr>
+            <a:spLocks noGrp="1"/>
+          </p:cNvSpPr>
+          <p:nvPr>
+            <p:ph type="title"/>
+          </p:nvPr>
+        </p:nvSpPr>
+        <p:spPr>
+          <a:xfrm>
+            <a:off x="304800" y="1066800"/>
+            <a:ext cx="8229600" cy="1143000"/>
+          </a:xfrm>
+        </p:spPr>
+        <p:txBody>
+          <a:bodyPr>
+            <a:normAutofit fontScale="90000"/>
+          </a:bodyPr>
+          <a:lstStyle/>
+          <a:p>
+            <a:r>
+              <a:rPr lang="en-US" altLang="zh-CN" dirty="0">
+                <a:solidFill>
+                  <a:schemeClr val="bg1"/>
+                </a:solidFill>
+              </a:rPr>
+              <a:t>Duplicate and Rotate:: </a:t>
+            </a:r>
+            <a:r>
+              <a:rPr lang="en-US" altLang="zh-CN" dirty="0" smtClean="0">
+                <a:solidFill>
+                  <a:schemeClr val="bg1"/>
+                </a:solidFill>
+              </a:rPr>
+              <a:t>Multiple Shape (Dynamic)</a:t>
+            </a:r>
+            <a:endParaRPr lang="en-SG" dirty="0">
+              <a:solidFill>
+                <a:schemeClr val="bg1"/>
+              </a:solidFill>
+            </a:endParaRPr>
+          </a:p>
+        </p:txBody>
+      </p:sp>
+    </p:spTree>
+    <p:extLst>
+      <p:ext uri="{BB962C8B-B14F-4D97-AF65-F5344CB8AC3E}">
+        <p14:creationId xmlns:p14="http://schemas.microsoft.com/office/powerpoint/2010/main" val="795825067"/>
+      </p:ext>
+    </p:extLst>
+  </p:cSld>
+  <p:clrMapOvr>
+    <a:masterClrMapping/>
+  </p:clrMapOvr>
+  <p:timing>
+    <p:tnLst>
+      <p:par>
+        <p:cTn id="1" dur="indefinite" restart="never" nodeType="tmRoot"/>
+      </p:par>
+    </p:tnLst>
+  </p:timing>
+</p:sld>
+</file>
+
+<file path=ppt/slides/slide13.xml><?xml version="1.0" encoding="utf-8"?>
+<p:sld xmlns:a="http://schemas.openxmlformats.org/drawingml/2006/main" xmlns:r="http://schemas.openxmlformats.org/officeDocument/2006/relationships" xmlns:p="http://schemas.openxmlformats.org/presentationml/2006/main">
+  <p:cSld>
+    <p:spTree>
+      <p:nvGrpSpPr>
+        <p:cNvPr id="1" name=""/>
+        <p:cNvGrpSpPr/>
+        <p:nvPr/>
+      </p:nvGrpSpPr>
+      <p:grpSpPr>
+        <a:xfrm>
+          <a:off x="0" y="0"/>
+          <a:ext cx="0" cy="0"/>
+          <a:chOff x="0" y="0"/>
+          <a:chExt cx="0" cy="0"/>
+        </a:xfrm>
+      </p:grpSpPr>
+      <p:sp>
+        <p:nvSpPr>
+          <p:cNvPr id="18" name="Triangle"/>
+          <p:cNvSpPr/>
+          <p:nvPr/>
+        </p:nvSpPr>
+        <p:spPr>
+          <a:xfrm>
+            <a:off x="3086100" y="3962400"/>
+            <a:ext cx="2743200" cy="2743200"/>
+          </a:xfrm>
+          <a:prstGeom prst="triangle">
+            <a:avLst/>
+          </a:prstGeom>
+        </p:spPr>
+        <p:style>
+          <a:lnRef idx="2">
+            <a:schemeClr val="accent1">
+              <a:shade val="50000"/>
+            </a:schemeClr>
+          </a:lnRef>
+          <a:fillRef idx="1">
+            <a:schemeClr val="accent1"/>
+          </a:fillRef>
+          <a:effectRef idx="0">
+            <a:schemeClr val="accent1"/>
+          </a:effectRef>
+          <a:fontRef idx="minor">
+            <a:schemeClr val="lt1"/>
+          </a:fontRef>
+        </p:style>
+        <p:txBody>
+          <a:bodyPr rtlCol="0" anchor="ctr"/>
+          <a:lstStyle/>
+          <a:p>
+            <a:pPr algn="ctr"/>
+            <a:endParaRPr lang="zh-CN" altLang="en-US"/>
+          </a:p>
+        </p:txBody>
+      </p:sp>
+      <p:sp>
+        <p:nvSpPr>
+          <p:cNvPr id="16" name="Target"/>
+          <p:cNvSpPr/>
+          <p:nvPr/>
+        </p:nvSpPr>
+        <p:spPr>
+          <a:xfrm rot="10725280">
+            <a:off x="1579973" y="2641764"/>
+            <a:ext cx="1066800" cy="1066800"/>
+          </a:xfrm>
+          <a:prstGeom prst="ellipse">
+            <a:avLst/>
+          </a:prstGeom>
+          <a:solidFill>
+            <a:srgbClr val="00B050"/>
+          </a:solidFill>
+        </p:spPr>
+        <p:style>
+          <a:lnRef idx="2">
+            <a:schemeClr val="accent1">
+              <a:shade val="50000"/>
+            </a:schemeClr>
+          </a:lnRef>
+          <a:fillRef idx="1">
+            <a:schemeClr val="accent1"/>
+          </a:fillRef>
+          <a:effectRef idx="0">
+            <a:schemeClr val="accent1"/>
+          </a:effectRef>
+          <a:fontRef idx="minor">
+            <a:schemeClr val="lt1"/>
+          </a:fontRef>
+        </p:style>
+        <p:txBody>
+          <a:bodyPr rtlCol="0" anchor="ctr"/>
+          <a:lstStyle/>
+          <a:p>
+            <a:pPr algn="ctr"/>
+            <a:endParaRPr lang="zh-CN" altLang="en-US"/>
+          </a:p>
+        </p:txBody>
+      </p:sp>
+      <p:sp>
+        <p:nvSpPr>
+          <p:cNvPr id="14" name="Rectangle"/>
+          <p:cNvSpPr/>
+          <p:nvPr/>
+        </p:nvSpPr>
+        <p:spPr>
+          <a:xfrm>
+            <a:off x="3429000" y="2438400"/>
+            <a:ext cx="2057400" cy="1371600"/>
+          </a:xfrm>
+          <a:prstGeom prst="rect">
+            <a:avLst/>
+          </a:prstGeom>
+          <a:solidFill>
+            <a:srgbClr val="FF0000"/>
+          </a:solidFill>
+        </p:spPr>
+        <p:style>
+          <a:lnRef idx="2">
+            <a:schemeClr val="accent1">
+              <a:shade val="50000"/>
+            </a:schemeClr>
+          </a:lnRef>
+          <a:fillRef idx="1">
+            <a:schemeClr val="accent1"/>
+          </a:fillRef>
+          <a:effectRef idx="0">
+            <a:schemeClr val="accent1"/>
+          </a:effectRef>
+          <a:fontRef idx="minor">
+            <a:schemeClr val="lt1"/>
+          </a:fontRef>
+        </p:style>
+        <p:txBody>
+          <a:bodyPr rtlCol="0" anchor="ctr"/>
+          <a:lstStyle/>
+          <a:p>
+            <a:pPr algn="ctr"/>
+            <a:endParaRPr lang="zh-CN" altLang="en-US"/>
+          </a:p>
+        </p:txBody>
+      </p:sp>
+      <p:sp>
+        <p:nvSpPr>
+          <p:cNvPr id="17" name="Oval"/>
+          <p:cNvSpPr/>
+          <p:nvPr/>
+        </p:nvSpPr>
+        <p:spPr>
+          <a:xfrm>
+            <a:off x="6269182" y="2590800"/>
+            <a:ext cx="1066800" cy="1066800"/>
+          </a:xfrm>
+          <a:prstGeom prst="ellipse">
+            <a:avLst/>
+          </a:prstGeom>
+        </p:spPr>
+        <p:style>
+          <a:lnRef idx="2">
+            <a:schemeClr val="accent1">
+              <a:shade val="50000"/>
+            </a:schemeClr>
+          </a:lnRef>
+          <a:fillRef idx="1">
+            <a:schemeClr val="accent1"/>
+          </a:fillRef>
+          <a:effectRef idx="0">
+            <a:schemeClr val="accent1"/>
+          </a:effectRef>
+          <a:fontRef idx="minor">
+            <a:schemeClr val="lt1"/>
+          </a:fontRef>
+        </p:style>
+        <p:txBody>
+          <a:bodyPr rtlCol="0" anchor="ctr"/>
+          <a:lstStyle/>
+          <a:p>
+            <a:pPr algn="ctr"/>
+            <a:endParaRPr lang="zh-CN" altLang="en-US"/>
+          </a:p>
+        </p:txBody>
+      </p:sp>
+    </p:spTree>
+    <p:extLst>
+      <p:ext uri="{BB962C8B-B14F-4D97-AF65-F5344CB8AC3E}">
+        <p14:creationId xmlns:p14="http://schemas.microsoft.com/office/powerpoint/2010/main" val="3831418678"/>
+      </p:ext>
+    </p:extLst>
+  </p:cSld>
+  <p:clrMapOvr>
+    <a:masterClrMapping/>
+  </p:clrMapOvr>
+  <p:timing>
+    <p:tnLst>
+      <p:par>
+        <p:cTn id="1" dur="indefinite" restart="never" nodeType="tmRoot"/>
+      </p:par>
+    </p:tnLst>
+  </p:timing>
+</p:sld>
+</file>
+
+<file path=ppt/slides/slide14.xml><?xml version="1.0" encoding="utf-8"?>
+<p:sld xmlns:a="http://schemas.openxmlformats.org/drawingml/2006/main" xmlns:r="http://schemas.openxmlformats.org/officeDocument/2006/relationships" xmlns:p="http://schemas.openxmlformats.org/presentationml/2006/main">
+  <p:cSld>
+    <p:spTree>
+      <p:nvGrpSpPr>
+        <p:cNvPr id="1" name=""/>
+        <p:cNvGrpSpPr/>
+        <p:nvPr/>
+      </p:nvGrpSpPr>
+      <p:grpSpPr>
+        <a:xfrm>
+          <a:off x="0" y="0"/>
+          <a:ext cx="0" cy="0"/>
+          <a:chOff x="0" y="0"/>
+          <a:chExt cx="0" cy="0"/>
+        </a:xfrm>
+      </p:grpSpPr>
+      <p:sp>
+        <p:nvSpPr>
+          <p:cNvPr id="7" name="Triangle"/>
+          <p:cNvSpPr/>
+          <p:nvPr/>
+        </p:nvSpPr>
+        <p:spPr>
+          <a:xfrm>
+            <a:off x="3086100" y="3962400"/>
+            <a:ext cx="2743200" cy="2743200"/>
+          </a:xfrm>
+          <a:prstGeom prst="triangle">
+            <a:avLst/>
+          </a:prstGeom>
+        </p:spPr>
+        <p:style>
+          <a:lnRef idx="2">
+            <a:schemeClr val="accent1">
+              <a:shade val="50000"/>
+            </a:schemeClr>
+          </a:lnRef>
+          <a:fillRef idx="1">
+            <a:schemeClr val="accent1"/>
+          </a:fillRef>
+          <a:effectRef idx="0">
+            <a:schemeClr val="accent1"/>
+          </a:effectRef>
+          <a:fontRef idx="minor">
+            <a:schemeClr val="lt1"/>
+          </a:fontRef>
+        </p:style>
+        <p:txBody>
+          <a:bodyPr rtlCol="0" anchor="ctr"/>
+          <a:lstStyle/>
+          <a:p>
+            <a:pPr algn="ctr"/>
+            <a:endParaRPr lang="zh-CN" altLang="en-US"/>
+          </a:p>
+        </p:txBody>
+      </p:sp>
+      <p:sp>
+        <p:nvSpPr>
+          <p:cNvPr id="18" name="Triangle"/>
+          <p:cNvSpPr/>
+          <p:nvPr/>
+        </p:nvSpPr>
+        <p:spPr>
+          <a:xfrm rot="10720789">
+            <a:off x="3035186" y="-456611"/>
+            <a:ext cx="2743200" cy="2743200"/>
+          </a:xfrm>
+          <a:prstGeom prst="triangle">
+            <a:avLst/>
+          </a:prstGeom>
+        </p:spPr>
+        <p:style>
+          <a:lnRef idx="2">
+            <a:schemeClr val="accent1">
+              <a:shade val="50000"/>
+            </a:schemeClr>
+          </a:lnRef>
+          <a:fillRef idx="1">
+            <a:schemeClr val="accent1"/>
+          </a:fillRef>
+          <a:effectRef idx="0">
+            <a:schemeClr val="accent1"/>
+          </a:effectRef>
+          <a:fontRef idx="minor">
+            <a:schemeClr val="lt1"/>
+          </a:fontRef>
+        </p:style>
+        <p:txBody>
+          <a:bodyPr rtlCol="0" anchor="ctr"/>
+          <a:lstStyle/>
+          <a:p>
+            <a:pPr algn="ctr"/>
+            <a:endParaRPr lang="zh-CN" altLang="en-US"/>
+          </a:p>
+        </p:txBody>
+      </p:sp>
+      <p:sp>
+        <p:nvSpPr>
+          <p:cNvPr id="16" name="Target"/>
+          <p:cNvSpPr/>
+          <p:nvPr/>
+        </p:nvSpPr>
+        <p:spPr>
+          <a:xfrm rot="10725280">
+            <a:off x="1579973" y="2641764"/>
+            <a:ext cx="1066800" cy="1066800"/>
+          </a:xfrm>
+          <a:prstGeom prst="ellipse">
+            <a:avLst/>
+          </a:prstGeom>
+          <a:solidFill>
+            <a:srgbClr val="00B050"/>
+          </a:solidFill>
+        </p:spPr>
+        <p:style>
+          <a:lnRef idx="2">
+            <a:schemeClr val="accent1">
+              <a:shade val="50000"/>
+            </a:schemeClr>
+          </a:lnRef>
+          <a:fillRef idx="1">
+            <a:schemeClr val="accent1"/>
+          </a:fillRef>
+          <a:effectRef idx="0">
+            <a:schemeClr val="accent1"/>
+          </a:effectRef>
+          <a:fontRef idx="minor">
+            <a:schemeClr val="lt1"/>
+          </a:fontRef>
+        </p:style>
+        <p:txBody>
+          <a:bodyPr rtlCol="0" anchor="ctr"/>
+          <a:lstStyle/>
+          <a:p>
+            <a:pPr algn="ctr"/>
+            <a:endParaRPr lang="zh-CN" altLang="en-US"/>
+          </a:p>
+        </p:txBody>
+      </p:sp>
+      <p:sp>
+        <p:nvSpPr>
+          <p:cNvPr id="14" name="Rectangle"/>
+          <p:cNvSpPr/>
+          <p:nvPr/>
+        </p:nvSpPr>
+        <p:spPr>
+          <a:xfrm>
+            <a:off x="3429000" y="2438400"/>
+            <a:ext cx="2057400" cy="1371600"/>
+          </a:xfrm>
+          <a:prstGeom prst="rect">
+            <a:avLst/>
+          </a:prstGeom>
+          <a:solidFill>
+            <a:srgbClr val="FF0000"/>
+          </a:solidFill>
+        </p:spPr>
+        <p:style>
+          <a:lnRef idx="2">
+            <a:schemeClr val="accent1">
+              <a:shade val="50000"/>
+            </a:schemeClr>
+          </a:lnRef>
+          <a:fillRef idx="1">
+            <a:schemeClr val="accent1"/>
+          </a:fillRef>
+          <a:effectRef idx="0">
+            <a:schemeClr val="accent1"/>
+          </a:effectRef>
+          <a:fontRef idx="minor">
+            <a:schemeClr val="lt1"/>
+          </a:fontRef>
+        </p:style>
+        <p:txBody>
+          <a:bodyPr rtlCol="0" anchor="ctr"/>
+          <a:lstStyle/>
+          <a:p>
+            <a:pPr algn="ctr"/>
+            <a:endParaRPr lang="zh-CN" altLang="en-US"/>
+          </a:p>
+        </p:txBody>
+      </p:sp>
+      <p:sp>
+        <p:nvSpPr>
+          <p:cNvPr id="6" name="Oval"/>
+          <p:cNvSpPr/>
+          <p:nvPr/>
+        </p:nvSpPr>
+        <p:spPr>
+          <a:xfrm>
+            <a:off x="6269182" y="2590800"/>
+            <a:ext cx="1066800" cy="1066800"/>
+          </a:xfrm>
+          <a:prstGeom prst="ellipse">
+            <a:avLst/>
+          </a:prstGeom>
+        </p:spPr>
+        <p:style>
+          <a:lnRef idx="2">
+            <a:schemeClr val="accent1">
+              <a:shade val="50000"/>
+            </a:schemeClr>
+          </a:lnRef>
+          <a:fillRef idx="1">
+            <a:schemeClr val="accent1"/>
+          </a:fillRef>
+          <a:effectRef idx="0">
+            <a:schemeClr val="accent1"/>
+          </a:effectRef>
+          <a:fontRef idx="minor">
+            <a:schemeClr val="lt1"/>
+          </a:fontRef>
+        </p:style>
+        <p:txBody>
+          <a:bodyPr rtlCol="0" anchor="ctr"/>
+          <a:lstStyle/>
+          <a:p>
+            <a:pPr algn="ctr"/>
+            <a:endParaRPr lang="zh-CN" altLang="en-US"/>
+          </a:p>
+        </p:txBody>
+      </p:sp>
+      <p:sp>
+        <p:nvSpPr>
+          <p:cNvPr id="17" name="Oval"/>
+          <p:cNvSpPr/>
+          <p:nvPr/>
+        </p:nvSpPr>
+        <p:spPr>
+          <a:xfrm rot="10720789">
+            <a:off x="1580042" y="2644819"/>
+            <a:ext cx="1066800" cy="1066800"/>
+          </a:xfrm>
+          <a:prstGeom prst="ellipse">
+            <a:avLst/>
+          </a:prstGeom>
+        </p:spPr>
+        <p:style>
+          <a:lnRef idx="2">
+            <a:schemeClr val="accent1">
+              <a:shade val="50000"/>
+            </a:schemeClr>
+          </a:lnRef>
+          <a:fillRef idx="1">
+            <a:schemeClr val="accent1"/>
+          </a:fillRef>
+          <a:effectRef idx="0">
+            <a:schemeClr val="accent1"/>
+          </a:effectRef>
+          <a:fontRef idx="minor">
+            <a:schemeClr val="lt1"/>
+          </a:fontRef>
+        </p:style>
+        <p:txBody>
+          <a:bodyPr rtlCol="0" anchor="ctr"/>
+          <a:lstStyle/>
+          <a:p>
+            <a:pPr algn="ctr"/>
+            <a:endParaRPr lang="zh-CN" altLang="en-US"/>
+          </a:p>
+        </p:txBody>
+      </p:sp>
+    </p:spTree>
+    <p:extLst>
+      <p:ext uri="{BB962C8B-B14F-4D97-AF65-F5344CB8AC3E}">
+        <p14:creationId xmlns:p14="http://schemas.microsoft.com/office/powerpoint/2010/main" val="1446292039"/>
+      </p:ext>
+    </p:extLst>
+  </p:cSld>
+  <p:clrMapOvr>
+    <a:masterClrMapping/>
+  </p:clrMapOvr>
+  <p:timing>
+    <p:tnLst>
+      <p:par>
+        <p:cTn id="1" dur="indefinite" restart="never" nodeType="tmRoot"/>
+      </p:par>
+    </p:tnLst>
+  </p:timing>
+</p:sld>
+</file>
+
+<file path=ppt/slides/slide15.xml><?xml version="1.0" encoding="utf-8"?>
 <p:sld xmlns:a="http://schemas.openxmlformats.org/drawingml/2006/main" xmlns:r="http://schemas.openxmlformats.org/officeDocument/2006/relationships" xmlns:p="http://schemas.openxmlformats.org/presentationml/2006/main" show="0">
   <p:cSld name="PPAck201403240026082737">
     <p:spTree>
@@ -9590,6 +11700,14 @@
 <file path=ppt/slides/slide3.xml><?xml version="1.0" encoding="utf-8"?>
 <p:sld xmlns:a="http://schemas.openxmlformats.org/drawingml/2006/main" xmlns:r="http://schemas.openxmlformats.org/officeDocument/2006/relationships" xmlns:p="http://schemas.openxmlformats.org/presentationml/2006/main">
   <p:cSld>
+    <p:bg>
+      <p:bgPr>
+        <a:solidFill>
+          <a:srgbClr val="0070C0"/>
+        </a:solidFill>
+        <a:effectLst/>
+      </p:bgPr>
+    </p:bg>
     <p:spTree>
       <p:nvGrpSpPr>
         <p:cNvPr id="1" name=""/>
@@ -9606,16 +11724,99 @@
       </p:grpSpPr>
       <p:sp>
         <p:nvSpPr>
-          <p:cNvPr id="4" name="Rectangle 1"/>
+          <p:cNvPr id="2" name="Title 1"/>
+          <p:cNvSpPr>
+            <a:spLocks noGrp="1"/>
+          </p:cNvSpPr>
+          <p:nvPr>
+            <p:ph type="title"/>
+          </p:nvPr>
+        </p:nvSpPr>
+        <p:spPr>
+          <a:xfrm>
+            <a:off x="304800" y="1066800"/>
+            <a:ext cx="8229600" cy="1143000"/>
+          </a:xfrm>
+        </p:spPr>
+        <p:txBody>
+          <a:bodyPr>
+            <a:normAutofit fontScale="90000"/>
+          </a:bodyPr>
+          <a:lstStyle/>
+          <a:p>
+            <a:r>
+              <a:rPr lang="en-US" altLang="zh-CN" dirty="0" smtClean="0">
+                <a:solidFill>
+                  <a:schemeClr val="bg1"/>
+                </a:solidFill>
+              </a:rPr>
+              <a:t>Duplicate and Rotate</a:t>
+            </a:r>
+            <a:r>
+              <a:rPr lang="en-US" dirty="0" smtClean="0">
+                <a:solidFill>
+                  <a:schemeClr val="bg1"/>
+                </a:solidFill>
+              </a:rPr>
+              <a:t>:: Single Shape (Fixed)</a:t>
+            </a:r>
+            <a:endParaRPr lang="en-SG" dirty="0">
+              <a:solidFill>
+                <a:schemeClr val="bg1"/>
+              </a:solidFill>
+            </a:endParaRPr>
+          </a:p>
+        </p:txBody>
+      </p:sp>
+    </p:spTree>
+    <p:extLst>
+      <p:ext uri="{BB962C8B-B14F-4D97-AF65-F5344CB8AC3E}">
+        <p14:creationId xmlns:p14="http://schemas.microsoft.com/office/powerpoint/2010/main" val="1313476487"/>
+      </p:ext>
+    </p:extLst>
+  </p:cSld>
+  <p:clrMapOvr>
+    <a:masterClrMapping/>
+  </p:clrMapOvr>
+  <p:timing>
+    <p:tnLst>
+      <p:par>
+        <p:cTn id="1" dur="indefinite" restart="never" nodeType="tmRoot"/>
+      </p:par>
+    </p:tnLst>
+  </p:timing>
+</p:sld>
+</file>
+
+<file path=ppt/slides/slide4.xml><?xml version="1.0" encoding="utf-8"?>
+<p:sld xmlns:a="http://schemas.openxmlformats.org/drawingml/2006/main" xmlns:r="http://schemas.openxmlformats.org/officeDocument/2006/relationships" xmlns:p="http://schemas.openxmlformats.org/presentationml/2006/main">
+  <p:cSld>
+    <p:spTree>
+      <p:nvGrpSpPr>
+        <p:cNvPr id="1" name=""/>
+        <p:cNvGrpSpPr/>
+        <p:nvPr/>
+      </p:nvGrpSpPr>
+      <p:grpSpPr>
+        <a:xfrm>
+          <a:off x="0" y="0"/>
+          <a:ext cx="0" cy="0"/>
+          <a:chOff x="0" y="0"/>
+          <a:chExt cx="0" cy="0"/>
+        </a:xfrm>
+      </p:grpSpPr>
+      <p:sp>
+        <p:nvSpPr>
+          <p:cNvPr id="18" name="Triangle"/>
           <p:cNvSpPr/>
           <p:nvPr/>
         </p:nvSpPr>
         <p:spPr>
           <a:xfrm>
-            <a:off x="3429000" y="2438400"/>
-            <a:ext cx="2057400" cy="1371600"/>
+            <a:off x="3086100" y="3962400"/>
+            <a:ext cx="2743200" cy="2743200"/>
           </a:xfrm>
-          <a:prstGeom prst="rect">
+          <a:prstGeom prst="triangle">
             <a:avLst/>
           </a:prstGeom>
         </p:spPr>
@@ -9646,7 +11847,93 @@
       </p:sp>
       <p:sp>
         <p:nvSpPr>
-          <p:cNvPr id="5" name="Oval 2"/>
+          <p:cNvPr id="16" name="Target"/>
+          <p:cNvSpPr/>
+          <p:nvPr/>
+        </p:nvSpPr>
+        <p:spPr>
+          <a:xfrm rot="10725280">
+            <a:off x="1579973" y="2641764"/>
+            <a:ext cx="1066800" cy="1066800"/>
+          </a:xfrm>
+          <a:prstGeom prst="ellipse">
+            <a:avLst/>
+          </a:prstGeom>
+          <a:solidFill>
+            <a:srgbClr val="00B050"/>
+          </a:solidFill>
+        </p:spPr>
+        <p:style>
+          <a:lnRef idx="2">
+            <a:schemeClr val="accent1">
+              <a:shade val="50000"/>
+            </a:schemeClr>
+          </a:lnRef>
+          <a:fillRef idx="1">
+            <a:schemeClr val="accent1"/>
+          </a:fillRef>
+          <a:effectRef idx="0">
+            <a:schemeClr val="accent1"/>
+          </a:effectRef>
+          <a:fontRef idx="minor">
+            <a:schemeClr val="lt1"/>
+          </a:fontRef>
+        </p:style>
+        <p:txBody>
+          <a:bodyPr rtlCol="0" anchor="ctr"/>
+          <a:lstStyle/>
+          <a:p>
+            <a:pPr algn="ctr"/>
+            <a:endParaRPr lang="zh-CN" altLang="en-US"/>
+          </a:p>
+        </p:txBody>
+      </p:sp>
+      <p:sp>
+        <p:nvSpPr>
+          <p:cNvPr id="14" name="Rectangle"/>
+          <p:cNvSpPr/>
+          <p:nvPr/>
+        </p:nvSpPr>
+        <p:spPr>
+          <a:xfrm>
+            <a:off x="3429000" y="2438400"/>
+            <a:ext cx="2057400" cy="1371600"/>
+          </a:xfrm>
+          <a:prstGeom prst="rect">
+            <a:avLst/>
+          </a:prstGeom>
+          <a:solidFill>
+            <a:srgbClr val="FF0000"/>
+          </a:solidFill>
+        </p:spPr>
+        <p:style>
+          <a:lnRef idx="2">
+            <a:schemeClr val="accent1">
+              <a:shade val="50000"/>
+            </a:schemeClr>
+          </a:lnRef>
+          <a:fillRef idx="1">
+            <a:schemeClr val="accent1"/>
+          </a:fillRef>
+          <a:effectRef idx="0">
+            <a:schemeClr val="accent1"/>
+          </a:effectRef>
+          <a:fontRef idx="minor">
+            <a:schemeClr val="lt1"/>
+          </a:fontRef>
+        </p:style>
+        <p:txBody>
+          <a:bodyPr rtlCol="0" anchor="ctr"/>
+          <a:lstStyle/>
+          <a:p>
+            <a:pPr algn="ctr"/>
+            <a:endParaRPr lang="zh-CN" altLang="en-US"/>
+          </a:p>
+        </p:txBody>
+      </p:sp>
+      <p:sp>
+        <p:nvSpPr>
+          <p:cNvPr id="17" name="Oval"/>
           <p:cNvSpPr/>
           <p:nvPr/>
         </p:nvSpPr>
@@ -9684,141 +11971,10 @@
           </a:p>
         </p:txBody>
       </p:sp>
-      <p:sp>
-        <p:nvSpPr>
-          <p:cNvPr id="6" name="Isosceles Triangle 3"/>
-          <p:cNvSpPr/>
-          <p:nvPr/>
-        </p:nvSpPr>
-        <p:spPr>
-          <a:xfrm>
-            <a:off x="3838956" y="4724400"/>
-            <a:ext cx="1237488" cy="1066800"/>
-          </a:xfrm>
-          <a:prstGeom prst="triangle">
-            <a:avLst/>
-          </a:prstGeom>
-        </p:spPr>
-        <p:style>
-          <a:lnRef idx="2">
-            <a:schemeClr val="accent1">
-              <a:shade val="50000"/>
-            </a:schemeClr>
-          </a:lnRef>
-          <a:fillRef idx="1">
-            <a:schemeClr val="accent1"/>
-          </a:fillRef>
-          <a:effectRef idx="0">
-            <a:schemeClr val="accent1"/>
-          </a:effectRef>
-          <a:fontRef idx="minor">
-            <a:schemeClr val="lt1"/>
-          </a:fontRef>
-        </p:style>
-        <p:txBody>
-          <a:bodyPr rtlCol="0" anchor="ctr"/>
-          <a:lstStyle/>
-          <a:p>
-            <a:pPr algn="ctr"/>
-            <a:endParaRPr lang="zh-CN" altLang="en-US"/>
-          </a:p>
-        </p:txBody>
-      </p:sp>
     </p:spTree>
     <p:extLst>
       <p:ext uri="{BB962C8B-B14F-4D97-AF65-F5344CB8AC3E}">
-        <p14:creationId xmlns:p14="http://schemas.microsoft.com/office/powerpoint/2010/main" val="2744356911"/>
-      </p:ext>
-    </p:extLst>
-  </p:cSld>
-  <p:clrMapOvr>
-    <a:masterClrMapping/>
-  </p:clrMapOvr>
-  <p:timing>
-    <p:tnLst>
-      <p:par>
-        <p:cTn id="1" dur="indefinite" restart="never" nodeType="tmRoot"/>
-      </p:par>
-    </p:tnLst>
-  </p:timing>
-</p:sld>
-</file>
-
-<file path=ppt/slides/slide4.xml><?xml version="1.0" encoding="utf-8"?>
-<p:sld xmlns:a="http://schemas.openxmlformats.org/drawingml/2006/main" xmlns:r="http://schemas.openxmlformats.org/officeDocument/2006/relationships" xmlns:p="http://schemas.openxmlformats.org/presentationml/2006/main">
-  <p:cSld>
-    <p:bg>
-      <p:bgPr>
-        <a:solidFill>
-          <a:srgbClr val="0070C0"/>
-        </a:solidFill>
-        <a:effectLst/>
-      </p:bgPr>
-    </p:bg>
-    <p:spTree>
-      <p:nvGrpSpPr>
-        <p:cNvPr id="1" name=""/>
-        <p:cNvGrpSpPr/>
-        <p:nvPr/>
-      </p:nvGrpSpPr>
-      <p:grpSpPr>
-        <a:xfrm>
-          <a:off x="0" y="0"/>
-          <a:ext cx="0" cy="0"/>
-          <a:chOff x="0" y="0"/>
-          <a:chExt cx="0" cy="0"/>
-        </a:xfrm>
-      </p:grpSpPr>
-      <p:sp>
-        <p:nvSpPr>
-          <p:cNvPr id="2" name="Title 1"/>
-          <p:cNvSpPr>
-            <a:spLocks noGrp="1"/>
-          </p:cNvSpPr>
-          <p:nvPr>
-            <p:ph type="title"/>
-          </p:nvPr>
-        </p:nvSpPr>
-        <p:spPr>
-          <a:xfrm>
-            <a:off x="304800" y="1066800"/>
-            <a:ext cx="8229600" cy="1143000"/>
-          </a:xfrm>
-        </p:spPr>
-        <p:txBody>
-          <a:bodyPr>
-            <a:normAutofit/>
-          </a:bodyPr>
-          <a:lstStyle/>
-          <a:p>
-            <a:r>
-              <a:rPr lang="en-US" altLang="zh-CN" dirty="0" smtClean="0">
-                <a:solidFill>
-                  <a:schemeClr val="bg1"/>
-                </a:solidFill>
-              </a:rPr>
-              <a:t>Duplicate and Rotate</a:t>
-            </a:r>
-            <a:r>
-              <a:rPr lang="en-US" dirty="0" smtClean="0">
-                <a:solidFill>
-                  <a:schemeClr val="bg1"/>
-                </a:solidFill>
-              </a:rPr>
-              <a:t>:: Single Shape</a:t>
-            </a:r>
-            <a:endParaRPr lang="en-SG" dirty="0">
-              <a:solidFill>
-                <a:schemeClr val="bg1"/>
-              </a:solidFill>
-            </a:endParaRPr>
-          </a:p>
-        </p:txBody>
-      </p:sp>
-    </p:spTree>
-    <p:extLst>
-      <p:ext uri="{BB962C8B-B14F-4D97-AF65-F5344CB8AC3E}">
-        <p14:creationId xmlns:p14="http://schemas.microsoft.com/office/powerpoint/2010/main" val="1313476487"/>
+        <p14:creationId xmlns:p14="http://schemas.microsoft.com/office/powerpoint/2010/main" val="1638130631"/>
       </p:ext>
     </p:extLst>
   </p:cSld>
@@ -9854,16 +12010,16 @@
       </p:grpSpPr>
       <p:sp>
         <p:nvSpPr>
-          <p:cNvPr id="34" name="Rectangle 1"/>
+          <p:cNvPr id="18" name="Triangle"/>
           <p:cNvSpPr/>
           <p:nvPr/>
         </p:nvSpPr>
         <p:spPr>
           <a:xfrm>
-            <a:off x="3429000" y="2438400"/>
-            <a:ext cx="2057400" cy="1371600"/>
+            <a:off x="3086100" y="3962400"/>
+            <a:ext cx="2743200" cy="2743200"/>
           </a:xfrm>
-          <a:prstGeom prst="rect">
+          <a:prstGeom prst="triangle">
             <a:avLst/>
           </a:prstGeom>
         </p:spPr>
@@ -9894,18 +12050,21 @@
       </p:sp>
       <p:sp>
         <p:nvSpPr>
-          <p:cNvPr id="35" name="Oval 2"/>
+          <p:cNvPr id="16" name="Target"/>
           <p:cNvSpPr/>
           <p:nvPr/>
         </p:nvSpPr>
         <p:spPr>
-          <a:xfrm rot="16306935">
-            <a:off x="3997227" y="247050"/>
+          <a:xfrm rot="10725280">
+            <a:off x="1579973" y="2641764"/>
             <a:ext cx="1066800" cy="1066800"/>
           </a:xfrm>
           <a:prstGeom prst="ellipse">
             <a:avLst/>
           </a:prstGeom>
+          <a:solidFill>
+            <a:srgbClr val="00B050"/>
+          </a:solidFill>
         </p:spPr>
         <p:style>
           <a:lnRef idx="2">
@@ -9934,18 +12093,21 @@
       </p:sp>
       <p:sp>
         <p:nvSpPr>
-          <p:cNvPr id="45" name="Oval 2"/>
+          <p:cNvPr id="14" name="Rectangle"/>
           <p:cNvSpPr/>
           <p:nvPr/>
         </p:nvSpPr>
         <p:spPr>
-          <a:xfrm rot="10725280">
-            <a:off x="1579973" y="2641764"/>
-            <a:ext cx="1066800" cy="1066800"/>
+          <a:xfrm>
+            <a:off x="3429000" y="2438400"/>
+            <a:ext cx="2057400" cy="1371600"/>
           </a:xfrm>
-          <a:prstGeom prst="ellipse">
+          <a:prstGeom prst="rect">
             <a:avLst/>
           </a:prstGeom>
+          <a:solidFill>
+            <a:srgbClr val="FF0000"/>
+          </a:solidFill>
         </p:spPr>
         <p:style>
           <a:lnRef idx="2">
@@ -9974,7 +12136,7 @@
       </p:sp>
       <p:sp>
         <p:nvSpPr>
-          <p:cNvPr id="47" name="Oval 2"/>
+          <p:cNvPr id="6" name="Oval"/>
           <p:cNvSpPr/>
           <p:nvPr/>
         </p:nvSpPr>
@@ -10014,130 +12176,13 @@
       </p:sp>
       <p:sp>
         <p:nvSpPr>
-          <p:cNvPr id="36" name="Isosceles Triangle 3"/>
+          <p:cNvPr id="17" name="Oval"/>
           <p:cNvSpPr/>
           <p:nvPr/>
         </p:nvSpPr>
         <p:spPr>
           <a:xfrm>
-            <a:off x="3838956" y="4724400"/>
-            <a:ext cx="1237488" cy="1066800"/>
-          </a:xfrm>
-          <a:prstGeom prst="triangle">
-            <a:avLst/>
-          </a:prstGeom>
-        </p:spPr>
-        <p:style>
-          <a:lnRef idx="2">
-            <a:schemeClr val="accent1">
-              <a:shade val="50000"/>
-            </a:schemeClr>
-          </a:lnRef>
-          <a:fillRef idx="1">
-            <a:schemeClr val="accent1"/>
-          </a:fillRef>
-          <a:effectRef idx="0">
-            <a:schemeClr val="accent1"/>
-          </a:effectRef>
-          <a:fontRef idx="minor">
-            <a:schemeClr val="lt1"/>
-          </a:fontRef>
-        </p:style>
-        <p:txBody>
-          <a:bodyPr rtlCol="0" anchor="ctr"/>
-          <a:lstStyle/>
-          <a:p>
-            <a:pPr algn="ctr"/>
-            <a:endParaRPr lang="zh-CN" altLang="en-US"/>
-          </a:p>
-        </p:txBody>
-      </p:sp>
-    </p:spTree>
-    <p:extLst>
-      <p:ext uri="{BB962C8B-B14F-4D97-AF65-F5344CB8AC3E}">
-        <p14:creationId xmlns:p14="http://schemas.microsoft.com/office/powerpoint/2010/main" val="3126627299"/>
-      </p:ext>
-    </p:extLst>
-  </p:cSld>
-  <p:clrMapOvr>
-    <a:masterClrMapping/>
-  </p:clrMapOvr>
-  <p:timing>
-    <p:tnLst>
-      <p:par>
-        <p:cTn id="1" dur="indefinite" restart="never" nodeType="tmRoot"/>
-      </p:par>
-    </p:tnLst>
-  </p:timing>
-</p:sld>
-</file>
-
-<file path=ppt/slides/slide6.xml><?xml version="1.0" encoding="utf-8"?>
-<p:sld xmlns:a="http://schemas.openxmlformats.org/drawingml/2006/main" xmlns:r="http://schemas.openxmlformats.org/officeDocument/2006/relationships" xmlns:p="http://schemas.openxmlformats.org/presentationml/2006/main">
-  <p:cSld>
-    <p:spTree>
-      <p:nvGrpSpPr>
-        <p:cNvPr id="1" name=""/>
-        <p:cNvGrpSpPr/>
-        <p:nvPr/>
-      </p:nvGrpSpPr>
-      <p:grpSpPr>
-        <a:xfrm>
-          <a:off x="0" y="0"/>
-          <a:ext cx="0" cy="0"/>
-          <a:chOff x="0" y="0"/>
-          <a:chExt cx="0" cy="0"/>
-        </a:xfrm>
-      </p:grpSpPr>
-      <p:sp>
-        <p:nvSpPr>
-          <p:cNvPr id="14" name="Rectangle 1"/>
-          <p:cNvSpPr/>
-          <p:nvPr/>
-        </p:nvSpPr>
-        <p:spPr>
-          <a:xfrm>
-            <a:off x="3429000" y="2438400"/>
-            <a:ext cx="2057400" cy="1371600"/>
-          </a:xfrm>
-          <a:prstGeom prst="rect">
-            <a:avLst/>
-          </a:prstGeom>
-        </p:spPr>
-        <p:style>
-          <a:lnRef idx="2">
-            <a:schemeClr val="accent1">
-              <a:shade val="50000"/>
-            </a:schemeClr>
-          </a:lnRef>
-          <a:fillRef idx="1">
-            <a:schemeClr val="accent1"/>
-          </a:fillRef>
-          <a:effectRef idx="0">
-            <a:schemeClr val="accent1"/>
-          </a:effectRef>
-          <a:fontRef idx="minor">
-            <a:schemeClr val="lt1"/>
-          </a:fontRef>
-        </p:style>
-        <p:txBody>
-          <a:bodyPr rtlCol="0" anchor="ctr"/>
-          <a:lstStyle/>
-          <a:p>
-            <a:pPr algn="ctr"/>
-            <a:endParaRPr lang="zh-CN" altLang="en-US"/>
-          </a:p>
-        </p:txBody>
-      </p:sp>
-      <p:sp>
-        <p:nvSpPr>
-          <p:cNvPr id="15" name="Oval 2"/>
-          <p:cNvSpPr/>
-          <p:nvPr/>
-        </p:nvSpPr>
-        <p:spPr>
-          <a:xfrm rot="8212442">
-            <a:off x="2212882" y="4193773"/>
+            <a:off x="1579914" y="2638995"/>
             <a:ext cx="1066800" cy="1066800"/>
           </a:xfrm>
           <a:prstGeom prst="ellipse">
@@ -10169,18 +12214,146 @@
           </a:p>
         </p:txBody>
       </p:sp>
-      <p:sp>
-        <p:nvSpPr>
-          <p:cNvPr id="16" name="Oval 2"/>
+    </p:spTree>
+    <p:extLst>
+      <p:ext uri="{BB962C8B-B14F-4D97-AF65-F5344CB8AC3E}">
+        <p14:creationId xmlns:p14="http://schemas.microsoft.com/office/powerpoint/2010/main" val="1540486554"/>
+      </p:ext>
+    </p:extLst>
+  </p:cSld>
+  <p:clrMapOvr>
+    <a:masterClrMapping/>
+  </p:clrMapOvr>
+  <p:timing>
+    <p:tnLst>
+      <p:par>
+        <p:cTn id="1" dur="indefinite" restart="never" nodeType="tmRoot"/>
+      </p:par>
+    </p:tnLst>
+  </p:timing>
+</p:sld>
+</file>
+
+<file path=ppt/slides/slide6.xml><?xml version="1.0" encoding="utf-8"?>
+<p:sld xmlns:a="http://schemas.openxmlformats.org/drawingml/2006/main" xmlns:r="http://schemas.openxmlformats.org/officeDocument/2006/relationships" xmlns:p="http://schemas.openxmlformats.org/presentationml/2006/main">
+  <p:cSld>
+    <p:bg>
+      <p:bgPr>
+        <a:solidFill>
+          <a:srgbClr val="0070C0"/>
+        </a:solidFill>
+        <a:effectLst/>
+      </p:bgPr>
+    </p:bg>
+    <p:spTree>
+      <p:nvGrpSpPr>
+        <p:cNvPr id="1" name=""/>
+        <p:cNvGrpSpPr/>
+        <p:nvPr/>
+      </p:nvGrpSpPr>
+      <p:grpSpPr>
+        <a:xfrm>
+          <a:off x="0" y="0"/>
+          <a:ext cx="0" cy="0"/>
+          <a:chOff x="0" y="0"/>
+          <a:chExt cx="0" cy="0"/>
+        </a:xfrm>
+      </p:grpSpPr>
+      <p:sp>
+        <p:nvSpPr>
+          <p:cNvPr id="2" name="Title 1"/>
+          <p:cNvSpPr>
+            <a:spLocks noGrp="1"/>
+          </p:cNvSpPr>
+          <p:nvPr>
+            <p:ph type="title"/>
+          </p:nvPr>
+        </p:nvSpPr>
+        <p:spPr>
+          <a:xfrm>
+            <a:off x="304800" y="1066800"/>
+            <a:ext cx="8229600" cy="1143000"/>
+          </a:xfrm>
+        </p:spPr>
+        <p:txBody>
+          <a:bodyPr>
+            <a:normAutofit fontScale="90000"/>
+          </a:bodyPr>
+          <a:lstStyle/>
+          <a:p>
+            <a:r>
+              <a:rPr lang="en-US" altLang="zh-CN" dirty="0" smtClean="0">
+                <a:solidFill>
+                  <a:schemeClr val="bg1"/>
+                </a:solidFill>
+              </a:rPr>
+              <a:t>Duplicate and Rotate</a:t>
+            </a:r>
+            <a:r>
+              <a:rPr lang="en-US" dirty="0" smtClean="0">
+                <a:solidFill>
+                  <a:schemeClr val="bg1"/>
+                </a:solidFill>
+              </a:rPr>
+              <a:t>:: Single Shape (Dynamic)</a:t>
+            </a:r>
+            <a:endParaRPr lang="en-SG" dirty="0">
+              <a:solidFill>
+                <a:schemeClr val="bg1"/>
+              </a:solidFill>
+            </a:endParaRPr>
+          </a:p>
+        </p:txBody>
+      </p:sp>
+    </p:spTree>
+    <p:extLst>
+      <p:ext uri="{BB962C8B-B14F-4D97-AF65-F5344CB8AC3E}">
+        <p14:creationId xmlns:p14="http://schemas.microsoft.com/office/powerpoint/2010/main" val="592175314"/>
+      </p:ext>
+    </p:extLst>
+  </p:cSld>
+  <p:clrMapOvr>
+    <a:masterClrMapping/>
+  </p:clrMapOvr>
+  <p:timing>
+    <p:tnLst>
+      <p:par>
+        <p:cTn id="1" dur="indefinite" restart="never" nodeType="tmRoot"/>
+      </p:par>
+    </p:tnLst>
+  </p:timing>
+</p:sld>
+</file>
+
+<file path=ppt/slides/slide7.xml><?xml version="1.0" encoding="utf-8"?>
+<p:sld xmlns:a="http://schemas.openxmlformats.org/drawingml/2006/main" xmlns:r="http://schemas.openxmlformats.org/officeDocument/2006/relationships" xmlns:p="http://schemas.openxmlformats.org/presentationml/2006/main">
+  <p:cSld>
+    <p:spTree>
+      <p:nvGrpSpPr>
+        <p:cNvPr id="1" name=""/>
+        <p:cNvGrpSpPr/>
+        <p:nvPr/>
+      </p:nvGrpSpPr>
+      <p:grpSpPr>
+        <a:xfrm>
+          <a:off x="0" y="0"/>
+          <a:ext cx="0" cy="0"/>
+          <a:chOff x="0" y="0"/>
+          <a:chExt cx="0" cy="0"/>
+        </a:xfrm>
+      </p:grpSpPr>
+      <p:sp>
+        <p:nvSpPr>
+          <p:cNvPr id="18" name="Triangle"/>
           <p:cNvSpPr/>
           <p:nvPr/>
         </p:nvSpPr>
         <p:spPr>
-          <a:xfrm rot="10725280">
-            <a:off x="1579973" y="2641764"/>
-            <a:ext cx="1066800" cy="1066800"/>
+          <a:xfrm>
+            <a:off x="3086100" y="3962400"/>
+            <a:ext cx="2743200" cy="2743200"/>
           </a:xfrm>
-          <a:prstGeom prst="ellipse">
+          <a:prstGeom prst="triangle">
             <a:avLst/>
           </a:prstGeom>
         </p:spPr>
@@ -10211,7 +12384,93 @@
       </p:sp>
       <p:sp>
         <p:nvSpPr>
-          <p:cNvPr id="17" name="Oval 2"/>
+          <p:cNvPr id="16" name="Target"/>
+          <p:cNvSpPr/>
+          <p:nvPr/>
+        </p:nvSpPr>
+        <p:spPr>
+          <a:xfrm rot="10725280">
+            <a:off x="1579973" y="2641764"/>
+            <a:ext cx="1066800" cy="1066800"/>
+          </a:xfrm>
+          <a:prstGeom prst="ellipse">
+            <a:avLst/>
+          </a:prstGeom>
+          <a:solidFill>
+            <a:srgbClr val="00B050"/>
+          </a:solidFill>
+        </p:spPr>
+        <p:style>
+          <a:lnRef idx="2">
+            <a:schemeClr val="accent1">
+              <a:shade val="50000"/>
+            </a:schemeClr>
+          </a:lnRef>
+          <a:fillRef idx="1">
+            <a:schemeClr val="accent1"/>
+          </a:fillRef>
+          <a:effectRef idx="0">
+            <a:schemeClr val="accent1"/>
+          </a:effectRef>
+          <a:fontRef idx="minor">
+            <a:schemeClr val="lt1"/>
+          </a:fontRef>
+        </p:style>
+        <p:txBody>
+          <a:bodyPr rtlCol="0" anchor="ctr"/>
+          <a:lstStyle/>
+          <a:p>
+            <a:pPr algn="ctr"/>
+            <a:endParaRPr lang="zh-CN" altLang="en-US"/>
+          </a:p>
+        </p:txBody>
+      </p:sp>
+      <p:sp>
+        <p:nvSpPr>
+          <p:cNvPr id="14" name="Rectangle"/>
+          <p:cNvSpPr/>
+          <p:nvPr/>
+        </p:nvSpPr>
+        <p:spPr>
+          <a:xfrm>
+            <a:off x="3429000" y="2438400"/>
+            <a:ext cx="2057400" cy="1371600"/>
+          </a:xfrm>
+          <a:prstGeom prst="rect">
+            <a:avLst/>
+          </a:prstGeom>
+          <a:solidFill>
+            <a:srgbClr val="FF0000"/>
+          </a:solidFill>
+        </p:spPr>
+        <p:style>
+          <a:lnRef idx="2">
+            <a:schemeClr val="accent1">
+              <a:shade val="50000"/>
+            </a:schemeClr>
+          </a:lnRef>
+          <a:fillRef idx="1">
+            <a:schemeClr val="accent1"/>
+          </a:fillRef>
+          <a:effectRef idx="0">
+            <a:schemeClr val="accent1"/>
+          </a:effectRef>
+          <a:fontRef idx="minor">
+            <a:schemeClr val="lt1"/>
+          </a:fontRef>
+        </p:style>
+        <p:txBody>
+          <a:bodyPr rtlCol="0" anchor="ctr"/>
+          <a:lstStyle/>
+          <a:p>
+            <a:pPr algn="ctr"/>
+            <a:endParaRPr lang="zh-CN" altLang="en-US"/>
+          </a:p>
+        </p:txBody>
+      </p:sp>
+      <p:sp>
+        <p:nvSpPr>
+          <p:cNvPr id="17" name="Oval"/>
           <p:cNvSpPr/>
           <p:nvPr/>
         </p:nvSpPr>
@@ -10249,229 +12508,10 @@
           </a:p>
         </p:txBody>
       </p:sp>
-      <p:sp>
-        <p:nvSpPr>
-          <p:cNvPr id="19" name="Oval 2"/>
-          <p:cNvSpPr/>
-          <p:nvPr/>
-        </p:nvSpPr>
-        <p:spPr>
-          <a:xfrm rot="16306935">
-            <a:off x="3997227" y="247050"/>
-            <a:ext cx="1066800" cy="1066800"/>
-          </a:xfrm>
-          <a:prstGeom prst="ellipse">
-            <a:avLst/>
-          </a:prstGeom>
-        </p:spPr>
-        <p:style>
-          <a:lnRef idx="2">
-            <a:schemeClr val="accent1">
-              <a:shade val="50000"/>
-            </a:schemeClr>
-          </a:lnRef>
-          <a:fillRef idx="1">
-            <a:schemeClr val="accent1"/>
-          </a:fillRef>
-          <a:effectRef idx="0">
-            <a:schemeClr val="accent1"/>
-          </a:effectRef>
-          <a:fontRef idx="minor">
-            <a:schemeClr val="lt1"/>
-          </a:fontRef>
-        </p:style>
-        <p:txBody>
-          <a:bodyPr rtlCol="0" anchor="ctr"/>
-          <a:lstStyle/>
-          <a:p>
-            <a:pPr algn="ctr"/>
-            <a:endParaRPr lang="zh-CN" altLang="en-US"/>
-          </a:p>
-        </p:txBody>
-      </p:sp>
-      <p:sp>
-        <p:nvSpPr>
-          <p:cNvPr id="20" name="Oval 2"/>
-          <p:cNvSpPr/>
-          <p:nvPr/>
-        </p:nvSpPr>
-        <p:spPr>
-          <a:xfrm rot="13418522">
-            <a:off x="2227386" y="972479"/>
-            <a:ext cx="1066800" cy="1066800"/>
-          </a:xfrm>
-          <a:prstGeom prst="ellipse">
-            <a:avLst/>
-          </a:prstGeom>
-        </p:spPr>
-        <p:style>
-          <a:lnRef idx="2">
-            <a:schemeClr val="accent1">
-              <a:shade val="50000"/>
-            </a:schemeClr>
-          </a:lnRef>
-          <a:fillRef idx="1">
-            <a:schemeClr val="accent1"/>
-          </a:fillRef>
-          <a:effectRef idx="0">
-            <a:schemeClr val="accent1"/>
-          </a:effectRef>
-          <a:fontRef idx="minor">
-            <a:schemeClr val="lt1"/>
-          </a:fontRef>
-        </p:style>
-        <p:txBody>
-          <a:bodyPr rtlCol="0" anchor="ctr"/>
-          <a:lstStyle/>
-          <a:p>
-            <a:pPr algn="ctr"/>
-            <a:endParaRPr lang="zh-CN" altLang="en-US"/>
-          </a:p>
-        </p:txBody>
-      </p:sp>
-      <p:sp>
-        <p:nvSpPr>
-          <p:cNvPr id="18" name="Isosceles Triangle 3"/>
-          <p:cNvSpPr/>
-          <p:nvPr/>
-        </p:nvSpPr>
-        <p:spPr>
-          <a:xfrm>
-            <a:off x="3838956" y="4724400"/>
-            <a:ext cx="1237488" cy="1066800"/>
-          </a:xfrm>
-          <a:prstGeom prst="triangle">
-            <a:avLst/>
-          </a:prstGeom>
-        </p:spPr>
-        <p:style>
-          <a:lnRef idx="2">
-            <a:schemeClr val="accent1">
-              <a:shade val="50000"/>
-            </a:schemeClr>
-          </a:lnRef>
-          <a:fillRef idx="1">
-            <a:schemeClr val="accent1"/>
-          </a:fillRef>
-          <a:effectRef idx="0">
-            <a:schemeClr val="accent1"/>
-          </a:effectRef>
-          <a:fontRef idx="minor">
-            <a:schemeClr val="lt1"/>
-          </a:fontRef>
-        </p:style>
-        <p:txBody>
-          <a:bodyPr rtlCol="0" anchor="ctr"/>
-          <a:lstStyle/>
-          <a:p>
-            <a:pPr algn="ctr"/>
-            <a:endParaRPr lang="zh-CN" altLang="en-US"/>
-          </a:p>
-        </p:txBody>
-      </p:sp>
     </p:spTree>
     <p:extLst>
       <p:ext uri="{BB962C8B-B14F-4D97-AF65-F5344CB8AC3E}">
-        <p14:creationId xmlns:p14="http://schemas.microsoft.com/office/powerpoint/2010/main" val="1069496072"/>
-      </p:ext>
-    </p:extLst>
-  </p:cSld>
-  <p:clrMapOvr>
-    <a:masterClrMapping/>
-  </p:clrMapOvr>
-  <p:timing>
-    <p:tnLst>
-      <p:par>
-        <p:cTn id="1" dur="indefinite" restart="never" nodeType="tmRoot"/>
-      </p:par>
-    </p:tnLst>
-  </p:timing>
-</p:sld>
-</file>
-
-<file path=ppt/slides/slide7.xml><?xml version="1.0" encoding="utf-8"?>
-<p:sld xmlns:a="http://schemas.openxmlformats.org/drawingml/2006/main" xmlns:r="http://schemas.openxmlformats.org/officeDocument/2006/relationships" xmlns:p="http://schemas.openxmlformats.org/presentationml/2006/main">
-  <p:cSld>
-    <p:bg>
-      <p:bgPr>
-        <a:solidFill>
-          <a:srgbClr val="0070C0"/>
-        </a:solidFill>
-        <a:effectLst/>
-      </p:bgPr>
-    </p:bg>
-    <p:spTree>
-      <p:nvGrpSpPr>
-        <p:cNvPr id="1" name=""/>
-        <p:cNvGrpSpPr/>
-        <p:nvPr/>
-      </p:nvGrpSpPr>
-      <p:grpSpPr>
-        <a:xfrm>
-          <a:off x="0" y="0"/>
-          <a:ext cx="0" cy="0"/>
-          <a:chOff x="0" y="0"/>
-          <a:chExt cx="0" cy="0"/>
-        </a:xfrm>
-      </p:grpSpPr>
-      <p:sp>
-        <p:nvSpPr>
-          <p:cNvPr id="4" name="Title 1"/>
-          <p:cNvSpPr>
-            <a:spLocks noGrp="1"/>
-          </p:cNvSpPr>
-          <p:nvPr>
-            <p:ph type="title"/>
-          </p:nvPr>
-        </p:nvSpPr>
-        <p:spPr>
-          <a:xfrm>
-            <a:off x="304800" y="1066800"/>
-            <a:ext cx="8229600" cy="1143000"/>
-          </a:xfrm>
-        </p:spPr>
-        <p:txBody>
-          <a:bodyPr>
-            <a:normAutofit fontScale="90000"/>
-          </a:bodyPr>
-          <a:lstStyle/>
-          <a:p>
-            <a:r>
-              <a:rPr lang="en-US" altLang="zh-CN" dirty="0">
-                <a:solidFill>
-                  <a:schemeClr val="bg1"/>
-                </a:solidFill>
-              </a:rPr>
-              <a:t>Duplicate and Rotate:: </a:t>
-            </a:r>
-            <a:r>
-              <a:rPr lang="en-US" altLang="zh-CN" dirty="0" smtClean="0">
-                <a:solidFill>
-                  <a:schemeClr val="bg1"/>
-                </a:solidFill>
-              </a:rPr>
-              <a:t>Multiple </a:t>
-            </a:r>
-            <a:r>
-              <a:rPr lang="en-US" altLang="zh-CN" dirty="0">
-                <a:solidFill>
-                  <a:schemeClr val="bg1"/>
-                </a:solidFill>
-              </a:rPr>
-              <a:t>Shape</a:t>
-            </a:r>
-            <a:endParaRPr lang="en-SG" dirty="0">
-              <a:solidFill>
-                <a:schemeClr val="bg1"/>
-              </a:solidFill>
-            </a:endParaRPr>
-          </a:p>
-        </p:txBody>
-      </p:sp>
-    </p:spTree>
-    <p:extLst>
-      <p:ext uri="{BB962C8B-B14F-4D97-AF65-F5344CB8AC3E}">
-        <p14:creationId xmlns:p14="http://schemas.microsoft.com/office/powerpoint/2010/main" val="2016151759"/>
+        <p14:creationId xmlns:p14="http://schemas.microsoft.com/office/powerpoint/2010/main" val="139879315"/>
       </p:ext>
     </p:extLst>
   </p:cSld>
@@ -10507,16 +12547,16 @@
       </p:grpSpPr>
       <p:sp>
         <p:nvSpPr>
-          <p:cNvPr id="11" name="Rectangle 1"/>
+          <p:cNvPr id="6" name="Triangle"/>
           <p:cNvSpPr/>
           <p:nvPr/>
         </p:nvSpPr>
         <p:spPr>
           <a:xfrm>
-            <a:off x="3429000" y="2438400"/>
-            <a:ext cx="2057400" cy="1371600"/>
+            <a:off x="3086100" y="3962400"/>
+            <a:ext cx="2743200" cy="2743200"/>
           </a:xfrm>
-          <a:prstGeom prst="rect">
+          <a:prstGeom prst="triangle">
             <a:avLst/>
           </a:prstGeom>
         </p:spPr>
@@ -10547,16 +12587,16 @@
       </p:sp>
       <p:sp>
         <p:nvSpPr>
-          <p:cNvPr id="14" name="Oval 2"/>
+          <p:cNvPr id="18" name="Triangle"/>
           <p:cNvSpPr/>
           <p:nvPr/>
         </p:nvSpPr>
         <p:spPr>
-          <a:xfrm rot="10848176">
-            <a:off x="1579648" y="2557934"/>
-            <a:ext cx="1066800" cy="1066800"/>
+          <a:xfrm rot="5272535">
+            <a:off x="877818" y="1834519"/>
+            <a:ext cx="2743200" cy="2743200"/>
           </a:xfrm>
-          <a:prstGeom prst="ellipse">
+          <a:prstGeom prst="triangle">
             <a:avLst/>
           </a:prstGeom>
         </p:spPr>
@@ -10587,7 +12627,93 @@
       </p:sp>
       <p:sp>
         <p:nvSpPr>
-          <p:cNvPr id="19" name="Oval 2"/>
+          <p:cNvPr id="16" name="Target"/>
+          <p:cNvSpPr/>
+          <p:nvPr/>
+        </p:nvSpPr>
+        <p:spPr>
+          <a:xfrm rot="10725280">
+            <a:off x="1579973" y="2641764"/>
+            <a:ext cx="1066800" cy="1066800"/>
+          </a:xfrm>
+          <a:prstGeom prst="ellipse">
+            <a:avLst/>
+          </a:prstGeom>
+          <a:solidFill>
+            <a:srgbClr val="00B050"/>
+          </a:solidFill>
+        </p:spPr>
+        <p:style>
+          <a:lnRef idx="2">
+            <a:schemeClr val="accent1">
+              <a:shade val="50000"/>
+            </a:schemeClr>
+          </a:lnRef>
+          <a:fillRef idx="1">
+            <a:schemeClr val="accent1"/>
+          </a:fillRef>
+          <a:effectRef idx="0">
+            <a:schemeClr val="accent1"/>
+          </a:effectRef>
+          <a:fontRef idx="minor">
+            <a:schemeClr val="lt1"/>
+          </a:fontRef>
+        </p:style>
+        <p:txBody>
+          <a:bodyPr rtlCol="0" anchor="ctr"/>
+          <a:lstStyle/>
+          <a:p>
+            <a:pPr algn="ctr"/>
+            <a:endParaRPr lang="zh-CN" altLang="en-US"/>
+          </a:p>
+        </p:txBody>
+      </p:sp>
+      <p:sp>
+        <p:nvSpPr>
+          <p:cNvPr id="14" name="Rectangle"/>
+          <p:cNvSpPr/>
+          <p:nvPr/>
+        </p:nvSpPr>
+        <p:spPr>
+          <a:xfrm>
+            <a:off x="3429000" y="2438400"/>
+            <a:ext cx="2057400" cy="1371600"/>
+          </a:xfrm>
+          <a:prstGeom prst="rect">
+            <a:avLst/>
+          </a:prstGeom>
+          <a:solidFill>
+            <a:srgbClr val="FF0000"/>
+          </a:solidFill>
+        </p:spPr>
+        <p:style>
+          <a:lnRef idx="2">
+            <a:schemeClr val="accent1">
+              <a:shade val="50000"/>
+            </a:schemeClr>
+          </a:lnRef>
+          <a:fillRef idx="1">
+            <a:schemeClr val="accent1"/>
+          </a:fillRef>
+          <a:effectRef idx="0">
+            <a:schemeClr val="accent1"/>
+          </a:effectRef>
+          <a:fontRef idx="minor">
+            <a:schemeClr val="lt1"/>
+          </a:fontRef>
+        </p:style>
+        <p:txBody>
+          <a:bodyPr rtlCol="0" anchor="ctr"/>
+          <a:lstStyle/>
+          <a:p>
+            <a:pPr algn="ctr"/>
+            <a:endParaRPr lang="zh-CN" altLang="en-US"/>
+          </a:p>
+        </p:txBody>
+      </p:sp>
+      <p:sp>
+        <p:nvSpPr>
+          <p:cNvPr id="17" name="Oval"/>
           <p:cNvSpPr/>
           <p:nvPr/>
         </p:nvSpPr>
@@ -10625,90 +12751,10 @@
           </a:p>
         </p:txBody>
       </p:sp>
-      <p:sp>
-        <p:nvSpPr>
-          <p:cNvPr id="20" name="Isosceles Triangle 3"/>
-          <p:cNvSpPr/>
-          <p:nvPr/>
-        </p:nvSpPr>
-        <p:spPr>
-          <a:xfrm>
-            <a:off x="3838956" y="4724400"/>
-            <a:ext cx="1237488" cy="1066800"/>
-          </a:xfrm>
-          <a:prstGeom prst="triangle">
-            <a:avLst/>
-          </a:prstGeom>
-        </p:spPr>
-        <p:style>
-          <a:lnRef idx="2">
-            <a:schemeClr val="accent1">
-              <a:shade val="50000"/>
-            </a:schemeClr>
-          </a:lnRef>
-          <a:fillRef idx="1">
-            <a:schemeClr val="accent1"/>
-          </a:fillRef>
-          <a:effectRef idx="0">
-            <a:schemeClr val="accent1"/>
-          </a:effectRef>
-          <a:fontRef idx="minor">
-            <a:schemeClr val="lt1"/>
-          </a:fontRef>
-        </p:style>
-        <p:txBody>
-          <a:bodyPr rtlCol="0" anchor="ctr"/>
-          <a:lstStyle/>
-          <a:p>
-            <a:pPr algn="ctr"/>
-            <a:endParaRPr lang="zh-CN" altLang="en-US"/>
-          </a:p>
-        </p:txBody>
-      </p:sp>
-      <p:sp>
-        <p:nvSpPr>
-          <p:cNvPr id="15" name="Isosceles Triangle 3"/>
-          <p:cNvSpPr/>
-          <p:nvPr/>
-        </p:nvSpPr>
-        <p:spPr>
-          <a:xfrm rot="10848176">
-            <a:off x="3868859" y="457409"/>
-            <a:ext cx="1237488" cy="1066800"/>
-          </a:xfrm>
-          <a:prstGeom prst="triangle">
-            <a:avLst/>
-          </a:prstGeom>
-        </p:spPr>
-        <p:style>
-          <a:lnRef idx="2">
-            <a:schemeClr val="accent1">
-              <a:shade val="50000"/>
-            </a:schemeClr>
-          </a:lnRef>
-          <a:fillRef idx="1">
-            <a:schemeClr val="accent1"/>
-          </a:fillRef>
-          <a:effectRef idx="0">
-            <a:schemeClr val="accent1"/>
-          </a:effectRef>
-          <a:fontRef idx="minor">
-            <a:schemeClr val="lt1"/>
-          </a:fontRef>
-        </p:style>
-        <p:txBody>
-          <a:bodyPr rtlCol="0" anchor="ctr"/>
-          <a:lstStyle/>
-          <a:p>
-            <a:pPr algn="ctr"/>
-            <a:endParaRPr lang="zh-CN" altLang="en-US"/>
-          </a:p>
-        </p:txBody>
-      </p:sp>
     </p:spTree>
     <p:extLst>
       <p:ext uri="{BB962C8B-B14F-4D97-AF65-F5344CB8AC3E}">
-        <p14:creationId xmlns:p14="http://schemas.microsoft.com/office/powerpoint/2010/main" val="3723317650"/>
+        <p14:creationId xmlns:p14="http://schemas.microsoft.com/office/powerpoint/2010/main" val="2296972090"/>
       </p:ext>
     </p:extLst>
   </p:cSld>
@@ -10728,6 +12774,14 @@
 <file path=ppt/slides/slide9.xml><?xml version="1.0" encoding="utf-8"?>
 <p:sld xmlns:a="http://schemas.openxmlformats.org/drawingml/2006/main" xmlns:r="http://schemas.openxmlformats.org/officeDocument/2006/relationships" xmlns:p="http://schemas.openxmlformats.org/presentationml/2006/main">
   <p:cSld>
+    <p:bg>
+      <p:bgPr>
+        <a:solidFill>
+          <a:srgbClr val="0070C0"/>
+        </a:solidFill>
+        <a:effectLst/>
+      </p:bgPr>
+    </p:bg>
     <p:spTree>
       <p:nvGrpSpPr>
         <p:cNvPr id="1" name=""/>
@@ -10744,368 +12798,54 @@
       </p:grpSpPr>
       <p:sp>
         <p:nvSpPr>
-          <p:cNvPr id="11" name="Rectangle 1"/>
-          <p:cNvSpPr/>
-          <p:nvPr/>
+          <p:cNvPr id="4" name="Title 1"/>
+          <p:cNvSpPr>
+            <a:spLocks noGrp="1"/>
+          </p:cNvSpPr>
+          <p:nvPr>
+            <p:ph type="title"/>
+          </p:nvPr>
         </p:nvSpPr>
         <p:spPr>
           <a:xfrm>
-            <a:off x="3429000" y="2438400"/>
-            <a:ext cx="2057400" cy="1371600"/>
+            <a:off x="304800" y="1066800"/>
+            <a:ext cx="8229600" cy="1143000"/>
           </a:xfrm>
-          <a:prstGeom prst="rect">
-            <a:avLst/>
-          </a:prstGeom>
         </p:spPr>
-        <p:style>
-          <a:lnRef idx="2">
-            <a:schemeClr val="accent1">
-              <a:shade val="50000"/>
-            </a:schemeClr>
-          </a:lnRef>
-          <a:fillRef idx="1">
-            <a:schemeClr val="accent1"/>
-          </a:fillRef>
-          <a:effectRef idx="0">
-            <a:schemeClr val="accent1"/>
-          </a:effectRef>
-          <a:fontRef idx="minor">
-            <a:schemeClr val="lt1"/>
-          </a:fontRef>
-        </p:style>
-        <p:txBody>
-          <a:bodyPr rtlCol="0" anchor="ctr"/>
-          <a:lstStyle/>
-          <a:p>
-            <a:pPr algn="ctr"/>
-            <a:endParaRPr lang="zh-CN" altLang="en-US"/>
-          </a:p>
-        </p:txBody>
-      </p:sp>
-      <p:sp>
-        <p:nvSpPr>
-          <p:cNvPr id="12" name="Oval 2"/>
-          <p:cNvSpPr/>
-          <p:nvPr/>
-        </p:nvSpPr>
-        <p:spPr>
-          <a:xfrm rot="13498768">
-            <a:off x="2265628" y="933306"/>
-            <a:ext cx="1066800" cy="1066800"/>
-          </a:xfrm>
-          <a:prstGeom prst="ellipse">
-            <a:avLst/>
-          </a:prstGeom>
-        </p:spPr>
-        <p:style>
-          <a:lnRef idx="2">
-            <a:schemeClr val="accent1">
-              <a:shade val="50000"/>
-            </a:schemeClr>
-          </a:lnRef>
-          <a:fillRef idx="1">
-            <a:schemeClr val="accent1"/>
-          </a:fillRef>
-          <a:effectRef idx="0">
-            <a:schemeClr val="accent1"/>
-          </a:effectRef>
-          <a:fontRef idx="minor">
-            <a:schemeClr val="lt1"/>
-          </a:fontRef>
-        </p:style>
-        <p:txBody>
-          <a:bodyPr rtlCol="0" anchor="ctr"/>
-          <a:lstStyle/>
-          <a:p>
-            <a:pPr algn="ctr"/>
-            <a:endParaRPr lang="zh-CN" altLang="en-US"/>
-          </a:p>
-        </p:txBody>
-      </p:sp>
-      <p:sp>
-        <p:nvSpPr>
-          <p:cNvPr id="13" name="Oval 2"/>
-          <p:cNvSpPr/>
-          <p:nvPr/>
-        </p:nvSpPr>
-        <p:spPr>
-          <a:xfrm>
-            <a:off x="6269182" y="2590800"/>
-            <a:ext cx="1066800" cy="1066800"/>
-          </a:xfrm>
-          <a:prstGeom prst="ellipse">
-            <a:avLst/>
-          </a:prstGeom>
-        </p:spPr>
-        <p:style>
-          <a:lnRef idx="2">
-            <a:schemeClr val="accent1">
-              <a:shade val="50000"/>
-            </a:schemeClr>
-          </a:lnRef>
-          <a:fillRef idx="1">
-            <a:schemeClr val="accent1"/>
-          </a:fillRef>
-          <a:effectRef idx="0">
-            <a:schemeClr val="accent1"/>
-          </a:effectRef>
-          <a:fontRef idx="minor">
-            <a:schemeClr val="lt1"/>
-          </a:fontRef>
-        </p:style>
-        <p:txBody>
-          <a:bodyPr rtlCol="0" anchor="ctr"/>
-          <a:lstStyle/>
-          <a:p>
-            <a:pPr algn="ctr"/>
-            <a:endParaRPr lang="zh-CN" altLang="en-US"/>
-          </a:p>
-        </p:txBody>
-      </p:sp>
-      <p:sp>
-        <p:nvSpPr>
-          <p:cNvPr id="14" name="Isosceles Triangle 3"/>
-          <p:cNvSpPr/>
-          <p:nvPr/>
-        </p:nvSpPr>
-        <p:spPr>
-          <a:xfrm>
-            <a:off x="3838956" y="4724400"/>
-            <a:ext cx="1237488" cy="1066800"/>
-          </a:xfrm>
-          <a:prstGeom prst="triangle">
-            <a:avLst/>
-          </a:prstGeom>
-        </p:spPr>
-        <p:style>
-          <a:lnRef idx="2">
-            <a:schemeClr val="accent1">
-              <a:shade val="50000"/>
-            </a:schemeClr>
-          </a:lnRef>
-          <a:fillRef idx="1">
-            <a:schemeClr val="accent1"/>
-          </a:fillRef>
-          <a:effectRef idx="0">
-            <a:schemeClr val="accent1"/>
-          </a:effectRef>
-          <a:fontRef idx="minor">
-            <a:schemeClr val="lt1"/>
-          </a:fontRef>
-        </p:style>
-        <p:txBody>
-          <a:bodyPr rtlCol="0" anchor="ctr"/>
-          <a:lstStyle/>
-          <a:p>
-            <a:pPr algn="ctr"/>
-            <a:endParaRPr lang="zh-CN" altLang="en-US"/>
-          </a:p>
-        </p:txBody>
-      </p:sp>
-      <p:sp>
-        <p:nvSpPr>
-          <p:cNvPr id="16" name="Isosceles Triangle 3"/>
-          <p:cNvSpPr/>
-          <p:nvPr/>
-        </p:nvSpPr>
-        <p:spPr>
-          <a:xfrm rot="10848176">
-            <a:off x="3868859" y="457409"/>
-            <a:ext cx="1237488" cy="1066800"/>
-          </a:xfrm>
-          <a:prstGeom prst="triangle">
-            <a:avLst/>
-          </a:prstGeom>
-        </p:spPr>
-        <p:style>
-          <a:lnRef idx="2">
-            <a:schemeClr val="accent1">
-              <a:shade val="50000"/>
-            </a:schemeClr>
-          </a:lnRef>
-          <a:fillRef idx="1">
-            <a:schemeClr val="accent1"/>
-          </a:fillRef>
-          <a:effectRef idx="0">
-            <a:schemeClr val="accent1"/>
-          </a:effectRef>
-          <a:fontRef idx="minor">
-            <a:schemeClr val="lt1"/>
-          </a:fontRef>
-        </p:style>
-        <p:txBody>
-          <a:bodyPr rtlCol="0" anchor="ctr"/>
-          <a:lstStyle/>
-          <a:p>
-            <a:pPr algn="ctr"/>
-            <a:endParaRPr lang="zh-CN" altLang="en-US"/>
-          </a:p>
-        </p:txBody>
-      </p:sp>
-      <p:sp>
-        <p:nvSpPr>
-          <p:cNvPr id="17" name="Oval 2"/>
-          <p:cNvSpPr/>
-          <p:nvPr/>
-        </p:nvSpPr>
-        <p:spPr>
-          <a:xfrm rot="10848176">
-            <a:off x="1579648" y="2557934"/>
-            <a:ext cx="1066800" cy="1066800"/>
-          </a:xfrm>
-          <a:prstGeom prst="ellipse">
-            <a:avLst/>
-          </a:prstGeom>
-        </p:spPr>
-        <p:style>
-          <a:lnRef idx="2">
-            <a:schemeClr val="accent1">
-              <a:shade val="50000"/>
-            </a:schemeClr>
-          </a:lnRef>
-          <a:fillRef idx="1">
-            <a:schemeClr val="accent1"/>
-          </a:fillRef>
-          <a:effectRef idx="0">
-            <a:schemeClr val="accent1"/>
-          </a:effectRef>
-          <a:fontRef idx="minor">
-            <a:schemeClr val="lt1"/>
-          </a:fontRef>
-        </p:style>
-        <p:txBody>
-          <a:bodyPr rtlCol="0" anchor="ctr"/>
-          <a:lstStyle/>
-          <a:p>
-            <a:pPr algn="ctr"/>
-            <a:endParaRPr lang="zh-CN" altLang="en-US"/>
-          </a:p>
-        </p:txBody>
-      </p:sp>
-      <p:sp>
-        <p:nvSpPr>
-          <p:cNvPr id="18" name="Isosceles Triangle 3"/>
-          <p:cNvSpPr/>
-          <p:nvPr/>
-        </p:nvSpPr>
-        <p:spPr>
-          <a:xfrm rot="2932399">
-            <a:off x="2231804" y="3994128"/>
-            <a:ext cx="1237488" cy="1066800"/>
-          </a:xfrm>
-          <a:prstGeom prst="triangle">
-            <a:avLst/>
-          </a:prstGeom>
-        </p:spPr>
-        <p:style>
-          <a:lnRef idx="2">
-            <a:schemeClr val="accent1">
-              <a:shade val="50000"/>
-            </a:schemeClr>
-          </a:lnRef>
-          <a:fillRef idx="1">
-            <a:schemeClr val="accent1"/>
-          </a:fillRef>
-          <a:effectRef idx="0">
-            <a:schemeClr val="accent1"/>
-          </a:effectRef>
-          <a:fontRef idx="minor">
-            <a:schemeClr val="lt1"/>
-          </a:fontRef>
-        </p:style>
-        <p:txBody>
-          <a:bodyPr rtlCol="0" anchor="ctr"/>
-          <a:lstStyle/>
-          <a:p>
-            <a:pPr algn="ctr"/>
-            <a:endParaRPr lang="zh-CN" altLang="en-US"/>
-          </a:p>
-        </p:txBody>
-      </p:sp>
-      <p:sp>
-        <p:nvSpPr>
-          <p:cNvPr id="19" name="Oval 2"/>
-          <p:cNvSpPr/>
-          <p:nvPr/>
-        </p:nvSpPr>
-        <p:spPr>
-          <a:xfrm rot="2932399">
-            <a:off x="5466586" y="4357103"/>
-            <a:ext cx="1066800" cy="1066800"/>
-          </a:xfrm>
-          <a:prstGeom prst="ellipse">
-            <a:avLst/>
-          </a:prstGeom>
-        </p:spPr>
-        <p:style>
-          <a:lnRef idx="2">
-            <a:schemeClr val="accent1">
-              <a:shade val="50000"/>
-            </a:schemeClr>
-          </a:lnRef>
-          <a:fillRef idx="1">
-            <a:schemeClr val="accent1"/>
-          </a:fillRef>
-          <a:effectRef idx="0">
-            <a:schemeClr val="accent1"/>
-          </a:effectRef>
-          <a:fontRef idx="minor">
-            <a:schemeClr val="lt1"/>
-          </a:fontRef>
-        </p:style>
-        <p:txBody>
-          <a:bodyPr rtlCol="0" anchor="ctr"/>
-          <a:lstStyle/>
-          <a:p>
-            <a:pPr algn="ctr"/>
-            <a:endParaRPr lang="zh-CN" altLang="en-US"/>
-          </a:p>
-        </p:txBody>
-      </p:sp>
-      <p:sp>
-        <p:nvSpPr>
-          <p:cNvPr id="15" name="Isosceles Triangle 3"/>
-          <p:cNvSpPr/>
-          <p:nvPr/>
-        </p:nvSpPr>
-        <p:spPr>
-          <a:xfrm rot="13498768">
-            <a:off x="5347102" y="1081574"/>
-            <a:ext cx="1237488" cy="1066800"/>
-          </a:xfrm>
-          <a:prstGeom prst="triangle">
-            <a:avLst/>
-          </a:prstGeom>
-        </p:spPr>
-        <p:style>
-          <a:lnRef idx="2">
-            <a:schemeClr val="accent1">
-              <a:shade val="50000"/>
-            </a:schemeClr>
-          </a:lnRef>
-          <a:fillRef idx="1">
-            <a:schemeClr val="accent1"/>
-          </a:fillRef>
-          <a:effectRef idx="0">
-            <a:schemeClr val="accent1"/>
-          </a:effectRef>
-          <a:fontRef idx="minor">
-            <a:schemeClr val="lt1"/>
-          </a:fontRef>
-        </p:style>
-        <p:txBody>
-          <a:bodyPr rtlCol="0" anchor="ctr"/>
-          <a:lstStyle/>
-          <a:p>
-            <a:pPr algn="ctr"/>
-            <a:endParaRPr lang="zh-CN" altLang="en-US"/>
+        <p:txBody>
+          <a:bodyPr>
+            <a:normAutofit fontScale="90000"/>
+          </a:bodyPr>
+          <a:lstStyle/>
+          <a:p>
+            <a:r>
+              <a:rPr lang="en-US" altLang="zh-CN" dirty="0">
+                <a:solidFill>
+                  <a:schemeClr val="bg1"/>
+                </a:solidFill>
+              </a:rPr>
+              <a:t>Duplicate and Rotate:: </a:t>
+            </a:r>
+            <a:r>
+              <a:rPr lang="en-US" altLang="zh-CN" dirty="0" smtClean="0">
+                <a:solidFill>
+                  <a:schemeClr val="bg1"/>
+                </a:solidFill>
+              </a:rPr>
+              <a:t>Multiple Shape (Fixed)</a:t>
+            </a:r>
+            <a:endParaRPr lang="en-SG" dirty="0">
+              <a:solidFill>
+                <a:schemeClr val="bg1"/>
+              </a:solidFill>
+            </a:endParaRPr>
           </a:p>
         </p:txBody>
       </p:sp>
     </p:spTree>
     <p:extLst>
       <p:ext uri="{BB962C8B-B14F-4D97-AF65-F5344CB8AC3E}">
-        <p14:creationId xmlns:p14="http://schemas.microsoft.com/office/powerpoint/2010/main" val="1763879570"/>
+        <p14:creationId xmlns:p14="http://schemas.microsoft.com/office/powerpoint/2010/main" val="2016151759"/>
       </p:ext>
     </p:extLst>
   </p:cSld>
@@ -11975,4 +13715,265 @@
   <a:objectDefaults/>
   <a:extraClrSchemeLst/>
 </a:theme>
+</file>
+
+<file path=ppt/theme/theme4.xml><?xml version="1.0" encoding="utf-8"?>
+<a:theme xmlns:a="http://schemas.openxmlformats.org/drawingml/2006/main" name="Office Theme">
+  <a:themeElements>
+    <a:clrScheme name="Office">
+      <a:dk1>
+        <a:sysClr val="windowText" lastClr="000000"/>
+      </a:dk1>
+      <a:lt1>
+        <a:sysClr val="window" lastClr="FFFFFF"/>
+      </a:lt1>
+      <a:dk2>
+        <a:srgbClr val="44546A"/>
+      </a:dk2>
+      <a:lt2>
+        <a:srgbClr val="E7E6E6"/>
+      </a:lt2>
+      <a:accent1>
+        <a:srgbClr val="5B9BD5"/>
+      </a:accent1>
+      <a:accent2>
+        <a:srgbClr val="ED7D31"/>
+      </a:accent2>
+      <a:accent3>
+        <a:srgbClr val="A5A5A5"/>
+      </a:accent3>
+      <a:accent4>
+        <a:srgbClr val="FFC000"/>
+      </a:accent4>
+      <a:accent5>
+        <a:srgbClr val="4472C4"/>
+      </a:accent5>
+      <a:accent6>
+        <a:srgbClr val="70AD47"/>
+      </a:accent6>
+      <a:hlink>
+        <a:srgbClr val="0563C1"/>
+      </a:hlink>
+      <a:folHlink>
+        <a:srgbClr val="954F72"/>
+      </a:folHlink>
+    </a:clrScheme>
+    <a:fontScheme name="Office">
+      <a:majorFont>
+        <a:latin typeface="Calibri Light" panose="020F0302020204030204"/>
+        <a:ea typeface=""/>
+        <a:cs typeface=""/>
+        <a:font script="Jpan" typeface="ＭＳ Ｐゴシック"/>
+        <a:font script="Hang" typeface="맑은 고딕"/>
+        <a:font script="Hans" typeface="宋体"/>
+        <a:font script="Hant" typeface="新細明體"/>
+        <a:font script="Arab" typeface="Times New Roman"/>
+        <a:font script="Hebr" typeface="Times New Roman"/>
+        <a:font script="Thai" typeface="Angsana New"/>
+        <a:font script="Ethi" typeface="Nyala"/>
+        <a:font script="Beng" typeface="Vrinda"/>
+        <a:font script="Gujr" typeface="Shruti"/>
+        <a:font script="Khmr" typeface="MoolBoran"/>
+        <a:font script="Knda" typeface="Tunga"/>
+        <a:font script="Guru" typeface="Raavi"/>
+        <a:font script="Cans" typeface="Euphemia"/>
+        <a:font script="Cher" typeface="Plantagenet Cherokee"/>
+        <a:font script="Yiii" typeface="Microsoft Yi Baiti"/>
+        <a:font script="Tibt" typeface="Microsoft Himalaya"/>
+        <a:font script="Thaa" typeface="MV Boli"/>
+        <a:font script="Deva" typeface="Mangal"/>
+        <a:font script="Telu" typeface="Gautami"/>
+        <a:font script="Taml" typeface="Latha"/>
+        <a:font script="Syrc" typeface="Estrangelo Edessa"/>
+        <a:font script="Orya" typeface="Kalinga"/>
+        <a:font script="Mlym" typeface="Kartika"/>
+        <a:font script="Laoo" typeface="DokChampa"/>
+        <a:font script="Sinh" typeface="Iskoola Pota"/>
+        <a:font script="Mong" typeface="Mongolian Baiti"/>
+        <a:font script="Viet" typeface="Times New Roman"/>
+        <a:font script="Uigh" typeface="Microsoft Uighur"/>
+        <a:font script="Geor" typeface="Sylfaen"/>
+      </a:majorFont>
+      <a:minorFont>
+        <a:latin typeface="Calibri" panose="020F0502020204030204"/>
+        <a:ea typeface=""/>
+        <a:cs typeface=""/>
+        <a:font script="Jpan" typeface="ＭＳ Ｐゴシック"/>
+        <a:font script="Hang" typeface="맑은 고딕"/>
+        <a:font script="Hans" typeface="宋体"/>
+        <a:font script="Hant" typeface="新細明體"/>
+        <a:font script="Arab" typeface="Arial"/>
+        <a:font script="Hebr" typeface="Arial"/>
+        <a:font script="Thai" typeface="Cordia New"/>
+        <a:font script="Ethi" typeface="Nyala"/>
+        <a:font script="Beng" typeface="Vrinda"/>
+        <a:font script="Gujr" typeface="Shruti"/>
+        <a:font script="Khmr" typeface="DaunPenh"/>
+        <a:font script="Knda" typeface="Tunga"/>
+        <a:font script="Guru" typeface="Raavi"/>
+        <a:font script="Cans" typeface="Euphemia"/>
+        <a:font script="Cher" typeface="Plantagenet Cherokee"/>
+        <a:font script="Yiii" typeface="Microsoft Yi Baiti"/>
+        <a:font script="Tibt" typeface="Microsoft Himalaya"/>
+        <a:font script="Thaa" typeface="MV Boli"/>
+        <a:font script="Deva" typeface="Mangal"/>
+        <a:font script="Telu" typeface="Gautami"/>
+        <a:font script="Taml" typeface="Latha"/>
+        <a:font script="Syrc" typeface="Estrangelo Edessa"/>
+        <a:font script="Orya" typeface="Kalinga"/>
+        <a:font script="Mlym" typeface="Kartika"/>
+        <a:font script="Laoo" typeface="DokChampa"/>
+        <a:font script="Sinh" typeface="Iskoola Pota"/>
+        <a:font script="Mong" typeface="Mongolian Baiti"/>
+        <a:font script="Viet" typeface="Arial"/>
+        <a:font script="Uigh" typeface="Microsoft Uighur"/>
+        <a:font script="Geor" typeface="Sylfaen"/>
+      </a:minorFont>
+    </a:fontScheme>
+    <a:fmtScheme name="Office">
+      <a:fillStyleLst>
+        <a:solidFill>
+          <a:schemeClr val="phClr"/>
+        </a:solidFill>
+        <a:gradFill rotWithShape="1">
+          <a:gsLst>
+            <a:gs pos="0">
+              <a:schemeClr val="phClr">
+                <a:lumMod val="110000"/>
+                <a:satMod val="105000"/>
+                <a:tint val="67000"/>
+              </a:schemeClr>
+            </a:gs>
+            <a:gs pos="50000">
+              <a:schemeClr val="phClr">
+                <a:lumMod val="105000"/>
+                <a:satMod val="103000"/>
+                <a:tint val="73000"/>
+              </a:schemeClr>
+            </a:gs>
+            <a:gs pos="100000">
+              <a:schemeClr val="phClr">
+                <a:lumMod val="105000"/>
+                <a:satMod val="109000"/>
+                <a:tint val="81000"/>
+              </a:schemeClr>
+            </a:gs>
+          </a:gsLst>
+          <a:lin ang="5400000" scaled="0"/>
+        </a:gradFill>
+        <a:gradFill rotWithShape="1">
+          <a:gsLst>
+            <a:gs pos="0">
+              <a:schemeClr val="phClr">
+                <a:satMod val="103000"/>
+                <a:lumMod val="102000"/>
+                <a:tint val="94000"/>
+              </a:schemeClr>
+            </a:gs>
+            <a:gs pos="50000">
+              <a:schemeClr val="phClr">
+                <a:satMod val="110000"/>
+                <a:lumMod val="100000"/>
+                <a:shade val="100000"/>
+              </a:schemeClr>
+            </a:gs>
+            <a:gs pos="100000">
+              <a:schemeClr val="phClr">
+                <a:lumMod val="99000"/>
+                <a:satMod val="120000"/>
+                <a:shade val="78000"/>
+              </a:schemeClr>
+            </a:gs>
+          </a:gsLst>
+          <a:lin ang="5400000" scaled="0"/>
+        </a:gradFill>
+      </a:fillStyleLst>
+      <a:lnStyleLst>
+        <a:ln w="6350" cap="flat" cmpd="sng" algn="ctr">
+          <a:solidFill>
+            <a:schemeClr val="phClr"/>
+          </a:solidFill>
+          <a:prstDash val="solid"/>
+          <a:miter lim="800000"/>
+        </a:ln>
+        <a:ln w="12700" cap="flat" cmpd="sng" algn="ctr">
+          <a:solidFill>
+            <a:schemeClr val="phClr"/>
+          </a:solidFill>
+          <a:prstDash val="solid"/>
+          <a:miter lim="800000"/>
+        </a:ln>
+        <a:ln w="19050" cap="flat" cmpd="sng" algn="ctr">
+          <a:solidFill>
+            <a:schemeClr val="phClr"/>
+          </a:solidFill>
+          <a:prstDash val="solid"/>
+          <a:miter lim="800000"/>
+        </a:ln>
+      </a:lnStyleLst>
+      <a:effectStyleLst>
+        <a:effectStyle>
+          <a:effectLst/>
+        </a:effectStyle>
+        <a:effectStyle>
+          <a:effectLst/>
+        </a:effectStyle>
+        <a:effectStyle>
+          <a:effectLst>
+            <a:outerShdw blurRad="57150" dist="19050" dir="5400000" algn="ctr" rotWithShape="0">
+              <a:srgbClr val="000000">
+                <a:alpha val="63000"/>
+              </a:srgbClr>
+            </a:outerShdw>
+          </a:effectLst>
+        </a:effectStyle>
+      </a:effectStyleLst>
+      <a:bgFillStyleLst>
+        <a:solidFill>
+          <a:schemeClr val="phClr"/>
+        </a:solidFill>
+        <a:solidFill>
+          <a:schemeClr val="phClr">
+            <a:tint val="95000"/>
+            <a:satMod val="170000"/>
+          </a:schemeClr>
+        </a:solidFill>
+        <a:gradFill rotWithShape="1">
+          <a:gsLst>
+            <a:gs pos="0">
+              <a:schemeClr val="phClr">
+                <a:tint val="93000"/>
+                <a:satMod val="150000"/>
+                <a:shade val="98000"/>
+                <a:lumMod val="102000"/>
+              </a:schemeClr>
+            </a:gs>
+            <a:gs pos="50000">
+              <a:schemeClr val="phClr">
+                <a:tint val="98000"/>
+                <a:satMod val="130000"/>
+                <a:shade val="90000"/>
+                <a:lumMod val="103000"/>
+              </a:schemeClr>
+            </a:gs>
+            <a:gs pos="100000">
+              <a:schemeClr val="phClr">
+                <a:shade val="63000"/>
+                <a:satMod val="120000"/>
+              </a:schemeClr>
+            </a:gs>
+          </a:gsLst>
+          <a:lin ang="5400000" scaled="0"/>
+        </a:gradFill>
+      </a:bgFillStyleLst>
+    </a:fmtScheme>
+  </a:themeElements>
+  <a:objectDefaults/>
+  <a:extraClrSchemeLst/>
+  <a:extLst>
+    <a:ext uri="{05A4C25C-085E-4340-85A3-A5531E510DB2}">
+      <thm15:themeFamily xmlns:thm15="http://schemas.microsoft.com/office/thememl/2012/main" name="Office Theme" id="{62F939B6-93AF-4DB8-9C6B-D6C7DFDC589F}" vid="{4A3C46E8-61CC-4603-A589-7422A47A8E4A}"/>
+    </a:ext>
+  </a:extLst>
+</a:theme>
 </file>
</xml_diff>

<commit_message>
Write Test for Rotate or Duplicate and Rotate function #1053 (#1091)
* Add PositionsLabController and interface for tests

* Add FT for Duplicate and Rotate

* Fix bug where DuplicateAndRotateTest causes other tests to fail
</commit_message>
<xml_diff>
--- a/doc/test/PositionsLab/PositionsLabDuplicateAndRotate.pptx
+++ b/doc/test/PositionsLab/PositionsLabDuplicateAndRotate.pptx
@@ -6,17 +6,25 @@
     <p:sldMasterId id="2147483660" r:id="rId2"/>
     <p:sldMasterId id="2147483672" r:id="rId3"/>
   </p:sldMasterIdLst>
+  <p:notesMasterIdLst>
+    <p:notesMasterId r:id="rId19"/>
+  </p:notesMasterIdLst>
   <p:sldIdLst>
     <p:sldId id="287" r:id="rId4"/>
     <p:sldId id="256" r:id="rId5"/>
-    <p:sldId id="288" r:id="rId6"/>
-    <p:sldId id="292" r:id="rId7"/>
-    <p:sldId id="290" r:id="rId8"/>
-    <p:sldId id="294" r:id="rId9"/>
-    <p:sldId id="293" r:id="rId10"/>
-    <p:sldId id="291" r:id="rId11"/>
-    <p:sldId id="295" r:id="rId12"/>
-    <p:sldId id="274" r:id="rId13"/>
+    <p:sldId id="292" r:id="rId6"/>
+    <p:sldId id="311" r:id="rId7"/>
+    <p:sldId id="312" r:id="rId8"/>
+    <p:sldId id="299" r:id="rId9"/>
+    <p:sldId id="313" r:id="rId10"/>
+    <p:sldId id="314" r:id="rId11"/>
+    <p:sldId id="293" r:id="rId12"/>
+    <p:sldId id="315" r:id="rId13"/>
+    <p:sldId id="316" r:id="rId14"/>
+    <p:sldId id="301" r:id="rId15"/>
+    <p:sldId id="317" r:id="rId16"/>
+    <p:sldId id="318" r:id="rId17"/>
+    <p:sldId id="274" r:id="rId18"/>
   </p:sldIdLst>
   <p:sldSz cx="9144000" cy="6858000" type="screen4x3"/>
   <p:notesSz cx="6858000" cy="9144000"/>
@@ -126,13 +134,18 @@
         <p14:section name="Align by Slide" id="{A3A2B0AB-762C-4281-AA7B-EF7E134E0DC4}">
           <p14:sldIdLst>
             <p14:sldId id="256"/>
-            <p14:sldId id="288"/>
             <p14:sldId id="292"/>
-            <p14:sldId id="290"/>
-            <p14:sldId id="294"/>
+            <p14:sldId id="311"/>
+            <p14:sldId id="312"/>
+            <p14:sldId id="299"/>
+            <p14:sldId id="313"/>
+            <p14:sldId id="314"/>
             <p14:sldId id="293"/>
-            <p14:sldId id="291"/>
-            <p14:sldId id="295"/>
+            <p14:sldId id="315"/>
+            <p14:sldId id="316"/>
+            <p14:sldId id="301"/>
+            <p14:sldId id="317"/>
+            <p14:sldId id="318"/>
             <p14:sldId id="274"/>
           </p14:sldIdLst>
         </p14:section>
@@ -143,6 +156,1040 @@
     </p:ext>
   </p:extLst>
 </p:presentation>
+</file>
+
+<file path=ppt/notesMasters/notesMaster1.xml><?xml version="1.0" encoding="utf-8"?>
+<p:notesMaster xmlns:a="http://schemas.openxmlformats.org/drawingml/2006/main" xmlns:r="http://schemas.openxmlformats.org/officeDocument/2006/relationships" xmlns:p="http://schemas.openxmlformats.org/presentationml/2006/main">
+  <p:cSld>
+    <p:bg>
+      <p:bgRef idx="1001">
+        <a:schemeClr val="bg1"/>
+      </p:bgRef>
+    </p:bg>
+    <p:spTree>
+      <p:nvGrpSpPr>
+        <p:cNvPr id="1" name=""/>
+        <p:cNvGrpSpPr/>
+        <p:nvPr/>
+      </p:nvGrpSpPr>
+      <p:grpSpPr>
+        <a:xfrm>
+          <a:off x="0" y="0"/>
+          <a:ext cx="0" cy="0"/>
+          <a:chOff x="0" y="0"/>
+          <a:chExt cx="0" cy="0"/>
+        </a:xfrm>
+      </p:grpSpPr>
+      <p:sp>
+        <p:nvSpPr>
+          <p:cNvPr id="2" name="Header Placeholder 1"/>
+          <p:cNvSpPr>
+            <a:spLocks noGrp="1"/>
+          </p:cNvSpPr>
+          <p:nvPr>
+            <p:ph type="hdr" sz="quarter"/>
+          </p:nvPr>
+        </p:nvSpPr>
+        <p:spPr>
+          <a:xfrm>
+            <a:off x="0" y="0"/>
+            <a:ext cx="2971800" cy="458788"/>
+          </a:xfrm>
+          <a:prstGeom prst="rect">
+            <a:avLst/>
+          </a:prstGeom>
+        </p:spPr>
+        <p:txBody>
+          <a:bodyPr vert="horz" lIns="91440" tIns="45720" rIns="91440" bIns="45720" rtlCol="0"/>
+          <a:lstStyle>
+            <a:lvl1pPr algn="l">
+              <a:defRPr sz="1200"/>
+            </a:lvl1pPr>
+          </a:lstStyle>
+          <a:p>
+            <a:endParaRPr lang="en-US"/>
+          </a:p>
+        </p:txBody>
+      </p:sp>
+      <p:sp>
+        <p:nvSpPr>
+          <p:cNvPr id="3" name="Date Placeholder 2"/>
+          <p:cNvSpPr>
+            <a:spLocks noGrp="1"/>
+          </p:cNvSpPr>
+          <p:nvPr>
+            <p:ph type="dt" idx="1"/>
+          </p:nvPr>
+        </p:nvSpPr>
+        <p:spPr>
+          <a:xfrm>
+            <a:off x="3884613" y="0"/>
+            <a:ext cx="2971800" cy="458788"/>
+          </a:xfrm>
+          <a:prstGeom prst="rect">
+            <a:avLst/>
+          </a:prstGeom>
+        </p:spPr>
+        <p:txBody>
+          <a:bodyPr vert="horz" lIns="91440" tIns="45720" rIns="91440" bIns="45720" rtlCol="0"/>
+          <a:lstStyle>
+            <a:lvl1pPr algn="r">
+              <a:defRPr sz="1200"/>
+            </a:lvl1pPr>
+          </a:lstStyle>
+          <a:p>
+            <a:fld id="{9A2C7DD3-3792-403E-9984-1895DFC9D0FA}" type="datetimeFigureOut">
+              <a:rPr lang="en-US" smtClean="0"/>
+              <a:t>1/29/2017</a:t>
+            </a:fld>
+            <a:endParaRPr lang="en-US"/>
+          </a:p>
+        </p:txBody>
+      </p:sp>
+      <p:sp>
+        <p:nvSpPr>
+          <p:cNvPr id="4" name="Slide Image Placeholder 3"/>
+          <p:cNvSpPr>
+            <a:spLocks noGrp="1" noRot="1" noChangeAspect="1"/>
+          </p:cNvSpPr>
+          <p:nvPr>
+            <p:ph type="sldImg" idx="2"/>
+          </p:nvPr>
+        </p:nvSpPr>
+        <p:spPr>
+          <a:xfrm>
+            <a:off x="1371600" y="1143000"/>
+            <a:ext cx="4114800" cy="3086100"/>
+          </a:xfrm>
+          <a:prstGeom prst="rect">
+            <a:avLst/>
+          </a:prstGeom>
+          <a:noFill/>
+          <a:ln w="12700">
+            <a:solidFill>
+              <a:prstClr val="black"/>
+            </a:solidFill>
+          </a:ln>
+        </p:spPr>
+        <p:txBody>
+          <a:bodyPr vert="horz" lIns="91440" tIns="45720" rIns="91440" bIns="45720" rtlCol="0" anchor="ctr"/>
+          <a:lstStyle/>
+          <a:p>
+            <a:endParaRPr lang="en-US"/>
+          </a:p>
+        </p:txBody>
+      </p:sp>
+      <p:sp>
+        <p:nvSpPr>
+          <p:cNvPr id="5" name="Notes Placeholder 4"/>
+          <p:cNvSpPr>
+            <a:spLocks noGrp="1"/>
+          </p:cNvSpPr>
+          <p:nvPr>
+            <p:ph type="body" sz="quarter" idx="3"/>
+          </p:nvPr>
+        </p:nvSpPr>
+        <p:spPr>
+          <a:xfrm>
+            <a:off x="685800" y="4400550"/>
+            <a:ext cx="5486400" cy="3600450"/>
+          </a:xfrm>
+          <a:prstGeom prst="rect">
+            <a:avLst/>
+          </a:prstGeom>
+        </p:spPr>
+        <p:txBody>
+          <a:bodyPr vert="horz" lIns="91440" tIns="45720" rIns="91440" bIns="45720" rtlCol="0"/>
+          <a:lstStyle/>
+          <a:p>
+            <a:pPr lvl="0"/>
+            <a:r>
+              <a:rPr lang="en-US" smtClean="0"/>
+              <a:t>Click to edit Master text styles</a:t>
+            </a:r>
+          </a:p>
+          <a:p>
+            <a:pPr lvl="1"/>
+            <a:r>
+              <a:rPr lang="en-US" smtClean="0"/>
+              <a:t>Second level</a:t>
+            </a:r>
+          </a:p>
+          <a:p>
+            <a:pPr lvl="2"/>
+            <a:r>
+              <a:rPr lang="en-US" smtClean="0"/>
+              <a:t>Third level</a:t>
+            </a:r>
+          </a:p>
+          <a:p>
+            <a:pPr lvl="3"/>
+            <a:r>
+              <a:rPr lang="en-US" smtClean="0"/>
+              <a:t>Fourth level</a:t>
+            </a:r>
+          </a:p>
+          <a:p>
+            <a:pPr lvl="4"/>
+            <a:r>
+              <a:rPr lang="en-US" smtClean="0"/>
+              <a:t>Fifth level</a:t>
+            </a:r>
+            <a:endParaRPr lang="en-US"/>
+          </a:p>
+        </p:txBody>
+      </p:sp>
+      <p:sp>
+        <p:nvSpPr>
+          <p:cNvPr id="6" name="Footer Placeholder 5"/>
+          <p:cNvSpPr>
+            <a:spLocks noGrp="1"/>
+          </p:cNvSpPr>
+          <p:nvPr>
+            <p:ph type="ftr" sz="quarter" idx="4"/>
+          </p:nvPr>
+        </p:nvSpPr>
+        <p:spPr>
+          <a:xfrm>
+            <a:off x="0" y="8685213"/>
+            <a:ext cx="2971800" cy="458787"/>
+          </a:xfrm>
+          <a:prstGeom prst="rect">
+            <a:avLst/>
+          </a:prstGeom>
+        </p:spPr>
+        <p:txBody>
+          <a:bodyPr vert="horz" lIns="91440" tIns="45720" rIns="91440" bIns="45720" rtlCol="0" anchor="b"/>
+          <a:lstStyle>
+            <a:lvl1pPr algn="l">
+              <a:defRPr sz="1200"/>
+            </a:lvl1pPr>
+          </a:lstStyle>
+          <a:p>
+            <a:endParaRPr lang="en-US"/>
+          </a:p>
+        </p:txBody>
+      </p:sp>
+      <p:sp>
+        <p:nvSpPr>
+          <p:cNvPr id="7" name="Slide Number Placeholder 6"/>
+          <p:cNvSpPr>
+            <a:spLocks noGrp="1"/>
+          </p:cNvSpPr>
+          <p:nvPr>
+            <p:ph type="sldNum" sz="quarter" idx="5"/>
+          </p:nvPr>
+        </p:nvSpPr>
+        <p:spPr>
+          <a:xfrm>
+            <a:off x="3884613" y="8685213"/>
+            <a:ext cx="2971800" cy="458787"/>
+          </a:xfrm>
+          <a:prstGeom prst="rect">
+            <a:avLst/>
+          </a:prstGeom>
+        </p:spPr>
+        <p:txBody>
+          <a:bodyPr vert="horz" lIns="91440" tIns="45720" rIns="91440" bIns="45720" rtlCol="0" anchor="b"/>
+          <a:lstStyle>
+            <a:lvl1pPr algn="r">
+              <a:defRPr sz="1200"/>
+            </a:lvl1pPr>
+          </a:lstStyle>
+          <a:p>
+            <a:fld id="{346D4081-EEB2-4E49-BA5D-A61F53586F7A}" type="slidenum">
+              <a:rPr lang="en-US" smtClean="0"/>
+              <a:t>‹#›</a:t>
+            </a:fld>
+            <a:endParaRPr lang="en-US"/>
+          </a:p>
+        </p:txBody>
+      </p:sp>
+    </p:spTree>
+    <p:extLst>
+      <p:ext uri="{BB962C8B-B14F-4D97-AF65-F5344CB8AC3E}">
+        <p14:creationId xmlns:p14="http://schemas.microsoft.com/office/powerpoint/2010/main" val="3231443570"/>
+      </p:ext>
+    </p:extLst>
+  </p:cSld>
+  <p:clrMap bg1="lt1" tx1="dk1" bg2="lt2" tx2="dk2" accent1="accent1" accent2="accent2" accent3="accent3" accent4="accent4" accent5="accent5" accent6="accent6" hlink="hlink" folHlink="folHlink"/>
+  <p:notesStyle>
+    <a:lvl1pPr marL="0" algn="l" defTabSz="914400" rtl="0" eaLnBrk="1" latinLnBrk="0" hangingPunct="1">
+      <a:defRPr sz="1200" kern="1200">
+        <a:solidFill>
+          <a:schemeClr val="tx1"/>
+        </a:solidFill>
+        <a:latin typeface="+mn-lt"/>
+        <a:ea typeface="+mn-ea"/>
+        <a:cs typeface="+mn-cs"/>
+      </a:defRPr>
+    </a:lvl1pPr>
+    <a:lvl2pPr marL="457200" algn="l" defTabSz="914400" rtl="0" eaLnBrk="1" latinLnBrk="0" hangingPunct="1">
+      <a:defRPr sz="1200" kern="1200">
+        <a:solidFill>
+          <a:schemeClr val="tx1"/>
+        </a:solidFill>
+        <a:latin typeface="+mn-lt"/>
+        <a:ea typeface="+mn-ea"/>
+        <a:cs typeface="+mn-cs"/>
+      </a:defRPr>
+    </a:lvl2pPr>
+    <a:lvl3pPr marL="914400" algn="l" defTabSz="914400" rtl="0" eaLnBrk="1" latinLnBrk="0" hangingPunct="1">
+      <a:defRPr sz="1200" kern="1200">
+        <a:solidFill>
+          <a:schemeClr val="tx1"/>
+        </a:solidFill>
+        <a:latin typeface="+mn-lt"/>
+        <a:ea typeface="+mn-ea"/>
+        <a:cs typeface="+mn-cs"/>
+      </a:defRPr>
+    </a:lvl3pPr>
+    <a:lvl4pPr marL="1371600" algn="l" defTabSz="914400" rtl="0" eaLnBrk="1" latinLnBrk="0" hangingPunct="1">
+      <a:defRPr sz="1200" kern="1200">
+        <a:solidFill>
+          <a:schemeClr val="tx1"/>
+        </a:solidFill>
+        <a:latin typeface="+mn-lt"/>
+        <a:ea typeface="+mn-ea"/>
+        <a:cs typeface="+mn-cs"/>
+      </a:defRPr>
+    </a:lvl4pPr>
+    <a:lvl5pPr marL="1828800" algn="l" defTabSz="914400" rtl="0" eaLnBrk="1" latinLnBrk="0" hangingPunct="1">
+      <a:defRPr sz="1200" kern="1200">
+        <a:solidFill>
+          <a:schemeClr val="tx1"/>
+        </a:solidFill>
+        <a:latin typeface="+mn-lt"/>
+        <a:ea typeface="+mn-ea"/>
+        <a:cs typeface="+mn-cs"/>
+      </a:defRPr>
+    </a:lvl5pPr>
+    <a:lvl6pPr marL="2286000" algn="l" defTabSz="914400" rtl="0" eaLnBrk="1" latinLnBrk="0" hangingPunct="1">
+      <a:defRPr sz="1200" kern="1200">
+        <a:solidFill>
+          <a:schemeClr val="tx1"/>
+        </a:solidFill>
+        <a:latin typeface="+mn-lt"/>
+        <a:ea typeface="+mn-ea"/>
+        <a:cs typeface="+mn-cs"/>
+      </a:defRPr>
+    </a:lvl6pPr>
+    <a:lvl7pPr marL="2743200" algn="l" defTabSz="914400" rtl="0" eaLnBrk="1" latinLnBrk="0" hangingPunct="1">
+      <a:defRPr sz="1200" kern="1200">
+        <a:solidFill>
+          <a:schemeClr val="tx1"/>
+        </a:solidFill>
+        <a:latin typeface="+mn-lt"/>
+        <a:ea typeface="+mn-ea"/>
+        <a:cs typeface="+mn-cs"/>
+      </a:defRPr>
+    </a:lvl7pPr>
+    <a:lvl8pPr marL="3200400" algn="l" defTabSz="914400" rtl="0" eaLnBrk="1" latinLnBrk="0" hangingPunct="1">
+      <a:defRPr sz="1200" kern="1200">
+        <a:solidFill>
+          <a:schemeClr val="tx1"/>
+        </a:solidFill>
+        <a:latin typeface="+mn-lt"/>
+        <a:ea typeface="+mn-ea"/>
+        <a:cs typeface="+mn-cs"/>
+      </a:defRPr>
+    </a:lvl8pPr>
+    <a:lvl9pPr marL="3657600" algn="l" defTabSz="914400" rtl="0" eaLnBrk="1" latinLnBrk="0" hangingPunct="1">
+      <a:defRPr sz="1200" kern="1200">
+        <a:solidFill>
+          <a:schemeClr val="tx1"/>
+        </a:solidFill>
+        <a:latin typeface="+mn-lt"/>
+        <a:ea typeface="+mn-ea"/>
+        <a:cs typeface="+mn-cs"/>
+      </a:defRPr>
+    </a:lvl9pPr>
+  </p:notesStyle>
+</p:notesMaster>
+</file>
+
+<file path=ppt/notesSlides/notesSlide1.xml><?xml version="1.0" encoding="utf-8"?>
+<p:notes xmlns:a="http://schemas.openxmlformats.org/drawingml/2006/main" xmlns:r="http://schemas.openxmlformats.org/officeDocument/2006/relationships" xmlns:p="http://schemas.openxmlformats.org/presentationml/2006/main">
+  <p:cSld>
+    <p:spTree>
+      <p:nvGrpSpPr>
+        <p:cNvPr id="1" name=""/>
+        <p:cNvGrpSpPr/>
+        <p:nvPr/>
+      </p:nvGrpSpPr>
+      <p:grpSpPr>
+        <a:xfrm>
+          <a:off x="0" y="0"/>
+          <a:ext cx="0" cy="0"/>
+          <a:chOff x="0" y="0"/>
+          <a:chExt cx="0" cy="0"/>
+        </a:xfrm>
+      </p:grpSpPr>
+      <p:sp>
+        <p:nvSpPr>
+          <p:cNvPr id="2" name="Slide Image Placeholder 1"/>
+          <p:cNvSpPr>
+            <a:spLocks noGrp="1" noRot="1" noChangeAspect="1"/>
+          </p:cNvSpPr>
+          <p:nvPr>
+            <p:ph type="sldImg"/>
+          </p:nvPr>
+        </p:nvSpPr>
+        <p:spPr/>
+      </p:sp>
+      <p:sp>
+        <p:nvSpPr>
+          <p:cNvPr id="3" name="Notes Placeholder 2"/>
+          <p:cNvSpPr>
+            <a:spLocks noGrp="1"/>
+          </p:cNvSpPr>
+          <p:nvPr>
+            <p:ph type="body" idx="1"/>
+          </p:nvPr>
+        </p:nvSpPr>
+        <p:spPr/>
+        <p:txBody>
+          <a:bodyPr/>
+          <a:lstStyle/>
+          <a:p>
+            <a:r>
+              <a:rPr lang="en-US" dirty="0" smtClean="0"/>
+              <a:t>Original Shapes</a:t>
+            </a:r>
+            <a:endParaRPr lang="en-US" dirty="0"/>
+          </a:p>
+        </p:txBody>
+      </p:sp>
+      <p:sp>
+        <p:nvSpPr>
+          <p:cNvPr id="4" name="Slide Number Placeholder 3"/>
+          <p:cNvSpPr>
+            <a:spLocks noGrp="1"/>
+          </p:cNvSpPr>
+          <p:nvPr>
+            <p:ph type="sldNum" sz="quarter" idx="10"/>
+          </p:nvPr>
+        </p:nvSpPr>
+        <p:spPr/>
+        <p:txBody>
+          <a:bodyPr/>
+          <a:lstStyle/>
+          <a:p>
+            <a:fld id="{346D4081-EEB2-4E49-BA5D-A61F53586F7A}" type="slidenum">
+              <a:rPr lang="en-US" smtClean="0"/>
+              <a:t>4</a:t>
+            </a:fld>
+            <a:endParaRPr lang="en-US"/>
+          </a:p>
+        </p:txBody>
+      </p:sp>
+    </p:spTree>
+    <p:extLst>
+      <p:ext uri="{BB962C8B-B14F-4D97-AF65-F5344CB8AC3E}">
+        <p14:creationId xmlns:p14="http://schemas.microsoft.com/office/powerpoint/2010/main" val="2759255730"/>
+      </p:ext>
+    </p:extLst>
+  </p:cSld>
+  <p:clrMapOvr>
+    <a:masterClrMapping/>
+  </p:clrMapOvr>
+</p:notes>
+</file>
+
+<file path=ppt/notesSlides/notesSlide2.xml><?xml version="1.0" encoding="utf-8"?>
+<p:notes xmlns:a="http://schemas.openxmlformats.org/drawingml/2006/main" xmlns:r="http://schemas.openxmlformats.org/officeDocument/2006/relationships" xmlns:p="http://schemas.openxmlformats.org/presentationml/2006/main">
+  <p:cSld>
+    <p:spTree>
+      <p:nvGrpSpPr>
+        <p:cNvPr id="1" name=""/>
+        <p:cNvGrpSpPr/>
+        <p:nvPr/>
+      </p:nvGrpSpPr>
+      <p:grpSpPr>
+        <a:xfrm>
+          <a:off x="0" y="0"/>
+          <a:ext cx="0" cy="0"/>
+          <a:chOff x="0" y="0"/>
+          <a:chExt cx="0" cy="0"/>
+        </a:xfrm>
+      </p:grpSpPr>
+      <p:sp>
+        <p:nvSpPr>
+          <p:cNvPr id="2" name="Slide Image Placeholder 1"/>
+          <p:cNvSpPr>
+            <a:spLocks noGrp="1" noRot="1" noChangeAspect="1"/>
+          </p:cNvSpPr>
+          <p:nvPr>
+            <p:ph type="sldImg"/>
+          </p:nvPr>
+        </p:nvSpPr>
+        <p:spPr/>
+      </p:sp>
+      <p:sp>
+        <p:nvSpPr>
+          <p:cNvPr id="3" name="Notes Placeholder 2"/>
+          <p:cNvSpPr>
+            <a:spLocks noGrp="1"/>
+          </p:cNvSpPr>
+          <p:nvPr>
+            <p:ph type="body" idx="1"/>
+          </p:nvPr>
+        </p:nvSpPr>
+        <p:spPr/>
+        <p:txBody>
+          <a:bodyPr/>
+          <a:lstStyle/>
+          <a:p>
+            <a:r>
+              <a:rPr lang="en-US" dirty="0" smtClean="0"/>
+              <a:t>Click red square, blue</a:t>
+            </a:r>
+            <a:r>
+              <a:rPr lang="en-US" baseline="0" dirty="0" smtClean="0"/>
+              <a:t> circle.</a:t>
+            </a:r>
+          </a:p>
+          <a:p>
+            <a:r>
+              <a:rPr lang="en-US" baseline="0" dirty="0" smtClean="0"/>
+              <a:t>Open Positions Lab, click settings for reorient, </a:t>
+            </a:r>
+            <a:r>
+              <a:rPr lang="en-US" baseline="0" smtClean="0"/>
+              <a:t>select fixed, click ok and click Duplicate and Rotate.</a:t>
+            </a:r>
+          </a:p>
+          <a:p>
+            <a:r>
+              <a:rPr lang="en-US" baseline="0" dirty="0" smtClean="0"/>
+              <a:t>Drag center of blue circle to center of green circle</a:t>
+            </a:r>
+            <a:endParaRPr lang="en-US" dirty="0"/>
+          </a:p>
+        </p:txBody>
+      </p:sp>
+      <p:sp>
+        <p:nvSpPr>
+          <p:cNvPr id="4" name="Slide Number Placeholder 3"/>
+          <p:cNvSpPr>
+            <a:spLocks noGrp="1"/>
+          </p:cNvSpPr>
+          <p:nvPr>
+            <p:ph type="sldNum" sz="quarter" idx="10"/>
+          </p:nvPr>
+        </p:nvSpPr>
+        <p:spPr/>
+        <p:txBody>
+          <a:bodyPr/>
+          <a:lstStyle/>
+          <a:p>
+            <a:fld id="{346D4081-EEB2-4E49-BA5D-A61F53586F7A}" type="slidenum">
+              <a:rPr lang="en-US" smtClean="0"/>
+              <a:t>5</a:t>
+            </a:fld>
+            <a:endParaRPr lang="en-US"/>
+          </a:p>
+        </p:txBody>
+      </p:sp>
+    </p:spTree>
+    <p:extLst>
+      <p:ext uri="{BB962C8B-B14F-4D97-AF65-F5344CB8AC3E}">
+        <p14:creationId xmlns:p14="http://schemas.microsoft.com/office/powerpoint/2010/main" val="3700532857"/>
+      </p:ext>
+    </p:extLst>
+  </p:cSld>
+  <p:clrMapOvr>
+    <a:masterClrMapping/>
+  </p:clrMapOvr>
+</p:notes>
+</file>
+
+<file path=ppt/notesSlides/notesSlide3.xml><?xml version="1.0" encoding="utf-8"?>
+<p:notes xmlns:a="http://schemas.openxmlformats.org/drawingml/2006/main" xmlns:r="http://schemas.openxmlformats.org/officeDocument/2006/relationships" xmlns:p="http://schemas.openxmlformats.org/presentationml/2006/main">
+  <p:cSld>
+    <p:spTree>
+      <p:nvGrpSpPr>
+        <p:cNvPr id="1" name=""/>
+        <p:cNvGrpSpPr/>
+        <p:nvPr/>
+      </p:nvGrpSpPr>
+      <p:grpSpPr>
+        <a:xfrm>
+          <a:off x="0" y="0"/>
+          <a:ext cx="0" cy="0"/>
+          <a:chOff x="0" y="0"/>
+          <a:chExt cx="0" cy="0"/>
+        </a:xfrm>
+      </p:grpSpPr>
+      <p:sp>
+        <p:nvSpPr>
+          <p:cNvPr id="2" name="Slide Image Placeholder 1"/>
+          <p:cNvSpPr>
+            <a:spLocks noGrp="1" noRot="1" noChangeAspect="1"/>
+          </p:cNvSpPr>
+          <p:nvPr>
+            <p:ph type="sldImg"/>
+          </p:nvPr>
+        </p:nvSpPr>
+        <p:spPr/>
+      </p:sp>
+      <p:sp>
+        <p:nvSpPr>
+          <p:cNvPr id="3" name="Notes Placeholder 2"/>
+          <p:cNvSpPr>
+            <a:spLocks noGrp="1"/>
+          </p:cNvSpPr>
+          <p:nvPr>
+            <p:ph type="body" idx="1"/>
+          </p:nvPr>
+        </p:nvSpPr>
+        <p:spPr/>
+        <p:txBody>
+          <a:bodyPr/>
+          <a:lstStyle/>
+          <a:p>
+            <a:r>
+              <a:rPr lang="en-US" dirty="0" smtClean="0"/>
+              <a:t>Original Shapes</a:t>
+            </a:r>
+            <a:endParaRPr lang="en-US" dirty="0"/>
+          </a:p>
+        </p:txBody>
+      </p:sp>
+      <p:sp>
+        <p:nvSpPr>
+          <p:cNvPr id="4" name="Slide Number Placeholder 3"/>
+          <p:cNvSpPr>
+            <a:spLocks noGrp="1"/>
+          </p:cNvSpPr>
+          <p:nvPr>
+            <p:ph type="sldNum" sz="quarter" idx="10"/>
+          </p:nvPr>
+        </p:nvSpPr>
+        <p:spPr/>
+        <p:txBody>
+          <a:bodyPr/>
+          <a:lstStyle/>
+          <a:p>
+            <a:fld id="{346D4081-EEB2-4E49-BA5D-A61F53586F7A}" type="slidenum">
+              <a:rPr lang="en-US" smtClean="0"/>
+              <a:t>7</a:t>
+            </a:fld>
+            <a:endParaRPr lang="en-US"/>
+          </a:p>
+        </p:txBody>
+      </p:sp>
+    </p:spTree>
+    <p:extLst>
+      <p:ext uri="{BB962C8B-B14F-4D97-AF65-F5344CB8AC3E}">
+        <p14:creationId xmlns:p14="http://schemas.microsoft.com/office/powerpoint/2010/main" val="2205033840"/>
+      </p:ext>
+    </p:extLst>
+  </p:cSld>
+  <p:clrMapOvr>
+    <a:masterClrMapping/>
+  </p:clrMapOvr>
+</p:notes>
+</file>
+
+<file path=ppt/notesSlides/notesSlide4.xml><?xml version="1.0" encoding="utf-8"?>
+<p:notes xmlns:a="http://schemas.openxmlformats.org/drawingml/2006/main" xmlns:r="http://schemas.openxmlformats.org/officeDocument/2006/relationships" xmlns:p="http://schemas.openxmlformats.org/presentationml/2006/main">
+  <p:cSld>
+    <p:spTree>
+      <p:nvGrpSpPr>
+        <p:cNvPr id="1" name=""/>
+        <p:cNvGrpSpPr/>
+        <p:nvPr/>
+      </p:nvGrpSpPr>
+      <p:grpSpPr>
+        <a:xfrm>
+          <a:off x="0" y="0"/>
+          <a:ext cx="0" cy="0"/>
+          <a:chOff x="0" y="0"/>
+          <a:chExt cx="0" cy="0"/>
+        </a:xfrm>
+      </p:grpSpPr>
+      <p:sp>
+        <p:nvSpPr>
+          <p:cNvPr id="2" name="Slide Image Placeholder 1"/>
+          <p:cNvSpPr>
+            <a:spLocks noGrp="1" noRot="1" noChangeAspect="1"/>
+          </p:cNvSpPr>
+          <p:nvPr>
+            <p:ph type="sldImg"/>
+          </p:nvPr>
+        </p:nvSpPr>
+        <p:spPr/>
+      </p:sp>
+      <p:sp>
+        <p:nvSpPr>
+          <p:cNvPr id="3" name="Notes Placeholder 2"/>
+          <p:cNvSpPr>
+            <a:spLocks noGrp="1"/>
+          </p:cNvSpPr>
+          <p:nvPr>
+            <p:ph type="body" idx="1"/>
+          </p:nvPr>
+        </p:nvSpPr>
+        <p:spPr/>
+        <p:txBody>
+          <a:bodyPr/>
+          <a:lstStyle/>
+          <a:p>
+            <a:r>
+              <a:rPr lang="en-US" dirty="0" smtClean="0"/>
+              <a:t>Click red square, blue</a:t>
+            </a:r>
+            <a:r>
+              <a:rPr lang="en-US" baseline="0" dirty="0" smtClean="0"/>
+              <a:t> triangle.</a:t>
+            </a:r>
+          </a:p>
+          <a:p>
+            <a:r>
+              <a:rPr lang="en-US" baseline="0" dirty="0" smtClean="0"/>
+              <a:t>Open Positions Lab, click settings for reorient, select dynamic, click ok and click Duplicate and Rotate.</a:t>
+            </a:r>
+          </a:p>
+          <a:p>
+            <a:r>
+              <a:rPr lang="en-US" baseline="0" dirty="0" smtClean="0"/>
+              <a:t>Drag center of blue triangle to center of green circle</a:t>
+            </a:r>
+            <a:endParaRPr lang="en-US" dirty="0" smtClean="0"/>
+          </a:p>
+        </p:txBody>
+      </p:sp>
+      <p:sp>
+        <p:nvSpPr>
+          <p:cNvPr id="4" name="Slide Number Placeholder 3"/>
+          <p:cNvSpPr>
+            <a:spLocks noGrp="1"/>
+          </p:cNvSpPr>
+          <p:nvPr>
+            <p:ph type="sldNum" sz="quarter" idx="10"/>
+          </p:nvPr>
+        </p:nvSpPr>
+        <p:spPr/>
+        <p:txBody>
+          <a:bodyPr/>
+          <a:lstStyle/>
+          <a:p>
+            <a:fld id="{346D4081-EEB2-4E49-BA5D-A61F53586F7A}" type="slidenum">
+              <a:rPr lang="en-US" smtClean="0"/>
+              <a:t>8</a:t>
+            </a:fld>
+            <a:endParaRPr lang="en-US"/>
+          </a:p>
+        </p:txBody>
+      </p:sp>
+    </p:spTree>
+    <p:extLst>
+      <p:ext uri="{BB962C8B-B14F-4D97-AF65-F5344CB8AC3E}">
+        <p14:creationId xmlns:p14="http://schemas.microsoft.com/office/powerpoint/2010/main" val="2619369860"/>
+      </p:ext>
+    </p:extLst>
+  </p:cSld>
+  <p:clrMapOvr>
+    <a:masterClrMapping/>
+  </p:clrMapOvr>
+</p:notes>
+</file>
+
+<file path=ppt/notesSlides/notesSlide5.xml><?xml version="1.0" encoding="utf-8"?>
+<p:notes xmlns:a="http://schemas.openxmlformats.org/drawingml/2006/main" xmlns:r="http://schemas.openxmlformats.org/officeDocument/2006/relationships" xmlns:p="http://schemas.openxmlformats.org/presentationml/2006/main">
+  <p:cSld>
+    <p:spTree>
+      <p:nvGrpSpPr>
+        <p:cNvPr id="1" name=""/>
+        <p:cNvGrpSpPr/>
+        <p:nvPr/>
+      </p:nvGrpSpPr>
+      <p:grpSpPr>
+        <a:xfrm>
+          <a:off x="0" y="0"/>
+          <a:ext cx="0" cy="0"/>
+          <a:chOff x="0" y="0"/>
+          <a:chExt cx="0" cy="0"/>
+        </a:xfrm>
+      </p:grpSpPr>
+      <p:sp>
+        <p:nvSpPr>
+          <p:cNvPr id="2" name="Slide Image Placeholder 1"/>
+          <p:cNvSpPr>
+            <a:spLocks noGrp="1" noRot="1" noChangeAspect="1"/>
+          </p:cNvSpPr>
+          <p:nvPr>
+            <p:ph type="sldImg"/>
+          </p:nvPr>
+        </p:nvSpPr>
+        <p:spPr/>
+      </p:sp>
+      <p:sp>
+        <p:nvSpPr>
+          <p:cNvPr id="3" name="Notes Placeholder 2"/>
+          <p:cNvSpPr>
+            <a:spLocks noGrp="1"/>
+          </p:cNvSpPr>
+          <p:nvPr>
+            <p:ph type="body" idx="1"/>
+          </p:nvPr>
+        </p:nvSpPr>
+        <p:spPr/>
+        <p:txBody>
+          <a:bodyPr/>
+          <a:lstStyle/>
+          <a:p>
+            <a:r>
+              <a:rPr lang="en-US" dirty="0" smtClean="0"/>
+              <a:t>Original Shapes</a:t>
+            </a:r>
+            <a:endParaRPr lang="en-US" dirty="0"/>
+          </a:p>
+        </p:txBody>
+      </p:sp>
+      <p:sp>
+        <p:nvSpPr>
+          <p:cNvPr id="4" name="Slide Number Placeholder 3"/>
+          <p:cNvSpPr>
+            <a:spLocks noGrp="1"/>
+          </p:cNvSpPr>
+          <p:nvPr>
+            <p:ph type="sldNum" sz="quarter" idx="10"/>
+          </p:nvPr>
+        </p:nvSpPr>
+        <p:spPr/>
+        <p:txBody>
+          <a:bodyPr/>
+          <a:lstStyle/>
+          <a:p>
+            <a:fld id="{346D4081-EEB2-4E49-BA5D-A61F53586F7A}" type="slidenum">
+              <a:rPr lang="en-US" smtClean="0"/>
+              <a:t>10</a:t>
+            </a:fld>
+            <a:endParaRPr lang="en-US"/>
+          </a:p>
+        </p:txBody>
+      </p:sp>
+    </p:spTree>
+    <p:extLst>
+      <p:ext uri="{BB962C8B-B14F-4D97-AF65-F5344CB8AC3E}">
+        <p14:creationId xmlns:p14="http://schemas.microsoft.com/office/powerpoint/2010/main" val="4228603248"/>
+      </p:ext>
+    </p:extLst>
+  </p:cSld>
+  <p:clrMapOvr>
+    <a:masterClrMapping/>
+  </p:clrMapOvr>
+</p:notes>
+</file>
+
+<file path=ppt/notesSlides/notesSlide6.xml><?xml version="1.0" encoding="utf-8"?>
+<p:notes xmlns:a="http://schemas.openxmlformats.org/drawingml/2006/main" xmlns:r="http://schemas.openxmlformats.org/officeDocument/2006/relationships" xmlns:p="http://schemas.openxmlformats.org/presentationml/2006/main">
+  <p:cSld>
+    <p:spTree>
+      <p:nvGrpSpPr>
+        <p:cNvPr id="1" name=""/>
+        <p:cNvGrpSpPr/>
+        <p:nvPr/>
+      </p:nvGrpSpPr>
+      <p:grpSpPr>
+        <a:xfrm>
+          <a:off x="0" y="0"/>
+          <a:ext cx="0" cy="0"/>
+          <a:chOff x="0" y="0"/>
+          <a:chExt cx="0" cy="0"/>
+        </a:xfrm>
+      </p:grpSpPr>
+      <p:sp>
+        <p:nvSpPr>
+          <p:cNvPr id="2" name="Slide Image Placeholder 1"/>
+          <p:cNvSpPr>
+            <a:spLocks noGrp="1" noRot="1" noChangeAspect="1"/>
+          </p:cNvSpPr>
+          <p:nvPr>
+            <p:ph type="sldImg"/>
+          </p:nvPr>
+        </p:nvSpPr>
+        <p:spPr/>
+      </p:sp>
+      <p:sp>
+        <p:nvSpPr>
+          <p:cNvPr id="3" name="Notes Placeholder 2"/>
+          <p:cNvSpPr>
+            <a:spLocks noGrp="1"/>
+          </p:cNvSpPr>
+          <p:nvPr>
+            <p:ph type="body" idx="1"/>
+          </p:nvPr>
+        </p:nvSpPr>
+        <p:spPr/>
+        <p:txBody>
+          <a:bodyPr/>
+          <a:lstStyle/>
+          <a:p>
+            <a:r>
+              <a:rPr lang="en-US" dirty="0" smtClean="0"/>
+              <a:t>Click red square, blue</a:t>
+            </a:r>
+            <a:r>
+              <a:rPr lang="en-US" baseline="0" dirty="0" smtClean="0"/>
+              <a:t> circle, blue triangle.</a:t>
+            </a:r>
+          </a:p>
+          <a:p>
+            <a:r>
+              <a:rPr lang="en-US" baseline="0" dirty="0" smtClean="0"/>
+              <a:t>Open Positions Lab, click settings for reorient, select fixed, click ok and click Duplicate and Rotate.</a:t>
+            </a:r>
+          </a:p>
+          <a:p>
+            <a:r>
+              <a:rPr lang="en-US" baseline="0" dirty="0" smtClean="0"/>
+              <a:t>Drag center of blue circle to center of green circle</a:t>
+            </a:r>
+            <a:endParaRPr lang="en-US" dirty="0" smtClean="0"/>
+          </a:p>
+        </p:txBody>
+      </p:sp>
+      <p:sp>
+        <p:nvSpPr>
+          <p:cNvPr id="4" name="Slide Number Placeholder 3"/>
+          <p:cNvSpPr>
+            <a:spLocks noGrp="1"/>
+          </p:cNvSpPr>
+          <p:nvPr>
+            <p:ph type="sldNum" sz="quarter" idx="10"/>
+          </p:nvPr>
+        </p:nvSpPr>
+        <p:spPr/>
+        <p:txBody>
+          <a:bodyPr/>
+          <a:lstStyle/>
+          <a:p>
+            <a:fld id="{346D4081-EEB2-4E49-BA5D-A61F53586F7A}" type="slidenum">
+              <a:rPr lang="en-US" smtClean="0"/>
+              <a:t>11</a:t>
+            </a:fld>
+            <a:endParaRPr lang="en-US"/>
+          </a:p>
+        </p:txBody>
+      </p:sp>
+    </p:spTree>
+    <p:extLst>
+      <p:ext uri="{BB962C8B-B14F-4D97-AF65-F5344CB8AC3E}">
+        <p14:creationId xmlns:p14="http://schemas.microsoft.com/office/powerpoint/2010/main" val="424337380"/>
+      </p:ext>
+    </p:extLst>
+  </p:cSld>
+  <p:clrMapOvr>
+    <a:masterClrMapping/>
+  </p:clrMapOvr>
+</p:notes>
+</file>
+
+<file path=ppt/notesSlides/notesSlide7.xml><?xml version="1.0" encoding="utf-8"?>
+<p:notes xmlns:a="http://schemas.openxmlformats.org/drawingml/2006/main" xmlns:r="http://schemas.openxmlformats.org/officeDocument/2006/relationships" xmlns:p="http://schemas.openxmlformats.org/presentationml/2006/main">
+  <p:cSld>
+    <p:spTree>
+      <p:nvGrpSpPr>
+        <p:cNvPr id="1" name=""/>
+        <p:cNvGrpSpPr/>
+        <p:nvPr/>
+      </p:nvGrpSpPr>
+      <p:grpSpPr>
+        <a:xfrm>
+          <a:off x="0" y="0"/>
+          <a:ext cx="0" cy="0"/>
+          <a:chOff x="0" y="0"/>
+          <a:chExt cx="0" cy="0"/>
+        </a:xfrm>
+      </p:grpSpPr>
+      <p:sp>
+        <p:nvSpPr>
+          <p:cNvPr id="2" name="Slide Image Placeholder 1"/>
+          <p:cNvSpPr>
+            <a:spLocks noGrp="1" noRot="1" noChangeAspect="1"/>
+          </p:cNvSpPr>
+          <p:nvPr>
+            <p:ph type="sldImg"/>
+          </p:nvPr>
+        </p:nvSpPr>
+        <p:spPr/>
+      </p:sp>
+      <p:sp>
+        <p:nvSpPr>
+          <p:cNvPr id="3" name="Notes Placeholder 2"/>
+          <p:cNvSpPr>
+            <a:spLocks noGrp="1"/>
+          </p:cNvSpPr>
+          <p:nvPr>
+            <p:ph type="body" idx="1"/>
+          </p:nvPr>
+        </p:nvSpPr>
+        <p:spPr/>
+        <p:txBody>
+          <a:bodyPr/>
+          <a:lstStyle/>
+          <a:p>
+            <a:r>
+              <a:rPr lang="en-US" dirty="0" smtClean="0"/>
+              <a:t>Click red square, blue circle, blue</a:t>
+            </a:r>
+            <a:r>
+              <a:rPr lang="en-US" baseline="0" dirty="0" smtClean="0"/>
+              <a:t> triangle.</a:t>
+            </a:r>
+          </a:p>
+          <a:p>
+            <a:r>
+              <a:rPr lang="en-US" baseline="0" dirty="0" smtClean="0"/>
+              <a:t>Open Positions Lab, click settings for reorient, select dynamic, click ok and click Duplicate and Rotate.</a:t>
+            </a:r>
+          </a:p>
+          <a:p>
+            <a:r>
+              <a:rPr lang="en-US" baseline="0" dirty="0" smtClean="0"/>
+              <a:t>Drag center of blue triangle to center of green circle</a:t>
+            </a:r>
+            <a:endParaRPr lang="en-US" dirty="0" smtClean="0"/>
+          </a:p>
+        </p:txBody>
+      </p:sp>
+      <p:sp>
+        <p:nvSpPr>
+          <p:cNvPr id="4" name="Slide Number Placeholder 3"/>
+          <p:cNvSpPr>
+            <a:spLocks noGrp="1"/>
+          </p:cNvSpPr>
+          <p:nvPr>
+            <p:ph type="sldNum" sz="quarter" idx="10"/>
+          </p:nvPr>
+        </p:nvSpPr>
+        <p:spPr/>
+        <p:txBody>
+          <a:bodyPr/>
+          <a:lstStyle/>
+          <a:p>
+            <a:fld id="{346D4081-EEB2-4E49-BA5D-A61F53586F7A}" type="slidenum">
+              <a:rPr lang="en-US" smtClean="0"/>
+              <a:t>14</a:t>
+            </a:fld>
+            <a:endParaRPr lang="en-US"/>
+          </a:p>
+        </p:txBody>
+      </p:sp>
+    </p:spTree>
+    <p:extLst>
+      <p:ext uri="{BB962C8B-B14F-4D97-AF65-F5344CB8AC3E}">
+        <p14:creationId xmlns:p14="http://schemas.microsoft.com/office/powerpoint/2010/main" val="4000562717"/>
+      </p:ext>
+    </p:extLst>
+  </p:cSld>
+  <p:clrMapOvr>
+    <a:masterClrMapping/>
+  </p:clrMapOvr>
+</p:notes>
 </file>
 
 <file path=ppt/slideLayouts/slideLayout1.xml><?xml version="1.0" encoding="utf-8"?>
@@ -324,7 +1371,7 @@
           <a:p>
             <a:fld id="{699DC775-C286-4358-8C92-D7E584E969B3}" type="datetimeFigureOut">
               <a:rPr lang="en-US" smtClean="0"/>
-              <a:t>7/5/2016</a:t>
+              <a:t>1/29/2017</a:t>
             </a:fld>
             <a:endParaRPr lang="en-US"/>
           </a:p>
@@ -492,7 +1539,7 @@
           <a:p>
             <a:fld id="{699DC775-C286-4358-8C92-D7E584E969B3}" type="datetimeFigureOut">
               <a:rPr lang="en-US" smtClean="0"/>
-              <a:t>7/5/2016</a:t>
+              <a:t>1/29/2017</a:t>
             </a:fld>
             <a:endParaRPr lang="en-US"/>
           </a:p>
@@ -670,7 +1717,7 @@
           <a:p>
             <a:fld id="{699DC775-C286-4358-8C92-D7E584E969B3}" type="datetimeFigureOut">
               <a:rPr lang="en-US" smtClean="0"/>
-              <a:t>7/5/2016</a:t>
+              <a:t>1/29/2017</a:t>
             </a:fld>
             <a:endParaRPr lang="en-US"/>
           </a:p>
@@ -910,7 +1957,7 @@
           <a:p>
             <a:fld id="{699DC775-C286-4358-8C92-D7E584E969B3}" type="datetimeFigureOut">
               <a:rPr lang="en-US" smtClean="0"/>
-              <a:t>7/5/2016</a:t>
+              <a:t>1/29/2017</a:t>
             </a:fld>
             <a:endParaRPr lang="en-US"/>
           </a:p>
@@ -1078,7 +2125,7 @@
           <a:p>
             <a:fld id="{699DC775-C286-4358-8C92-D7E584E969B3}" type="datetimeFigureOut">
               <a:rPr lang="en-US" smtClean="0"/>
-              <a:t>7/5/2016</a:t>
+              <a:t>1/29/2017</a:t>
             </a:fld>
             <a:endParaRPr lang="en-US"/>
           </a:p>
@@ -1323,7 +2370,7 @@
           <a:p>
             <a:fld id="{699DC775-C286-4358-8C92-D7E584E969B3}" type="datetimeFigureOut">
               <a:rPr lang="en-US" smtClean="0"/>
-              <a:t>7/5/2016</a:t>
+              <a:t>1/29/2017</a:t>
             </a:fld>
             <a:endParaRPr lang="en-US"/>
           </a:p>
@@ -1608,7 +2655,7 @@
           <a:p>
             <a:fld id="{699DC775-C286-4358-8C92-D7E584E969B3}" type="datetimeFigureOut">
               <a:rPr lang="en-US" smtClean="0"/>
-              <a:t>7/5/2016</a:t>
+              <a:t>1/29/2017</a:t>
             </a:fld>
             <a:endParaRPr lang="en-US"/>
           </a:p>
@@ -2027,7 +3074,7 @@
           <a:p>
             <a:fld id="{699DC775-C286-4358-8C92-D7E584E969B3}" type="datetimeFigureOut">
               <a:rPr lang="en-US" smtClean="0"/>
-              <a:t>7/5/2016</a:t>
+              <a:t>1/29/2017</a:t>
             </a:fld>
             <a:endParaRPr lang="en-US"/>
           </a:p>
@@ -2144,7 +3191,7 @@
           <a:p>
             <a:fld id="{699DC775-C286-4358-8C92-D7E584E969B3}" type="datetimeFigureOut">
               <a:rPr lang="en-US" smtClean="0"/>
-              <a:t>7/5/2016</a:t>
+              <a:t>1/29/2017</a:t>
             </a:fld>
             <a:endParaRPr lang="en-US"/>
           </a:p>
@@ -2239,7 +3286,7 @@
           <a:p>
             <a:fld id="{699DC775-C286-4358-8C92-D7E584E969B3}" type="datetimeFigureOut">
               <a:rPr lang="en-US" smtClean="0"/>
-              <a:t>7/5/2016</a:t>
+              <a:t>1/29/2017</a:t>
             </a:fld>
             <a:endParaRPr lang="en-US"/>
           </a:p>
@@ -2514,7 +3561,7 @@
           <a:p>
             <a:fld id="{699DC775-C286-4358-8C92-D7E584E969B3}" type="datetimeFigureOut">
               <a:rPr lang="en-US" smtClean="0"/>
-              <a:t>7/5/2016</a:t>
+              <a:t>1/29/2017</a:t>
             </a:fld>
             <a:endParaRPr lang="en-US"/>
           </a:p>
@@ -2682,7 +3729,7 @@
           <a:p>
             <a:fld id="{699DC775-C286-4358-8C92-D7E584E969B3}" type="datetimeFigureOut">
               <a:rPr lang="en-US" smtClean="0"/>
-              <a:t>7/5/2016</a:t>
+              <a:t>1/29/2017</a:t>
             </a:fld>
             <a:endParaRPr lang="en-US"/>
           </a:p>
@@ -2934,7 +3981,7 @@
           <a:p>
             <a:fld id="{699DC775-C286-4358-8C92-D7E584E969B3}" type="datetimeFigureOut">
               <a:rPr lang="en-US" smtClean="0"/>
-              <a:t>7/5/2016</a:t>
+              <a:t>1/29/2017</a:t>
             </a:fld>
             <a:endParaRPr lang="en-US"/>
           </a:p>
@@ -3102,7 +4149,7 @@
           <a:p>
             <a:fld id="{699DC775-C286-4358-8C92-D7E584E969B3}" type="datetimeFigureOut">
               <a:rPr lang="en-US" smtClean="0"/>
-              <a:t>7/5/2016</a:t>
+              <a:t>1/29/2017</a:t>
             </a:fld>
             <a:endParaRPr lang="en-US"/>
           </a:p>
@@ -3280,7 +4327,7 @@
           <a:p>
             <a:fld id="{699DC775-C286-4358-8C92-D7E584E969B3}" type="datetimeFigureOut">
               <a:rPr lang="en-US" smtClean="0"/>
-              <a:t>7/5/2016</a:t>
+              <a:t>1/29/2017</a:t>
             </a:fld>
             <a:endParaRPr lang="en-US"/>
           </a:p>
@@ -3528,7 +4575,7 @@
           <a:p>
             <a:fld id="{699DC775-C286-4358-8C92-D7E584E969B3}" type="datetimeFigureOut">
               <a:rPr lang="en-US" smtClean="0"/>
-              <a:t>7/5/2016</a:t>
+              <a:t>1/29/2017</a:t>
             </a:fld>
             <a:endParaRPr lang="en-US"/>
           </a:p>
@@ -3704,7 +4751,7 @@
           <a:p>
             <a:fld id="{699DC775-C286-4358-8C92-D7E584E969B3}" type="datetimeFigureOut">
               <a:rPr lang="en-US" smtClean="0"/>
-              <a:t>7/5/2016</a:t>
+              <a:t>1/29/2017</a:t>
             </a:fld>
             <a:endParaRPr lang="en-US"/>
           </a:p>
@@ -3957,7 +5004,7 @@
           <a:p>
             <a:fld id="{699DC775-C286-4358-8C92-D7E584E969B3}" type="datetimeFigureOut">
               <a:rPr lang="en-US" smtClean="0"/>
-              <a:t>7/5/2016</a:t>
+              <a:t>1/29/2017</a:t>
             </a:fld>
             <a:endParaRPr lang="en-US"/>
           </a:p>
@@ -4250,7 +5297,7 @@
           <a:p>
             <a:fld id="{699DC775-C286-4358-8C92-D7E584E969B3}" type="datetimeFigureOut">
               <a:rPr lang="en-US" smtClean="0"/>
-              <a:t>7/5/2016</a:t>
+              <a:t>1/29/2017</a:t>
             </a:fld>
             <a:endParaRPr lang="en-US"/>
           </a:p>
@@ -4677,7 +5724,7 @@
           <a:p>
             <a:fld id="{699DC775-C286-4358-8C92-D7E584E969B3}" type="datetimeFigureOut">
               <a:rPr lang="en-US" smtClean="0"/>
-              <a:t>7/5/2016</a:t>
+              <a:t>1/29/2017</a:t>
             </a:fld>
             <a:endParaRPr lang="en-US"/>
           </a:p>
@@ -4802,7 +5849,7 @@
           <a:p>
             <a:fld id="{699DC775-C286-4358-8C92-D7E584E969B3}" type="datetimeFigureOut">
               <a:rPr lang="en-US" smtClean="0"/>
-              <a:t>7/5/2016</a:t>
+              <a:t>1/29/2017</a:t>
             </a:fld>
             <a:endParaRPr lang="en-US"/>
           </a:p>
@@ -4905,7 +5952,7 @@
           <a:p>
             <a:fld id="{699DC775-C286-4358-8C92-D7E584E969B3}" type="datetimeFigureOut">
               <a:rPr lang="en-US" smtClean="0"/>
-              <a:t>7/5/2016</a:t>
+              <a:t>1/29/2017</a:t>
             </a:fld>
             <a:endParaRPr lang="en-US"/>
           </a:p>
@@ -5150,7 +6197,7 @@
           <a:p>
             <a:fld id="{699DC775-C286-4358-8C92-D7E584E969B3}" type="datetimeFigureOut">
               <a:rPr lang="en-US" smtClean="0"/>
-              <a:t>7/5/2016</a:t>
+              <a:t>1/29/2017</a:t>
             </a:fld>
             <a:endParaRPr lang="en-US"/>
           </a:p>
@@ -5433,7 +6480,7 @@
           <a:p>
             <a:fld id="{699DC775-C286-4358-8C92-D7E584E969B3}" type="datetimeFigureOut">
               <a:rPr lang="en-US" smtClean="0"/>
-              <a:t>7/5/2016</a:t>
+              <a:t>1/29/2017</a:t>
             </a:fld>
             <a:endParaRPr lang="en-US"/>
           </a:p>
@@ -5693,7 +6740,7 @@
           <a:p>
             <a:fld id="{699DC775-C286-4358-8C92-D7E584E969B3}" type="datetimeFigureOut">
               <a:rPr lang="en-US" smtClean="0"/>
-              <a:t>7/5/2016</a:t>
+              <a:t>1/29/2017</a:t>
             </a:fld>
             <a:endParaRPr lang="en-US"/>
           </a:p>
@@ -5869,7 +6916,7 @@
           <a:p>
             <a:fld id="{699DC775-C286-4358-8C92-D7E584E969B3}" type="datetimeFigureOut">
               <a:rPr lang="en-US" smtClean="0"/>
-              <a:t>7/5/2016</a:t>
+              <a:t>1/29/2017</a:t>
             </a:fld>
             <a:endParaRPr lang="en-US"/>
           </a:p>
@@ -6055,7 +7102,7 @@
           <a:p>
             <a:fld id="{699DC775-C286-4358-8C92-D7E584E969B3}" type="datetimeFigureOut">
               <a:rPr lang="en-US" smtClean="0"/>
-              <a:t>7/5/2016</a:t>
+              <a:t>1/29/2017</a:t>
             </a:fld>
             <a:endParaRPr lang="en-US"/>
           </a:p>
@@ -6340,7 +7387,7 @@
           <a:p>
             <a:fld id="{699DC775-C286-4358-8C92-D7E584E969B3}" type="datetimeFigureOut">
               <a:rPr lang="en-US" smtClean="0"/>
-              <a:t>7/5/2016</a:t>
+              <a:t>1/29/2017</a:t>
             </a:fld>
             <a:endParaRPr lang="en-US"/>
           </a:p>
@@ -6759,7 +7806,7 @@
           <a:p>
             <a:fld id="{699DC775-C286-4358-8C92-D7E584E969B3}" type="datetimeFigureOut">
               <a:rPr lang="en-US" smtClean="0"/>
-              <a:t>7/5/2016</a:t>
+              <a:t>1/29/2017</a:t>
             </a:fld>
             <a:endParaRPr lang="en-US"/>
           </a:p>
@@ -6876,7 +7923,7 @@
           <a:p>
             <a:fld id="{699DC775-C286-4358-8C92-D7E584E969B3}" type="datetimeFigureOut">
               <a:rPr lang="en-US" smtClean="0"/>
-              <a:t>7/5/2016</a:t>
+              <a:t>1/29/2017</a:t>
             </a:fld>
             <a:endParaRPr lang="en-US"/>
           </a:p>
@@ -6971,7 +8018,7 @@
           <a:p>
             <a:fld id="{699DC775-C286-4358-8C92-D7E584E969B3}" type="datetimeFigureOut">
               <a:rPr lang="en-US" smtClean="0"/>
-              <a:t>7/5/2016</a:t>
+              <a:t>1/29/2017</a:t>
             </a:fld>
             <a:endParaRPr lang="en-US"/>
           </a:p>
@@ -7246,7 +8293,7 @@
           <a:p>
             <a:fld id="{699DC775-C286-4358-8C92-D7E584E969B3}" type="datetimeFigureOut">
               <a:rPr lang="en-US" smtClean="0"/>
-              <a:t>7/5/2016</a:t>
+              <a:t>1/29/2017</a:t>
             </a:fld>
             <a:endParaRPr lang="en-US"/>
           </a:p>
@@ -7498,7 +8545,7 @@
           <a:p>
             <a:fld id="{699DC775-C286-4358-8C92-D7E584E969B3}" type="datetimeFigureOut">
               <a:rPr lang="en-US" smtClean="0"/>
-              <a:t>7/5/2016</a:t>
+              <a:t>1/29/2017</a:t>
             </a:fld>
             <a:endParaRPr lang="en-US"/>
           </a:p>
@@ -7709,7 +8756,7 @@
           <a:p>
             <a:fld id="{699DC775-C286-4358-8C92-D7E584E969B3}" type="datetimeFigureOut">
               <a:rPr lang="en-US" smtClean="0"/>
-              <a:t>7/5/2016</a:t>
+              <a:t>1/29/2017</a:t>
             </a:fld>
             <a:endParaRPr lang="en-US"/>
           </a:p>
@@ -8222,7 +9269,7 @@
           <a:p>
             <a:fld id="{699DC775-C286-4358-8C92-D7E584E969B3}" type="datetimeFigureOut">
               <a:rPr lang="en-US" smtClean="0"/>
-              <a:t>7/5/2016</a:t>
+              <a:t>1/29/2017</a:t>
             </a:fld>
             <a:endParaRPr lang="en-US"/>
           </a:p>
@@ -8733,7 +9780,7 @@
           <a:p>
             <a:fld id="{699DC775-C286-4358-8C92-D7E584E969B3}" type="datetimeFigureOut">
               <a:rPr lang="en-US" smtClean="0"/>
-              <a:t>7/5/2016</a:t>
+              <a:t>1/29/2017</a:t>
             </a:fld>
             <a:endParaRPr lang="en-US"/>
           </a:p>
@@ -9243,6 +10290,1069 @@
 </file>
 
 <file path=ppt/slides/slide10.xml><?xml version="1.0" encoding="utf-8"?>
+<p:sld xmlns:a="http://schemas.openxmlformats.org/drawingml/2006/main" xmlns:r="http://schemas.openxmlformats.org/officeDocument/2006/relationships" xmlns:p="http://schemas.openxmlformats.org/presentationml/2006/main">
+  <p:cSld>
+    <p:spTree>
+      <p:nvGrpSpPr>
+        <p:cNvPr id="1" name=""/>
+        <p:cNvGrpSpPr/>
+        <p:nvPr/>
+      </p:nvGrpSpPr>
+      <p:grpSpPr>
+        <a:xfrm>
+          <a:off x="0" y="0"/>
+          <a:ext cx="0" cy="0"/>
+          <a:chOff x="0" y="0"/>
+          <a:chExt cx="0" cy="0"/>
+        </a:xfrm>
+      </p:grpSpPr>
+      <p:sp>
+        <p:nvSpPr>
+          <p:cNvPr id="18" name="Triangle"/>
+          <p:cNvSpPr/>
+          <p:nvPr/>
+        </p:nvSpPr>
+        <p:spPr>
+          <a:xfrm>
+            <a:off x="3086100" y="3962400"/>
+            <a:ext cx="2743200" cy="2743200"/>
+          </a:xfrm>
+          <a:prstGeom prst="triangle">
+            <a:avLst/>
+          </a:prstGeom>
+        </p:spPr>
+        <p:style>
+          <a:lnRef idx="2">
+            <a:schemeClr val="accent1">
+              <a:shade val="50000"/>
+            </a:schemeClr>
+          </a:lnRef>
+          <a:fillRef idx="1">
+            <a:schemeClr val="accent1"/>
+          </a:fillRef>
+          <a:effectRef idx="0">
+            <a:schemeClr val="accent1"/>
+          </a:effectRef>
+          <a:fontRef idx="minor">
+            <a:schemeClr val="lt1"/>
+          </a:fontRef>
+        </p:style>
+        <p:txBody>
+          <a:bodyPr rtlCol="0" anchor="ctr"/>
+          <a:lstStyle/>
+          <a:p>
+            <a:pPr algn="ctr"/>
+            <a:endParaRPr lang="zh-CN" altLang="en-US"/>
+          </a:p>
+        </p:txBody>
+      </p:sp>
+      <p:sp>
+        <p:nvSpPr>
+          <p:cNvPr id="16" name="Target"/>
+          <p:cNvSpPr/>
+          <p:nvPr/>
+        </p:nvSpPr>
+        <p:spPr>
+          <a:xfrm rot="10725280">
+            <a:off x="1579973" y="2641764"/>
+            <a:ext cx="1066800" cy="1066800"/>
+          </a:xfrm>
+          <a:prstGeom prst="ellipse">
+            <a:avLst/>
+          </a:prstGeom>
+          <a:solidFill>
+            <a:srgbClr val="00B050"/>
+          </a:solidFill>
+        </p:spPr>
+        <p:style>
+          <a:lnRef idx="2">
+            <a:schemeClr val="accent1">
+              <a:shade val="50000"/>
+            </a:schemeClr>
+          </a:lnRef>
+          <a:fillRef idx="1">
+            <a:schemeClr val="accent1"/>
+          </a:fillRef>
+          <a:effectRef idx="0">
+            <a:schemeClr val="accent1"/>
+          </a:effectRef>
+          <a:fontRef idx="minor">
+            <a:schemeClr val="lt1"/>
+          </a:fontRef>
+        </p:style>
+        <p:txBody>
+          <a:bodyPr rtlCol="0" anchor="ctr"/>
+          <a:lstStyle/>
+          <a:p>
+            <a:pPr algn="ctr"/>
+            <a:endParaRPr lang="zh-CN" altLang="en-US"/>
+          </a:p>
+        </p:txBody>
+      </p:sp>
+      <p:sp>
+        <p:nvSpPr>
+          <p:cNvPr id="14" name="Rectangle"/>
+          <p:cNvSpPr/>
+          <p:nvPr/>
+        </p:nvSpPr>
+        <p:spPr>
+          <a:xfrm>
+            <a:off x="3429000" y="2438400"/>
+            <a:ext cx="2057400" cy="1371600"/>
+          </a:xfrm>
+          <a:prstGeom prst="rect">
+            <a:avLst/>
+          </a:prstGeom>
+          <a:solidFill>
+            <a:srgbClr val="FF0000"/>
+          </a:solidFill>
+        </p:spPr>
+        <p:style>
+          <a:lnRef idx="2">
+            <a:schemeClr val="accent1">
+              <a:shade val="50000"/>
+            </a:schemeClr>
+          </a:lnRef>
+          <a:fillRef idx="1">
+            <a:schemeClr val="accent1"/>
+          </a:fillRef>
+          <a:effectRef idx="0">
+            <a:schemeClr val="accent1"/>
+          </a:effectRef>
+          <a:fontRef idx="minor">
+            <a:schemeClr val="lt1"/>
+          </a:fontRef>
+        </p:style>
+        <p:txBody>
+          <a:bodyPr rtlCol="0" anchor="ctr"/>
+          <a:lstStyle/>
+          <a:p>
+            <a:pPr algn="ctr"/>
+            <a:endParaRPr lang="zh-CN" altLang="en-US"/>
+          </a:p>
+        </p:txBody>
+      </p:sp>
+      <p:sp>
+        <p:nvSpPr>
+          <p:cNvPr id="17" name="Oval"/>
+          <p:cNvSpPr/>
+          <p:nvPr/>
+        </p:nvSpPr>
+        <p:spPr>
+          <a:xfrm>
+            <a:off x="6269182" y="2590800"/>
+            <a:ext cx="1066800" cy="1066800"/>
+          </a:xfrm>
+          <a:prstGeom prst="ellipse">
+            <a:avLst/>
+          </a:prstGeom>
+        </p:spPr>
+        <p:style>
+          <a:lnRef idx="2">
+            <a:schemeClr val="accent1">
+              <a:shade val="50000"/>
+            </a:schemeClr>
+          </a:lnRef>
+          <a:fillRef idx="1">
+            <a:schemeClr val="accent1"/>
+          </a:fillRef>
+          <a:effectRef idx="0">
+            <a:schemeClr val="accent1"/>
+          </a:effectRef>
+          <a:fontRef idx="minor">
+            <a:schemeClr val="lt1"/>
+          </a:fontRef>
+        </p:style>
+        <p:txBody>
+          <a:bodyPr rtlCol="0" anchor="ctr"/>
+          <a:lstStyle/>
+          <a:p>
+            <a:pPr algn="ctr"/>
+            <a:endParaRPr lang="zh-CN" altLang="en-US"/>
+          </a:p>
+        </p:txBody>
+      </p:sp>
+    </p:spTree>
+    <p:extLst>
+      <p:ext uri="{BB962C8B-B14F-4D97-AF65-F5344CB8AC3E}">
+        <p14:creationId xmlns:p14="http://schemas.microsoft.com/office/powerpoint/2010/main" val="2402637234"/>
+      </p:ext>
+    </p:extLst>
+  </p:cSld>
+  <p:clrMapOvr>
+    <a:masterClrMapping/>
+  </p:clrMapOvr>
+  <p:timing>
+    <p:tnLst>
+      <p:par>
+        <p:cTn id="1" dur="indefinite" restart="never" nodeType="tmRoot"/>
+      </p:par>
+    </p:tnLst>
+  </p:timing>
+</p:sld>
+</file>
+
+<file path=ppt/slides/slide11.xml><?xml version="1.0" encoding="utf-8"?>
+<p:sld xmlns:a="http://schemas.openxmlformats.org/drawingml/2006/main" xmlns:r="http://schemas.openxmlformats.org/officeDocument/2006/relationships" xmlns:p="http://schemas.openxmlformats.org/presentationml/2006/main">
+  <p:cSld>
+    <p:spTree>
+      <p:nvGrpSpPr>
+        <p:cNvPr id="1" name=""/>
+        <p:cNvGrpSpPr/>
+        <p:nvPr/>
+      </p:nvGrpSpPr>
+      <p:grpSpPr>
+        <a:xfrm>
+          <a:off x="0" y="0"/>
+          <a:ext cx="0" cy="0"/>
+          <a:chOff x="0" y="0"/>
+          <a:chExt cx="0" cy="0"/>
+        </a:xfrm>
+      </p:grpSpPr>
+      <p:sp>
+        <p:nvSpPr>
+          <p:cNvPr id="9" name="Triangle"/>
+          <p:cNvSpPr/>
+          <p:nvPr/>
+        </p:nvSpPr>
+        <p:spPr>
+          <a:xfrm>
+            <a:off x="3086100" y="3962400"/>
+            <a:ext cx="2743200" cy="2743200"/>
+          </a:xfrm>
+          <a:prstGeom prst="triangle">
+            <a:avLst/>
+          </a:prstGeom>
+        </p:spPr>
+        <p:style>
+          <a:lnRef idx="2">
+            <a:schemeClr val="accent1">
+              <a:shade val="50000"/>
+            </a:schemeClr>
+          </a:lnRef>
+          <a:fillRef idx="1">
+            <a:schemeClr val="accent1"/>
+          </a:fillRef>
+          <a:effectRef idx="0">
+            <a:schemeClr val="accent1"/>
+          </a:effectRef>
+          <a:fontRef idx="minor">
+            <a:schemeClr val="lt1"/>
+          </a:fontRef>
+        </p:style>
+        <p:txBody>
+          <a:bodyPr rtlCol="0" anchor="ctr"/>
+          <a:lstStyle/>
+          <a:p>
+            <a:pPr algn="ctr"/>
+            <a:endParaRPr lang="zh-CN" altLang="en-US"/>
+          </a:p>
+        </p:txBody>
+      </p:sp>
+      <p:sp>
+        <p:nvSpPr>
+          <p:cNvPr id="18" name="Triangle"/>
+          <p:cNvSpPr/>
+          <p:nvPr/>
+        </p:nvSpPr>
+        <p:spPr>
+          <a:xfrm>
+            <a:off x="3034558" y="-456598"/>
+            <a:ext cx="2743200" cy="2743200"/>
+          </a:xfrm>
+          <a:prstGeom prst="triangle">
+            <a:avLst/>
+          </a:prstGeom>
+        </p:spPr>
+        <p:style>
+          <a:lnRef idx="2">
+            <a:schemeClr val="accent1">
+              <a:shade val="50000"/>
+            </a:schemeClr>
+          </a:lnRef>
+          <a:fillRef idx="1">
+            <a:schemeClr val="accent1"/>
+          </a:fillRef>
+          <a:effectRef idx="0">
+            <a:schemeClr val="accent1"/>
+          </a:effectRef>
+          <a:fontRef idx="minor">
+            <a:schemeClr val="lt1"/>
+          </a:fontRef>
+        </p:style>
+        <p:txBody>
+          <a:bodyPr rtlCol="0" anchor="ctr"/>
+          <a:lstStyle/>
+          <a:p>
+            <a:pPr algn="ctr"/>
+            <a:endParaRPr lang="zh-CN" altLang="en-US"/>
+          </a:p>
+        </p:txBody>
+      </p:sp>
+      <p:sp>
+        <p:nvSpPr>
+          <p:cNvPr id="16" name="Target"/>
+          <p:cNvSpPr/>
+          <p:nvPr/>
+        </p:nvSpPr>
+        <p:spPr>
+          <a:xfrm rot="10725280">
+            <a:off x="1579973" y="2641764"/>
+            <a:ext cx="1066800" cy="1066800"/>
+          </a:xfrm>
+          <a:prstGeom prst="ellipse">
+            <a:avLst/>
+          </a:prstGeom>
+          <a:solidFill>
+            <a:srgbClr val="00B050"/>
+          </a:solidFill>
+        </p:spPr>
+        <p:style>
+          <a:lnRef idx="2">
+            <a:schemeClr val="accent1">
+              <a:shade val="50000"/>
+            </a:schemeClr>
+          </a:lnRef>
+          <a:fillRef idx="1">
+            <a:schemeClr val="accent1"/>
+          </a:fillRef>
+          <a:effectRef idx="0">
+            <a:schemeClr val="accent1"/>
+          </a:effectRef>
+          <a:fontRef idx="minor">
+            <a:schemeClr val="lt1"/>
+          </a:fontRef>
+        </p:style>
+        <p:txBody>
+          <a:bodyPr rtlCol="0" anchor="ctr"/>
+          <a:lstStyle/>
+          <a:p>
+            <a:pPr algn="ctr"/>
+            <a:endParaRPr lang="zh-CN" altLang="en-US"/>
+          </a:p>
+        </p:txBody>
+      </p:sp>
+      <p:sp>
+        <p:nvSpPr>
+          <p:cNvPr id="14" name="Rectangle"/>
+          <p:cNvSpPr/>
+          <p:nvPr/>
+        </p:nvSpPr>
+        <p:spPr>
+          <a:xfrm>
+            <a:off x="3429000" y="2438400"/>
+            <a:ext cx="2057400" cy="1371600"/>
+          </a:xfrm>
+          <a:prstGeom prst="rect">
+            <a:avLst/>
+          </a:prstGeom>
+          <a:solidFill>
+            <a:srgbClr val="FF0000"/>
+          </a:solidFill>
+        </p:spPr>
+        <p:style>
+          <a:lnRef idx="2">
+            <a:schemeClr val="accent1">
+              <a:shade val="50000"/>
+            </a:schemeClr>
+          </a:lnRef>
+          <a:fillRef idx="1">
+            <a:schemeClr val="accent1"/>
+          </a:fillRef>
+          <a:effectRef idx="0">
+            <a:schemeClr val="accent1"/>
+          </a:effectRef>
+          <a:fontRef idx="minor">
+            <a:schemeClr val="lt1"/>
+          </a:fontRef>
+        </p:style>
+        <p:txBody>
+          <a:bodyPr rtlCol="0" anchor="ctr"/>
+          <a:lstStyle/>
+          <a:p>
+            <a:pPr algn="ctr"/>
+            <a:endParaRPr lang="zh-CN" altLang="en-US"/>
+          </a:p>
+        </p:txBody>
+      </p:sp>
+      <p:sp>
+        <p:nvSpPr>
+          <p:cNvPr id="8" name="Oval"/>
+          <p:cNvSpPr/>
+          <p:nvPr/>
+        </p:nvSpPr>
+        <p:spPr>
+          <a:xfrm>
+            <a:off x="6269182" y="2590800"/>
+            <a:ext cx="1066800" cy="1066800"/>
+          </a:xfrm>
+          <a:prstGeom prst="ellipse">
+            <a:avLst/>
+          </a:prstGeom>
+        </p:spPr>
+        <p:style>
+          <a:lnRef idx="2">
+            <a:schemeClr val="accent1">
+              <a:shade val="50000"/>
+            </a:schemeClr>
+          </a:lnRef>
+          <a:fillRef idx="1">
+            <a:schemeClr val="accent1"/>
+          </a:fillRef>
+          <a:effectRef idx="0">
+            <a:schemeClr val="accent1"/>
+          </a:effectRef>
+          <a:fontRef idx="minor">
+            <a:schemeClr val="lt1"/>
+          </a:fontRef>
+        </p:style>
+        <p:txBody>
+          <a:bodyPr rtlCol="0" anchor="ctr"/>
+          <a:lstStyle/>
+          <a:p>
+            <a:pPr algn="ctr"/>
+            <a:endParaRPr lang="zh-CN" altLang="en-US"/>
+          </a:p>
+        </p:txBody>
+      </p:sp>
+      <p:sp>
+        <p:nvSpPr>
+          <p:cNvPr id="17" name="Oval"/>
+          <p:cNvSpPr/>
+          <p:nvPr/>
+        </p:nvSpPr>
+        <p:spPr>
+          <a:xfrm>
+            <a:off x="1580059" y="2645492"/>
+            <a:ext cx="1066800" cy="1066800"/>
+          </a:xfrm>
+          <a:prstGeom prst="ellipse">
+            <a:avLst/>
+          </a:prstGeom>
+        </p:spPr>
+        <p:style>
+          <a:lnRef idx="2">
+            <a:schemeClr val="accent1">
+              <a:shade val="50000"/>
+            </a:schemeClr>
+          </a:lnRef>
+          <a:fillRef idx="1">
+            <a:schemeClr val="accent1"/>
+          </a:fillRef>
+          <a:effectRef idx="0">
+            <a:schemeClr val="accent1"/>
+          </a:effectRef>
+          <a:fontRef idx="minor">
+            <a:schemeClr val="lt1"/>
+          </a:fontRef>
+        </p:style>
+        <p:txBody>
+          <a:bodyPr rtlCol="0" anchor="ctr"/>
+          <a:lstStyle/>
+          <a:p>
+            <a:pPr algn="ctr"/>
+            <a:endParaRPr lang="zh-CN" altLang="en-US"/>
+          </a:p>
+        </p:txBody>
+      </p:sp>
+    </p:spTree>
+    <p:extLst>
+      <p:ext uri="{BB962C8B-B14F-4D97-AF65-F5344CB8AC3E}">
+        <p14:creationId xmlns:p14="http://schemas.microsoft.com/office/powerpoint/2010/main" val="3779085156"/>
+      </p:ext>
+    </p:extLst>
+  </p:cSld>
+  <p:clrMapOvr>
+    <a:masterClrMapping/>
+  </p:clrMapOvr>
+  <p:timing>
+    <p:tnLst>
+      <p:par>
+        <p:cTn id="1" dur="indefinite" restart="never" nodeType="tmRoot"/>
+      </p:par>
+    </p:tnLst>
+  </p:timing>
+</p:sld>
+</file>
+
+<file path=ppt/slides/slide12.xml><?xml version="1.0" encoding="utf-8"?>
+<p:sld xmlns:a="http://schemas.openxmlformats.org/drawingml/2006/main" xmlns:r="http://schemas.openxmlformats.org/officeDocument/2006/relationships" xmlns:p="http://schemas.openxmlformats.org/presentationml/2006/main">
+  <p:cSld>
+    <p:bg>
+      <p:bgPr>
+        <a:solidFill>
+          <a:srgbClr val="0070C0"/>
+        </a:solidFill>
+        <a:effectLst/>
+      </p:bgPr>
+    </p:bg>
+    <p:spTree>
+      <p:nvGrpSpPr>
+        <p:cNvPr id="1" name=""/>
+        <p:cNvGrpSpPr/>
+        <p:nvPr/>
+      </p:nvGrpSpPr>
+      <p:grpSpPr>
+        <a:xfrm>
+          <a:off x="0" y="0"/>
+          <a:ext cx="0" cy="0"/>
+          <a:chOff x="0" y="0"/>
+          <a:chExt cx="0" cy="0"/>
+        </a:xfrm>
+      </p:grpSpPr>
+      <p:sp>
+        <p:nvSpPr>
+          <p:cNvPr id="4" name="Title 1"/>
+          <p:cNvSpPr>
+            <a:spLocks noGrp="1"/>
+          </p:cNvSpPr>
+          <p:nvPr>
+            <p:ph type="title"/>
+          </p:nvPr>
+        </p:nvSpPr>
+        <p:spPr>
+          <a:xfrm>
+            <a:off x="304800" y="1066800"/>
+            <a:ext cx="8229600" cy="1143000"/>
+          </a:xfrm>
+        </p:spPr>
+        <p:txBody>
+          <a:bodyPr>
+            <a:normAutofit fontScale="90000"/>
+          </a:bodyPr>
+          <a:lstStyle/>
+          <a:p>
+            <a:r>
+              <a:rPr lang="en-US" altLang="zh-CN" dirty="0">
+                <a:solidFill>
+                  <a:schemeClr val="bg1"/>
+                </a:solidFill>
+              </a:rPr>
+              <a:t>Duplicate and Rotate:: </a:t>
+            </a:r>
+            <a:r>
+              <a:rPr lang="en-US" altLang="zh-CN" dirty="0" smtClean="0">
+                <a:solidFill>
+                  <a:schemeClr val="bg1"/>
+                </a:solidFill>
+              </a:rPr>
+              <a:t>Multiple Shape (Dynamic)</a:t>
+            </a:r>
+            <a:endParaRPr lang="en-SG" dirty="0">
+              <a:solidFill>
+                <a:schemeClr val="bg1"/>
+              </a:solidFill>
+            </a:endParaRPr>
+          </a:p>
+        </p:txBody>
+      </p:sp>
+    </p:spTree>
+    <p:extLst>
+      <p:ext uri="{BB962C8B-B14F-4D97-AF65-F5344CB8AC3E}">
+        <p14:creationId xmlns:p14="http://schemas.microsoft.com/office/powerpoint/2010/main" val="795825067"/>
+      </p:ext>
+    </p:extLst>
+  </p:cSld>
+  <p:clrMapOvr>
+    <a:masterClrMapping/>
+  </p:clrMapOvr>
+  <p:timing>
+    <p:tnLst>
+      <p:par>
+        <p:cTn id="1" dur="indefinite" restart="never" nodeType="tmRoot"/>
+      </p:par>
+    </p:tnLst>
+  </p:timing>
+</p:sld>
+</file>
+
+<file path=ppt/slides/slide13.xml><?xml version="1.0" encoding="utf-8"?>
+<p:sld xmlns:a="http://schemas.openxmlformats.org/drawingml/2006/main" xmlns:r="http://schemas.openxmlformats.org/officeDocument/2006/relationships" xmlns:p="http://schemas.openxmlformats.org/presentationml/2006/main">
+  <p:cSld>
+    <p:spTree>
+      <p:nvGrpSpPr>
+        <p:cNvPr id="1" name=""/>
+        <p:cNvGrpSpPr/>
+        <p:nvPr/>
+      </p:nvGrpSpPr>
+      <p:grpSpPr>
+        <a:xfrm>
+          <a:off x="0" y="0"/>
+          <a:ext cx="0" cy="0"/>
+          <a:chOff x="0" y="0"/>
+          <a:chExt cx="0" cy="0"/>
+        </a:xfrm>
+      </p:grpSpPr>
+      <p:sp>
+        <p:nvSpPr>
+          <p:cNvPr id="18" name="Triangle"/>
+          <p:cNvSpPr/>
+          <p:nvPr/>
+        </p:nvSpPr>
+        <p:spPr>
+          <a:xfrm>
+            <a:off x="3086100" y="3962400"/>
+            <a:ext cx="2743200" cy="2743200"/>
+          </a:xfrm>
+          <a:prstGeom prst="triangle">
+            <a:avLst/>
+          </a:prstGeom>
+        </p:spPr>
+        <p:style>
+          <a:lnRef idx="2">
+            <a:schemeClr val="accent1">
+              <a:shade val="50000"/>
+            </a:schemeClr>
+          </a:lnRef>
+          <a:fillRef idx="1">
+            <a:schemeClr val="accent1"/>
+          </a:fillRef>
+          <a:effectRef idx="0">
+            <a:schemeClr val="accent1"/>
+          </a:effectRef>
+          <a:fontRef idx="minor">
+            <a:schemeClr val="lt1"/>
+          </a:fontRef>
+        </p:style>
+        <p:txBody>
+          <a:bodyPr rtlCol="0" anchor="ctr"/>
+          <a:lstStyle/>
+          <a:p>
+            <a:pPr algn="ctr"/>
+            <a:endParaRPr lang="zh-CN" altLang="en-US"/>
+          </a:p>
+        </p:txBody>
+      </p:sp>
+      <p:sp>
+        <p:nvSpPr>
+          <p:cNvPr id="16" name="Target"/>
+          <p:cNvSpPr/>
+          <p:nvPr/>
+        </p:nvSpPr>
+        <p:spPr>
+          <a:xfrm rot="10725280">
+            <a:off x="1579973" y="2641764"/>
+            <a:ext cx="1066800" cy="1066800"/>
+          </a:xfrm>
+          <a:prstGeom prst="ellipse">
+            <a:avLst/>
+          </a:prstGeom>
+          <a:solidFill>
+            <a:srgbClr val="00B050"/>
+          </a:solidFill>
+        </p:spPr>
+        <p:style>
+          <a:lnRef idx="2">
+            <a:schemeClr val="accent1">
+              <a:shade val="50000"/>
+            </a:schemeClr>
+          </a:lnRef>
+          <a:fillRef idx="1">
+            <a:schemeClr val="accent1"/>
+          </a:fillRef>
+          <a:effectRef idx="0">
+            <a:schemeClr val="accent1"/>
+          </a:effectRef>
+          <a:fontRef idx="minor">
+            <a:schemeClr val="lt1"/>
+          </a:fontRef>
+        </p:style>
+        <p:txBody>
+          <a:bodyPr rtlCol="0" anchor="ctr"/>
+          <a:lstStyle/>
+          <a:p>
+            <a:pPr algn="ctr"/>
+            <a:endParaRPr lang="zh-CN" altLang="en-US"/>
+          </a:p>
+        </p:txBody>
+      </p:sp>
+      <p:sp>
+        <p:nvSpPr>
+          <p:cNvPr id="14" name="Rectangle"/>
+          <p:cNvSpPr/>
+          <p:nvPr/>
+        </p:nvSpPr>
+        <p:spPr>
+          <a:xfrm>
+            <a:off x="3429000" y="2438400"/>
+            <a:ext cx="2057400" cy="1371600"/>
+          </a:xfrm>
+          <a:prstGeom prst="rect">
+            <a:avLst/>
+          </a:prstGeom>
+          <a:solidFill>
+            <a:srgbClr val="FF0000"/>
+          </a:solidFill>
+        </p:spPr>
+        <p:style>
+          <a:lnRef idx="2">
+            <a:schemeClr val="accent1">
+              <a:shade val="50000"/>
+            </a:schemeClr>
+          </a:lnRef>
+          <a:fillRef idx="1">
+            <a:schemeClr val="accent1"/>
+          </a:fillRef>
+          <a:effectRef idx="0">
+            <a:schemeClr val="accent1"/>
+          </a:effectRef>
+          <a:fontRef idx="minor">
+            <a:schemeClr val="lt1"/>
+          </a:fontRef>
+        </p:style>
+        <p:txBody>
+          <a:bodyPr rtlCol="0" anchor="ctr"/>
+          <a:lstStyle/>
+          <a:p>
+            <a:pPr algn="ctr"/>
+            <a:endParaRPr lang="zh-CN" altLang="en-US"/>
+          </a:p>
+        </p:txBody>
+      </p:sp>
+      <p:sp>
+        <p:nvSpPr>
+          <p:cNvPr id="17" name="Oval"/>
+          <p:cNvSpPr/>
+          <p:nvPr/>
+        </p:nvSpPr>
+        <p:spPr>
+          <a:xfrm>
+            <a:off x="6269182" y="2590800"/>
+            <a:ext cx="1066800" cy="1066800"/>
+          </a:xfrm>
+          <a:prstGeom prst="ellipse">
+            <a:avLst/>
+          </a:prstGeom>
+        </p:spPr>
+        <p:style>
+          <a:lnRef idx="2">
+            <a:schemeClr val="accent1">
+              <a:shade val="50000"/>
+            </a:schemeClr>
+          </a:lnRef>
+          <a:fillRef idx="1">
+            <a:schemeClr val="accent1"/>
+          </a:fillRef>
+          <a:effectRef idx="0">
+            <a:schemeClr val="accent1"/>
+          </a:effectRef>
+          <a:fontRef idx="minor">
+            <a:schemeClr val="lt1"/>
+          </a:fontRef>
+        </p:style>
+        <p:txBody>
+          <a:bodyPr rtlCol="0" anchor="ctr"/>
+          <a:lstStyle/>
+          <a:p>
+            <a:pPr algn="ctr"/>
+            <a:endParaRPr lang="zh-CN" altLang="en-US"/>
+          </a:p>
+        </p:txBody>
+      </p:sp>
+    </p:spTree>
+    <p:extLst>
+      <p:ext uri="{BB962C8B-B14F-4D97-AF65-F5344CB8AC3E}">
+        <p14:creationId xmlns:p14="http://schemas.microsoft.com/office/powerpoint/2010/main" val="3831418678"/>
+      </p:ext>
+    </p:extLst>
+  </p:cSld>
+  <p:clrMapOvr>
+    <a:masterClrMapping/>
+  </p:clrMapOvr>
+  <p:timing>
+    <p:tnLst>
+      <p:par>
+        <p:cTn id="1" dur="indefinite" restart="never" nodeType="tmRoot"/>
+      </p:par>
+    </p:tnLst>
+  </p:timing>
+</p:sld>
+</file>
+
+<file path=ppt/slides/slide14.xml><?xml version="1.0" encoding="utf-8"?>
+<p:sld xmlns:a="http://schemas.openxmlformats.org/drawingml/2006/main" xmlns:r="http://schemas.openxmlformats.org/officeDocument/2006/relationships" xmlns:p="http://schemas.openxmlformats.org/presentationml/2006/main">
+  <p:cSld>
+    <p:spTree>
+      <p:nvGrpSpPr>
+        <p:cNvPr id="1" name=""/>
+        <p:cNvGrpSpPr/>
+        <p:nvPr/>
+      </p:nvGrpSpPr>
+      <p:grpSpPr>
+        <a:xfrm>
+          <a:off x="0" y="0"/>
+          <a:ext cx="0" cy="0"/>
+          <a:chOff x="0" y="0"/>
+          <a:chExt cx="0" cy="0"/>
+        </a:xfrm>
+      </p:grpSpPr>
+      <p:sp>
+        <p:nvSpPr>
+          <p:cNvPr id="7" name="Triangle"/>
+          <p:cNvSpPr/>
+          <p:nvPr/>
+        </p:nvSpPr>
+        <p:spPr>
+          <a:xfrm>
+            <a:off x="3086100" y="3962400"/>
+            <a:ext cx="2743200" cy="2743200"/>
+          </a:xfrm>
+          <a:prstGeom prst="triangle">
+            <a:avLst/>
+          </a:prstGeom>
+        </p:spPr>
+        <p:style>
+          <a:lnRef idx="2">
+            <a:schemeClr val="accent1">
+              <a:shade val="50000"/>
+            </a:schemeClr>
+          </a:lnRef>
+          <a:fillRef idx="1">
+            <a:schemeClr val="accent1"/>
+          </a:fillRef>
+          <a:effectRef idx="0">
+            <a:schemeClr val="accent1"/>
+          </a:effectRef>
+          <a:fontRef idx="minor">
+            <a:schemeClr val="lt1"/>
+          </a:fontRef>
+        </p:style>
+        <p:txBody>
+          <a:bodyPr rtlCol="0" anchor="ctr"/>
+          <a:lstStyle/>
+          <a:p>
+            <a:pPr algn="ctr"/>
+            <a:endParaRPr lang="zh-CN" altLang="en-US"/>
+          </a:p>
+        </p:txBody>
+      </p:sp>
+      <p:sp>
+        <p:nvSpPr>
+          <p:cNvPr id="18" name="Triangle"/>
+          <p:cNvSpPr/>
+          <p:nvPr/>
+        </p:nvSpPr>
+        <p:spPr>
+          <a:xfrm rot="10720789">
+            <a:off x="3035186" y="-456611"/>
+            <a:ext cx="2743200" cy="2743200"/>
+          </a:xfrm>
+          <a:prstGeom prst="triangle">
+            <a:avLst/>
+          </a:prstGeom>
+        </p:spPr>
+        <p:style>
+          <a:lnRef idx="2">
+            <a:schemeClr val="accent1">
+              <a:shade val="50000"/>
+            </a:schemeClr>
+          </a:lnRef>
+          <a:fillRef idx="1">
+            <a:schemeClr val="accent1"/>
+          </a:fillRef>
+          <a:effectRef idx="0">
+            <a:schemeClr val="accent1"/>
+          </a:effectRef>
+          <a:fontRef idx="minor">
+            <a:schemeClr val="lt1"/>
+          </a:fontRef>
+        </p:style>
+        <p:txBody>
+          <a:bodyPr rtlCol="0" anchor="ctr"/>
+          <a:lstStyle/>
+          <a:p>
+            <a:pPr algn="ctr"/>
+            <a:endParaRPr lang="zh-CN" altLang="en-US"/>
+          </a:p>
+        </p:txBody>
+      </p:sp>
+      <p:sp>
+        <p:nvSpPr>
+          <p:cNvPr id="16" name="Target"/>
+          <p:cNvSpPr/>
+          <p:nvPr/>
+        </p:nvSpPr>
+        <p:spPr>
+          <a:xfrm rot="10725280">
+            <a:off x="1579973" y="2641764"/>
+            <a:ext cx="1066800" cy="1066800"/>
+          </a:xfrm>
+          <a:prstGeom prst="ellipse">
+            <a:avLst/>
+          </a:prstGeom>
+          <a:solidFill>
+            <a:srgbClr val="00B050"/>
+          </a:solidFill>
+        </p:spPr>
+        <p:style>
+          <a:lnRef idx="2">
+            <a:schemeClr val="accent1">
+              <a:shade val="50000"/>
+            </a:schemeClr>
+          </a:lnRef>
+          <a:fillRef idx="1">
+            <a:schemeClr val="accent1"/>
+          </a:fillRef>
+          <a:effectRef idx="0">
+            <a:schemeClr val="accent1"/>
+          </a:effectRef>
+          <a:fontRef idx="minor">
+            <a:schemeClr val="lt1"/>
+          </a:fontRef>
+        </p:style>
+        <p:txBody>
+          <a:bodyPr rtlCol="0" anchor="ctr"/>
+          <a:lstStyle/>
+          <a:p>
+            <a:pPr algn="ctr"/>
+            <a:endParaRPr lang="zh-CN" altLang="en-US"/>
+          </a:p>
+        </p:txBody>
+      </p:sp>
+      <p:sp>
+        <p:nvSpPr>
+          <p:cNvPr id="14" name="Rectangle"/>
+          <p:cNvSpPr/>
+          <p:nvPr/>
+        </p:nvSpPr>
+        <p:spPr>
+          <a:xfrm>
+            <a:off x="3429000" y="2438400"/>
+            <a:ext cx="2057400" cy="1371600"/>
+          </a:xfrm>
+          <a:prstGeom prst="rect">
+            <a:avLst/>
+          </a:prstGeom>
+          <a:solidFill>
+            <a:srgbClr val="FF0000"/>
+          </a:solidFill>
+        </p:spPr>
+        <p:style>
+          <a:lnRef idx="2">
+            <a:schemeClr val="accent1">
+              <a:shade val="50000"/>
+            </a:schemeClr>
+          </a:lnRef>
+          <a:fillRef idx="1">
+            <a:schemeClr val="accent1"/>
+          </a:fillRef>
+          <a:effectRef idx="0">
+            <a:schemeClr val="accent1"/>
+          </a:effectRef>
+          <a:fontRef idx="minor">
+            <a:schemeClr val="lt1"/>
+          </a:fontRef>
+        </p:style>
+        <p:txBody>
+          <a:bodyPr rtlCol="0" anchor="ctr"/>
+          <a:lstStyle/>
+          <a:p>
+            <a:pPr algn="ctr"/>
+            <a:endParaRPr lang="zh-CN" altLang="en-US"/>
+          </a:p>
+        </p:txBody>
+      </p:sp>
+      <p:sp>
+        <p:nvSpPr>
+          <p:cNvPr id="6" name="Oval"/>
+          <p:cNvSpPr/>
+          <p:nvPr/>
+        </p:nvSpPr>
+        <p:spPr>
+          <a:xfrm>
+            <a:off x="6269182" y="2590800"/>
+            <a:ext cx="1066800" cy="1066800"/>
+          </a:xfrm>
+          <a:prstGeom prst="ellipse">
+            <a:avLst/>
+          </a:prstGeom>
+        </p:spPr>
+        <p:style>
+          <a:lnRef idx="2">
+            <a:schemeClr val="accent1">
+              <a:shade val="50000"/>
+            </a:schemeClr>
+          </a:lnRef>
+          <a:fillRef idx="1">
+            <a:schemeClr val="accent1"/>
+          </a:fillRef>
+          <a:effectRef idx="0">
+            <a:schemeClr val="accent1"/>
+          </a:effectRef>
+          <a:fontRef idx="minor">
+            <a:schemeClr val="lt1"/>
+          </a:fontRef>
+        </p:style>
+        <p:txBody>
+          <a:bodyPr rtlCol="0" anchor="ctr"/>
+          <a:lstStyle/>
+          <a:p>
+            <a:pPr algn="ctr"/>
+            <a:endParaRPr lang="zh-CN" altLang="en-US"/>
+          </a:p>
+        </p:txBody>
+      </p:sp>
+      <p:sp>
+        <p:nvSpPr>
+          <p:cNvPr id="17" name="Oval"/>
+          <p:cNvSpPr/>
+          <p:nvPr/>
+        </p:nvSpPr>
+        <p:spPr>
+          <a:xfrm rot="10720789">
+            <a:off x="1580042" y="2644819"/>
+            <a:ext cx="1066800" cy="1066800"/>
+          </a:xfrm>
+          <a:prstGeom prst="ellipse">
+            <a:avLst/>
+          </a:prstGeom>
+        </p:spPr>
+        <p:style>
+          <a:lnRef idx="2">
+            <a:schemeClr val="accent1">
+              <a:shade val="50000"/>
+            </a:schemeClr>
+          </a:lnRef>
+          <a:fillRef idx="1">
+            <a:schemeClr val="accent1"/>
+          </a:fillRef>
+          <a:effectRef idx="0">
+            <a:schemeClr val="accent1"/>
+          </a:effectRef>
+          <a:fontRef idx="minor">
+            <a:schemeClr val="lt1"/>
+          </a:fontRef>
+        </p:style>
+        <p:txBody>
+          <a:bodyPr rtlCol="0" anchor="ctr"/>
+          <a:lstStyle/>
+          <a:p>
+            <a:pPr algn="ctr"/>
+            <a:endParaRPr lang="zh-CN" altLang="en-US"/>
+          </a:p>
+        </p:txBody>
+      </p:sp>
+    </p:spTree>
+    <p:extLst>
+      <p:ext uri="{BB962C8B-B14F-4D97-AF65-F5344CB8AC3E}">
+        <p14:creationId xmlns:p14="http://schemas.microsoft.com/office/powerpoint/2010/main" val="1446292039"/>
+      </p:ext>
+    </p:extLst>
+  </p:cSld>
+  <p:clrMapOvr>
+    <a:masterClrMapping/>
+  </p:clrMapOvr>
+  <p:timing>
+    <p:tnLst>
+      <p:par>
+        <p:cTn id="1" dur="indefinite" restart="never" nodeType="tmRoot"/>
+      </p:par>
+    </p:tnLst>
+  </p:timing>
+</p:sld>
+</file>
+
+<file path=ppt/slides/slide15.xml><?xml version="1.0" encoding="utf-8"?>
 <p:sld xmlns:a="http://schemas.openxmlformats.org/drawingml/2006/main" xmlns:r="http://schemas.openxmlformats.org/officeDocument/2006/relationships" xmlns:p="http://schemas.openxmlformats.org/presentationml/2006/main" show="0">
   <p:cSld name="PPAck201403240026082737">
     <p:spTree>
@@ -9590,6 +11700,14 @@
 <file path=ppt/slides/slide3.xml><?xml version="1.0" encoding="utf-8"?>
 <p:sld xmlns:a="http://schemas.openxmlformats.org/drawingml/2006/main" xmlns:r="http://schemas.openxmlformats.org/officeDocument/2006/relationships" xmlns:p="http://schemas.openxmlformats.org/presentationml/2006/main">
   <p:cSld>
+    <p:bg>
+      <p:bgPr>
+        <a:solidFill>
+          <a:srgbClr val="0070C0"/>
+        </a:solidFill>
+        <a:effectLst/>
+      </p:bgPr>
+    </p:bg>
     <p:spTree>
       <p:nvGrpSpPr>
         <p:cNvPr id="1" name=""/>
@@ -9606,16 +11724,99 @@
       </p:grpSpPr>
       <p:sp>
         <p:nvSpPr>
-          <p:cNvPr id="4" name="Rectangle 1"/>
+          <p:cNvPr id="2" name="Title 1"/>
+          <p:cNvSpPr>
+            <a:spLocks noGrp="1"/>
+          </p:cNvSpPr>
+          <p:nvPr>
+            <p:ph type="title"/>
+          </p:nvPr>
+        </p:nvSpPr>
+        <p:spPr>
+          <a:xfrm>
+            <a:off x="304800" y="1066800"/>
+            <a:ext cx="8229600" cy="1143000"/>
+          </a:xfrm>
+        </p:spPr>
+        <p:txBody>
+          <a:bodyPr>
+            <a:normAutofit fontScale="90000"/>
+          </a:bodyPr>
+          <a:lstStyle/>
+          <a:p>
+            <a:r>
+              <a:rPr lang="en-US" altLang="zh-CN" dirty="0" smtClean="0">
+                <a:solidFill>
+                  <a:schemeClr val="bg1"/>
+                </a:solidFill>
+              </a:rPr>
+              <a:t>Duplicate and Rotate</a:t>
+            </a:r>
+            <a:r>
+              <a:rPr lang="en-US" dirty="0" smtClean="0">
+                <a:solidFill>
+                  <a:schemeClr val="bg1"/>
+                </a:solidFill>
+              </a:rPr>
+              <a:t>:: Single Shape (Fixed)</a:t>
+            </a:r>
+            <a:endParaRPr lang="en-SG" dirty="0">
+              <a:solidFill>
+                <a:schemeClr val="bg1"/>
+              </a:solidFill>
+            </a:endParaRPr>
+          </a:p>
+        </p:txBody>
+      </p:sp>
+    </p:spTree>
+    <p:extLst>
+      <p:ext uri="{BB962C8B-B14F-4D97-AF65-F5344CB8AC3E}">
+        <p14:creationId xmlns:p14="http://schemas.microsoft.com/office/powerpoint/2010/main" val="1313476487"/>
+      </p:ext>
+    </p:extLst>
+  </p:cSld>
+  <p:clrMapOvr>
+    <a:masterClrMapping/>
+  </p:clrMapOvr>
+  <p:timing>
+    <p:tnLst>
+      <p:par>
+        <p:cTn id="1" dur="indefinite" restart="never" nodeType="tmRoot"/>
+      </p:par>
+    </p:tnLst>
+  </p:timing>
+</p:sld>
+</file>
+
+<file path=ppt/slides/slide4.xml><?xml version="1.0" encoding="utf-8"?>
+<p:sld xmlns:a="http://schemas.openxmlformats.org/drawingml/2006/main" xmlns:r="http://schemas.openxmlformats.org/officeDocument/2006/relationships" xmlns:p="http://schemas.openxmlformats.org/presentationml/2006/main">
+  <p:cSld>
+    <p:spTree>
+      <p:nvGrpSpPr>
+        <p:cNvPr id="1" name=""/>
+        <p:cNvGrpSpPr/>
+        <p:nvPr/>
+      </p:nvGrpSpPr>
+      <p:grpSpPr>
+        <a:xfrm>
+          <a:off x="0" y="0"/>
+          <a:ext cx="0" cy="0"/>
+          <a:chOff x="0" y="0"/>
+          <a:chExt cx="0" cy="0"/>
+        </a:xfrm>
+      </p:grpSpPr>
+      <p:sp>
+        <p:nvSpPr>
+          <p:cNvPr id="18" name="Triangle"/>
           <p:cNvSpPr/>
           <p:nvPr/>
         </p:nvSpPr>
         <p:spPr>
           <a:xfrm>
-            <a:off x="3429000" y="2438400"/>
-            <a:ext cx="2057400" cy="1371600"/>
+            <a:off x="3086100" y="3962400"/>
+            <a:ext cx="2743200" cy="2743200"/>
           </a:xfrm>
-          <a:prstGeom prst="rect">
+          <a:prstGeom prst="triangle">
             <a:avLst/>
           </a:prstGeom>
         </p:spPr>
@@ -9646,7 +11847,93 @@
       </p:sp>
       <p:sp>
         <p:nvSpPr>
-          <p:cNvPr id="5" name="Oval 2"/>
+          <p:cNvPr id="16" name="Target"/>
+          <p:cNvSpPr/>
+          <p:nvPr/>
+        </p:nvSpPr>
+        <p:spPr>
+          <a:xfrm rot="10725280">
+            <a:off x="1579973" y="2641764"/>
+            <a:ext cx="1066800" cy="1066800"/>
+          </a:xfrm>
+          <a:prstGeom prst="ellipse">
+            <a:avLst/>
+          </a:prstGeom>
+          <a:solidFill>
+            <a:srgbClr val="00B050"/>
+          </a:solidFill>
+        </p:spPr>
+        <p:style>
+          <a:lnRef idx="2">
+            <a:schemeClr val="accent1">
+              <a:shade val="50000"/>
+            </a:schemeClr>
+          </a:lnRef>
+          <a:fillRef idx="1">
+            <a:schemeClr val="accent1"/>
+          </a:fillRef>
+          <a:effectRef idx="0">
+            <a:schemeClr val="accent1"/>
+          </a:effectRef>
+          <a:fontRef idx="minor">
+            <a:schemeClr val="lt1"/>
+          </a:fontRef>
+        </p:style>
+        <p:txBody>
+          <a:bodyPr rtlCol="0" anchor="ctr"/>
+          <a:lstStyle/>
+          <a:p>
+            <a:pPr algn="ctr"/>
+            <a:endParaRPr lang="zh-CN" altLang="en-US"/>
+          </a:p>
+        </p:txBody>
+      </p:sp>
+      <p:sp>
+        <p:nvSpPr>
+          <p:cNvPr id="14" name="Rectangle"/>
+          <p:cNvSpPr/>
+          <p:nvPr/>
+        </p:nvSpPr>
+        <p:spPr>
+          <a:xfrm>
+            <a:off x="3429000" y="2438400"/>
+            <a:ext cx="2057400" cy="1371600"/>
+          </a:xfrm>
+          <a:prstGeom prst="rect">
+            <a:avLst/>
+          </a:prstGeom>
+          <a:solidFill>
+            <a:srgbClr val="FF0000"/>
+          </a:solidFill>
+        </p:spPr>
+        <p:style>
+          <a:lnRef idx="2">
+            <a:schemeClr val="accent1">
+              <a:shade val="50000"/>
+            </a:schemeClr>
+          </a:lnRef>
+          <a:fillRef idx="1">
+            <a:schemeClr val="accent1"/>
+          </a:fillRef>
+          <a:effectRef idx="0">
+            <a:schemeClr val="accent1"/>
+          </a:effectRef>
+          <a:fontRef idx="minor">
+            <a:schemeClr val="lt1"/>
+          </a:fontRef>
+        </p:style>
+        <p:txBody>
+          <a:bodyPr rtlCol="0" anchor="ctr"/>
+          <a:lstStyle/>
+          <a:p>
+            <a:pPr algn="ctr"/>
+            <a:endParaRPr lang="zh-CN" altLang="en-US"/>
+          </a:p>
+        </p:txBody>
+      </p:sp>
+      <p:sp>
+        <p:nvSpPr>
+          <p:cNvPr id="17" name="Oval"/>
           <p:cNvSpPr/>
           <p:nvPr/>
         </p:nvSpPr>
@@ -9684,141 +11971,10 @@
           </a:p>
         </p:txBody>
       </p:sp>
-      <p:sp>
-        <p:nvSpPr>
-          <p:cNvPr id="6" name="Isosceles Triangle 3"/>
-          <p:cNvSpPr/>
-          <p:nvPr/>
-        </p:nvSpPr>
-        <p:spPr>
-          <a:xfrm>
-            <a:off x="3838956" y="4724400"/>
-            <a:ext cx="1237488" cy="1066800"/>
-          </a:xfrm>
-          <a:prstGeom prst="triangle">
-            <a:avLst/>
-          </a:prstGeom>
-        </p:spPr>
-        <p:style>
-          <a:lnRef idx="2">
-            <a:schemeClr val="accent1">
-              <a:shade val="50000"/>
-            </a:schemeClr>
-          </a:lnRef>
-          <a:fillRef idx="1">
-            <a:schemeClr val="accent1"/>
-          </a:fillRef>
-          <a:effectRef idx="0">
-            <a:schemeClr val="accent1"/>
-          </a:effectRef>
-          <a:fontRef idx="minor">
-            <a:schemeClr val="lt1"/>
-          </a:fontRef>
-        </p:style>
-        <p:txBody>
-          <a:bodyPr rtlCol="0" anchor="ctr"/>
-          <a:lstStyle/>
-          <a:p>
-            <a:pPr algn="ctr"/>
-            <a:endParaRPr lang="zh-CN" altLang="en-US"/>
-          </a:p>
-        </p:txBody>
-      </p:sp>
     </p:spTree>
     <p:extLst>
       <p:ext uri="{BB962C8B-B14F-4D97-AF65-F5344CB8AC3E}">
-        <p14:creationId xmlns:p14="http://schemas.microsoft.com/office/powerpoint/2010/main" val="2744356911"/>
-      </p:ext>
-    </p:extLst>
-  </p:cSld>
-  <p:clrMapOvr>
-    <a:masterClrMapping/>
-  </p:clrMapOvr>
-  <p:timing>
-    <p:tnLst>
-      <p:par>
-        <p:cTn id="1" dur="indefinite" restart="never" nodeType="tmRoot"/>
-      </p:par>
-    </p:tnLst>
-  </p:timing>
-</p:sld>
-</file>
-
-<file path=ppt/slides/slide4.xml><?xml version="1.0" encoding="utf-8"?>
-<p:sld xmlns:a="http://schemas.openxmlformats.org/drawingml/2006/main" xmlns:r="http://schemas.openxmlformats.org/officeDocument/2006/relationships" xmlns:p="http://schemas.openxmlformats.org/presentationml/2006/main">
-  <p:cSld>
-    <p:bg>
-      <p:bgPr>
-        <a:solidFill>
-          <a:srgbClr val="0070C0"/>
-        </a:solidFill>
-        <a:effectLst/>
-      </p:bgPr>
-    </p:bg>
-    <p:spTree>
-      <p:nvGrpSpPr>
-        <p:cNvPr id="1" name=""/>
-        <p:cNvGrpSpPr/>
-        <p:nvPr/>
-      </p:nvGrpSpPr>
-      <p:grpSpPr>
-        <a:xfrm>
-          <a:off x="0" y="0"/>
-          <a:ext cx="0" cy="0"/>
-          <a:chOff x="0" y="0"/>
-          <a:chExt cx="0" cy="0"/>
-        </a:xfrm>
-      </p:grpSpPr>
-      <p:sp>
-        <p:nvSpPr>
-          <p:cNvPr id="2" name="Title 1"/>
-          <p:cNvSpPr>
-            <a:spLocks noGrp="1"/>
-          </p:cNvSpPr>
-          <p:nvPr>
-            <p:ph type="title"/>
-          </p:nvPr>
-        </p:nvSpPr>
-        <p:spPr>
-          <a:xfrm>
-            <a:off x="304800" y="1066800"/>
-            <a:ext cx="8229600" cy="1143000"/>
-          </a:xfrm>
-        </p:spPr>
-        <p:txBody>
-          <a:bodyPr>
-            <a:normAutofit/>
-          </a:bodyPr>
-          <a:lstStyle/>
-          <a:p>
-            <a:r>
-              <a:rPr lang="en-US" altLang="zh-CN" dirty="0" smtClean="0">
-                <a:solidFill>
-                  <a:schemeClr val="bg1"/>
-                </a:solidFill>
-              </a:rPr>
-              <a:t>Duplicate and Rotate</a:t>
-            </a:r>
-            <a:r>
-              <a:rPr lang="en-US" dirty="0" smtClean="0">
-                <a:solidFill>
-                  <a:schemeClr val="bg1"/>
-                </a:solidFill>
-              </a:rPr>
-              <a:t>:: Single Shape</a:t>
-            </a:r>
-            <a:endParaRPr lang="en-SG" dirty="0">
-              <a:solidFill>
-                <a:schemeClr val="bg1"/>
-              </a:solidFill>
-            </a:endParaRPr>
-          </a:p>
-        </p:txBody>
-      </p:sp>
-    </p:spTree>
-    <p:extLst>
-      <p:ext uri="{BB962C8B-B14F-4D97-AF65-F5344CB8AC3E}">
-        <p14:creationId xmlns:p14="http://schemas.microsoft.com/office/powerpoint/2010/main" val="1313476487"/>
+        <p14:creationId xmlns:p14="http://schemas.microsoft.com/office/powerpoint/2010/main" val="1638130631"/>
       </p:ext>
     </p:extLst>
   </p:cSld>
@@ -9854,16 +12010,16 @@
       </p:grpSpPr>
       <p:sp>
         <p:nvSpPr>
-          <p:cNvPr id="34" name="Rectangle 1"/>
+          <p:cNvPr id="18" name="Triangle"/>
           <p:cNvSpPr/>
           <p:nvPr/>
         </p:nvSpPr>
         <p:spPr>
           <a:xfrm>
-            <a:off x="3429000" y="2438400"/>
-            <a:ext cx="2057400" cy="1371600"/>
+            <a:off x="3086100" y="3962400"/>
+            <a:ext cx="2743200" cy="2743200"/>
           </a:xfrm>
-          <a:prstGeom prst="rect">
+          <a:prstGeom prst="triangle">
             <a:avLst/>
           </a:prstGeom>
         </p:spPr>
@@ -9894,18 +12050,21 @@
       </p:sp>
       <p:sp>
         <p:nvSpPr>
-          <p:cNvPr id="35" name="Oval 2"/>
+          <p:cNvPr id="16" name="Target"/>
           <p:cNvSpPr/>
           <p:nvPr/>
         </p:nvSpPr>
         <p:spPr>
-          <a:xfrm rot="16306935">
-            <a:off x="3997227" y="247050"/>
+          <a:xfrm rot="10725280">
+            <a:off x="1579973" y="2641764"/>
             <a:ext cx="1066800" cy="1066800"/>
           </a:xfrm>
           <a:prstGeom prst="ellipse">
             <a:avLst/>
           </a:prstGeom>
+          <a:solidFill>
+            <a:srgbClr val="00B050"/>
+          </a:solidFill>
         </p:spPr>
         <p:style>
           <a:lnRef idx="2">
@@ -9934,18 +12093,21 @@
       </p:sp>
       <p:sp>
         <p:nvSpPr>
-          <p:cNvPr id="45" name="Oval 2"/>
+          <p:cNvPr id="14" name="Rectangle"/>
           <p:cNvSpPr/>
           <p:nvPr/>
         </p:nvSpPr>
         <p:spPr>
-          <a:xfrm rot="10725280">
-            <a:off x="1579973" y="2641764"/>
-            <a:ext cx="1066800" cy="1066800"/>
+          <a:xfrm>
+            <a:off x="3429000" y="2438400"/>
+            <a:ext cx="2057400" cy="1371600"/>
           </a:xfrm>
-          <a:prstGeom prst="ellipse">
+          <a:prstGeom prst="rect">
             <a:avLst/>
           </a:prstGeom>
+          <a:solidFill>
+            <a:srgbClr val="FF0000"/>
+          </a:solidFill>
         </p:spPr>
         <p:style>
           <a:lnRef idx="2">
@@ -9974,7 +12136,7 @@
       </p:sp>
       <p:sp>
         <p:nvSpPr>
-          <p:cNvPr id="47" name="Oval 2"/>
+          <p:cNvPr id="6" name="Oval"/>
           <p:cNvSpPr/>
           <p:nvPr/>
         </p:nvSpPr>
@@ -10014,130 +12176,13 @@
       </p:sp>
       <p:sp>
         <p:nvSpPr>
-          <p:cNvPr id="36" name="Isosceles Triangle 3"/>
+          <p:cNvPr id="17" name="Oval"/>
           <p:cNvSpPr/>
           <p:nvPr/>
         </p:nvSpPr>
         <p:spPr>
           <a:xfrm>
-            <a:off x="3838956" y="4724400"/>
-            <a:ext cx="1237488" cy="1066800"/>
-          </a:xfrm>
-          <a:prstGeom prst="triangle">
-            <a:avLst/>
-          </a:prstGeom>
-        </p:spPr>
-        <p:style>
-          <a:lnRef idx="2">
-            <a:schemeClr val="accent1">
-              <a:shade val="50000"/>
-            </a:schemeClr>
-          </a:lnRef>
-          <a:fillRef idx="1">
-            <a:schemeClr val="accent1"/>
-          </a:fillRef>
-          <a:effectRef idx="0">
-            <a:schemeClr val="accent1"/>
-          </a:effectRef>
-          <a:fontRef idx="minor">
-            <a:schemeClr val="lt1"/>
-          </a:fontRef>
-        </p:style>
-        <p:txBody>
-          <a:bodyPr rtlCol="0" anchor="ctr"/>
-          <a:lstStyle/>
-          <a:p>
-            <a:pPr algn="ctr"/>
-            <a:endParaRPr lang="zh-CN" altLang="en-US"/>
-          </a:p>
-        </p:txBody>
-      </p:sp>
-    </p:spTree>
-    <p:extLst>
-      <p:ext uri="{BB962C8B-B14F-4D97-AF65-F5344CB8AC3E}">
-        <p14:creationId xmlns:p14="http://schemas.microsoft.com/office/powerpoint/2010/main" val="3126627299"/>
-      </p:ext>
-    </p:extLst>
-  </p:cSld>
-  <p:clrMapOvr>
-    <a:masterClrMapping/>
-  </p:clrMapOvr>
-  <p:timing>
-    <p:tnLst>
-      <p:par>
-        <p:cTn id="1" dur="indefinite" restart="never" nodeType="tmRoot"/>
-      </p:par>
-    </p:tnLst>
-  </p:timing>
-</p:sld>
-</file>
-
-<file path=ppt/slides/slide6.xml><?xml version="1.0" encoding="utf-8"?>
-<p:sld xmlns:a="http://schemas.openxmlformats.org/drawingml/2006/main" xmlns:r="http://schemas.openxmlformats.org/officeDocument/2006/relationships" xmlns:p="http://schemas.openxmlformats.org/presentationml/2006/main">
-  <p:cSld>
-    <p:spTree>
-      <p:nvGrpSpPr>
-        <p:cNvPr id="1" name=""/>
-        <p:cNvGrpSpPr/>
-        <p:nvPr/>
-      </p:nvGrpSpPr>
-      <p:grpSpPr>
-        <a:xfrm>
-          <a:off x="0" y="0"/>
-          <a:ext cx="0" cy="0"/>
-          <a:chOff x="0" y="0"/>
-          <a:chExt cx="0" cy="0"/>
-        </a:xfrm>
-      </p:grpSpPr>
-      <p:sp>
-        <p:nvSpPr>
-          <p:cNvPr id="14" name="Rectangle 1"/>
-          <p:cNvSpPr/>
-          <p:nvPr/>
-        </p:nvSpPr>
-        <p:spPr>
-          <a:xfrm>
-            <a:off x="3429000" y="2438400"/>
-            <a:ext cx="2057400" cy="1371600"/>
-          </a:xfrm>
-          <a:prstGeom prst="rect">
-            <a:avLst/>
-          </a:prstGeom>
-        </p:spPr>
-        <p:style>
-          <a:lnRef idx="2">
-            <a:schemeClr val="accent1">
-              <a:shade val="50000"/>
-            </a:schemeClr>
-          </a:lnRef>
-          <a:fillRef idx="1">
-            <a:schemeClr val="accent1"/>
-          </a:fillRef>
-          <a:effectRef idx="0">
-            <a:schemeClr val="accent1"/>
-          </a:effectRef>
-          <a:fontRef idx="minor">
-            <a:schemeClr val="lt1"/>
-          </a:fontRef>
-        </p:style>
-        <p:txBody>
-          <a:bodyPr rtlCol="0" anchor="ctr"/>
-          <a:lstStyle/>
-          <a:p>
-            <a:pPr algn="ctr"/>
-            <a:endParaRPr lang="zh-CN" altLang="en-US"/>
-          </a:p>
-        </p:txBody>
-      </p:sp>
-      <p:sp>
-        <p:nvSpPr>
-          <p:cNvPr id="15" name="Oval 2"/>
-          <p:cNvSpPr/>
-          <p:nvPr/>
-        </p:nvSpPr>
-        <p:spPr>
-          <a:xfrm rot="8212442">
-            <a:off x="2212882" y="4193773"/>
+            <a:off x="1579914" y="2638995"/>
             <a:ext cx="1066800" cy="1066800"/>
           </a:xfrm>
           <a:prstGeom prst="ellipse">
@@ -10169,18 +12214,146 @@
           </a:p>
         </p:txBody>
       </p:sp>
-      <p:sp>
-        <p:nvSpPr>
-          <p:cNvPr id="16" name="Oval 2"/>
+    </p:spTree>
+    <p:extLst>
+      <p:ext uri="{BB962C8B-B14F-4D97-AF65-F5344CB8AC3E}">
+        <p14:creationId xmlns:p14="http://schemas.microsoft.com/office/powerpoint/2010/main" val="1540486554"/>
+      </p:ext>
+    </p:extLst>
+  </p:cSld>
+  <p:clrMapOvr>
+    <a:masterClrMapping/>
+  </p:clrMapOvr>
+  <p:timing>
+    <p:tnLst>
+      <p:par>
+        <p:cTn id="1" dur="indefinite" restart="never" nodeType="tmRoot"/>
+      </p:par>
+    </p:tnLst>
+  </p:timing>
+</p:sld>
+</file>
+
+<file path=ppt/slides/slide6.xml><?xml version="1.0" encoding="utf-8"?>
+<p:sld xmlns:a="http://schemas.openxmlformats.org/drawingml/2006/main" xmlns:r="http://schemas.openxmlformats.org/officeDocument/2006/relationships" xmlns:p="http://schemas.openxmlformats.org/presentationml/2006/main">
+  <p:cSld>
+    <p:bg>
+      <p:bgPr>
+        <a:solidFill>
+          <a:srgbClr val="0070C0"/>
+        </a:solidFill>
+        <a:effectLst/>
+      </p:bgPr>
+    </p:bg>
+    <p:spTree>
+      <p:nvGrpSpPr>
+        <p:cNvPr id="1" name=""/>
+        <p:cNvGrpSpPr/>
+        <p:nvPr/>
+      </p:nvGrpSpPr>
+      <p:grpSpPr>
+        <a:xfrm>
+          <a:off x="0" y="0"/>
+          <a:ext cx="0" cy="0"/>
+          <a:chOff x="0" y="0"/>
+          <a:chExt cx="0" cy="0"/>
+        </a:xfrm>
+      </p:grpSpPr>
+      <p:sp>
+        <p:nvSpPr>
+          <p:cNvPr id="2" name="Title 1"/>
+          <p:cNvSpPr>
+            <a:spLocks noGrp="1"/>
+          </p:cNvSpPr>
+          <p:nvPr>
+            <p:ph type="title"/>
+          </p:nvPr>
+        </p:nvSpPr>
+        <p:spPr>
+          <a:xfrm>
+            <a:off x="304800" y="1066800"/>
+            <a:ext cx="8229600" cy="1143000"/>
+          </a:xfrm>
+        </p:spPr>
+        <p:txBody>
+          <a:bodyPr>
+            <a:normAutofit fontScale="90000"/>
+          </a:bodyPr>
+          <a:lstStyle/>
+          <a:p>
+            <a:r>
+              <a:rPr lang="en-US" altLang="zh-CN" dirty="0" smtClean="0">
+                <a:solidFill>
+                  <a:schemeClr val="bg1"/>
+                </a:solidFill>
+              </a:rPr>
+              <a:t>Duplicate and Rotate</a:t>
+            </a:r>
+            <a:r>
+              <a:rPr lang="en-US" dirty="0" smtClean="0">
+                <a:solidFill>
+                  <a:schemeClr val="bg1"/>
+                </a:solidFill>
+              </a:rPr>
+              <a:t>:: Single Shape (Dynamic)</a:t>
+            </a:r>
+            <a:endParaRPr lang="en-SG" dirty="0">
+              <a:solidFill>
+                <a:schemeClr val="bg1"/>
+              </a:solidFill>
+            </a:endParaRPr>
+          </a:p>
+        </p:txBody>
+      </p:sp>
+    </p:spTree>
+    <p:extLst>
+      <p:ext uri="{BB962C8B-B14F-4D97-AF65-F5344CB8AC3E}">
+        <p14:creationId xmlns:p14="http://schemas.microsoft.com/office/powerpoint/2010/main" val="592175314"/>
+      </p:ext>
+    </p:extLst>
+  </p:cSld>
+  <p:clrMapOvr>
+    <a:masterClrMapping/>
+  </p:clrMapOvr>
+  <p:timing>
+    <p:tnLst>
+      <p:par>
+        <p:cTn id="1" dur="indefinite" restart="never" nodeType="tmRoot"/>
+      </p:par>
+    </p:tnLst>
+  </p:timing>
+</p:sld>
+</file>
+
+<file path=ppt/slides/slide7.xml><?xml version="1.0" encoding="utf-8"?>
+<p:sld xmlns:a="http://schemas.openxmlformats.org/drawingml/2006/main" xmlns:r="http://schemas.openxmlformats.org/officeDocument/2006/relationships" xmlns:p="http://schemas.openxmlformats.org/presentationml/2006/main">
+  <p:cSld>
+    <p:spTree>
+      <p:nvGrpSpPr>
+        <p:cNvPr id="1" name=""/>
+        <p:cNvGrpSpPr/>
+        <p:nvPr/>
+      </p:nvGrpSpPr>
+      <p:grpSpPr>
+        <a:xfrm>
+          <a:off x="0" y="0"/>
+          <a:ext cx="0" cy="0"/>
+          <a:chOff x="0" y="0"/>
+          <a:chExt cx="0" cy="0"/>
+        </a:xfrm>
+      </p:grpSpPr>
+      <p:sp>
+        <p:nvSpPr>
+          <p:cNvPr id="18" name="Triangle"/>
           <p:cNvSpPr/>
           <p:nvPr/>
         </p:nvSpPr>
         <p:spPr>
-          <a:xfrm rot="10725280">
-            <a:off x="1579973" y="2641764"/>
-            <a:ext cx="1066800" cy="1066800"/>
+          <a:xfrm>
+            <a:off x="3086100" y="3962400"/>
+            <a:ext cx="2743200" cy="2743200"/>
           </a:xfrm>
-          <a:prstGeom prst="ellipse">
+          <a:prstGeom prst="triangle">
             <a:avLst/>
           </a:prstGeom>
         </p:spPr>
@@ -10211,7 +12384,93 @@
       </p:sp>
       <p:sp>
         <p:nvSpPr>
-          <p:cNvPr id="17" name="Oval 2"/>
+          <p:cNvPr id="16" name="Target"/>
+          <p:cNvSpPr/>
+          <p:nvPr/>
+        </p:nvSpPr>
+        <p:spPr>
+          <a:xfrm rot="10725280">
+            <a:off x="1579973" y="2641764"/>
+            <a:ext cx="1066800" cy="1066800"/>
+          </a:xfrm>
+          <a:prstGeom prst="ellipse">
+            <a:avLst/>
+          </a:prstGeom>
+          <a:solidFill>
+            <a:srgbClr val="00B050"/>
+          </a:solidFill>
+        </p:spPr>
+        <p:style>
+          <a:lnRef idx="2">
+            <a:schemeClr val="accent1">
+              <a:shade val="50000"/>
+            </a:schemeClr>
+          </a:lnRef>
+          <a:fillRef idx="1">
+            <a:schemeClr val="accent1"/>
+          </a:fillRef>
+          <a:effectRef idx="0">
+            <a:schemeClr val="accent1"/>
+          </a:effectRef>
+          <a:fontRef idx="minor">
+            <a:schemeClr val="lt1"/>
+          </a:fontRef>
+        </p:style>
+        <p:txBody>
+          <a:bodyPr rtlCol="0" anchor="ctr"/>
+          <a:lstStyle/>
+          <a:p>
+            <a:pPr algn="ctr"/>
+            <a:endParaRPr lang="zh-CN" altLang="en-US"/>
+          </a:p>
+        </p:txBody>
+      </p:sp>
+      <p:sp>
+        <p:nvSpPr>
+          <p:cNvPr id="14" name="Rectangle"/>
+          <p:cNvSpPr/>
+          <p:nvPr/>
+        </p:nvSpPr>
+        <p:spPr>
+          <a:xfrm>
+            <a:off x="3429000" y="2438400"/>
+            <a:ext cx="2057400" cy="1371600"/>
+          </a:xfrm>
+          <a:prstGeom prst="rect">
+            <a:avLst/>
+          </a:prstGeom>
+          <a:solidFill>
+            <a:srgbClr val="FF0000"/>
+          </a:solidFill>
+        </p:spPr>
+        <p:style>
+          <a:lnRef idx="2">
+            <a:schemeClr val="accent1">
+              <a:shade val="50000"/>
+            </a:schemeClr>
+          </a:lnRef>
+          <a:fillRef idx="1">
+            <a:schemeClr val="accent1"/>
+          </a:fillRef>
+          <a:effectRef idx="0">
+            <a:schemeClr val="accent1"/>
+          </a:effectRef>
+          <a:fontRef idx="minor">
+            <a:schemeClr val="lt1"/>
+          </a:fontRef>
+        </p:style>
+        <p:txBody>
+          <a:bodyPr rtlCol="0" anchor="ctr"/>
+          <a:lstStyle/>
+          <a:p>
+            <a:pPr algn="ctr"/>
+            <a:endParaRPr lang="zh-CN" altLang="en-US"/>
+          </a:p>
+        </p:txBody>
+      </p:sp>
+      <p:sp>
+        <p:nvSpPr>
+          <p:cNvPr id="17" name="Oval"/>
           <p:cNvSpPr/>
           <p:nvPr/>
         </p:nvSpPr>
@@ -10249,229 +12508,10 @@
           </a:p>
         </p:txBody>
       </p:sp>
-      <p:sp>
-        <p:nvSpPr>
-          <p:cNvPr id="19" name="Oval 2"/>
-          <p:cNvSpPr/>
-          <p:nvPr/>
-        </p:nvSpPr>
-        <p:spPr>
-          <a:xfrm rot="16306935">
-            <a:off x="3997227" y="247050"/>
-            <a:ext cx="1066800" cy="1066800"/>
-          </a:xfrm>
-          <a:prstGeom prst="ellipse">
-            <a:avLst/>
-          </a:prstGeom>
-        </p:spPr>
-        <p:style>
-          <a:lnRef idx="2">
-            <a:schemeClr val="accent1">
-              <a:shade val="50000"/>
-            </a:schemeClr>
-          </a:lnRef>
-          <a:fillRef idx="1">
-            <a:schemeClr val="accent1"/>
-          </a:fillRef>
-          <a:effectRef idx="0">
-            <a:schemeClr val="accent1"/>
-          </a:effectRef>
-          <a:fontRef idx="minor">
-            <a:schemeClr val="lt1"/>
-          </a:fontRef>
-        </p:style>
-        <p:txBody>
-          <a:bodyPr rtlCol="0" anchor="ctr"/>
-          <a:lstStyle/>
-          <a:p>
-            <a:pPr algn="ctr"/>
-            <a:endParaRPr lang="zh-CN" altLang="en-US"/>
-          </a:p>
-        </p:txBody>
-      </p:sp>
-      <p:sp>
-        <p:nvSpPr>
-          <p:cNvPr id="20" name="Oval 2"/>
-          <p:cNvSpPr/>
-          <p:nvPr/>
-        </p:nvSpPr>
-        <p:spPr>
-          <a:xfrm rot="13418522">
-            <a:off x="2227386" y="972479"/>
-            <a:ext cx="1066800" cy="1066800"/>
-          </a:xfrm>
-          <a:prstGeom prst="ellipse">
-            <a:avLst/>
-          </a:prstGeom>
-        </p:spPr>
-        <p:style>
-          <a:lnRef idx="2">
-            <a:schemeClr val="accent1">
-              <a:shade val="50000"/>
-            </a:schemeClr>
-          </a:lnRef>
-          <a:fillRef idx="1">
-            <a:schemeClr val="accent1"/>
-          </a:fillRef>
-          <a:effectRef idx="0">
-            <a:schemeClr val="accent1"/>
-          </a:effectRef>
-          <a:fontRef idx="minor">
-            <a:schemeClr val="lt1"/>
-          </a:fontRef>
-        </p:style>
-        <p:txBody>
-          <a:bodyPr rtlCol="0" anchor="ctr"/>
-          <a:lstStyle/>
-          <a:p>
-            <a:pPr algn="ctr"/>
-            <a:endParaRPr lang="zh-CN" altLang="en-US"/>
-          </a:p>
-        </p:txBody>
-      </p:sp>
-      <p:sp>
-        <p:nvSpPr>
-          <p:cNvPr id="18" name="Isosceles Triangle 3"/>
-          <p:cNvSpPr/>
-          <p:nvPr/>
-        </p:nvSpPr>
-        <p:spPr>
-          <a:xfrm>
-            <a:off x="3838956" y="4724400"/>
-            <a:ext cx="1237488" cy="1066800"/>
-          </a:xfrm>
-          <a:prstGeom prst="triangle">
-            <a:avLst/>
-          </a:prstGeom>
-        </p:spPr>
-        <p:style>
-          <a:lnRef idx="2">
-            <a:schemeClr val="accent1">
-              <a:shade val="50000"/>
-            </a:schemeClr>
-          </a:lnRef>
-          <a:fillRef idx="1">
-            <a:schemeClr val="accent1"/>
-          </a:fillRef>
-          <a:effectRef idx="0">
-            <a:schemeClr val="accent1"/>
-          </a:effectRef>
-          <a:fontRef idx="minor">
-            <a:schemeClr val="lt1"/>
-          </a:fontRef>
-        </p:style>
-        <p:txBody>
-          <a:bodyPr rtlCol="0" anchor="ctr"/>
-          <a:lstStyle/>
-          <a:p>
-            <a:pPr algn="ctr"/>
-            <a:endParaRPr lang="zh-CN" altLang="en-US"/>
-          </a:p>
-        </p:txBody>
-      </p:sp>
     </p:spTree>
     <p:extLst>
       <p:ext uri="{BB962C8B-B14F-4D97-AF65-F5344CB8AC3E}">
-        <p14:creationId xmlns:p14="http://schemas.microsoft.com/office/powerpoint/2010/main" val="1069496072"/>
-      </p:ext>
-    </p:extLst>
-  </p:cSld>
-  <p:clrMapOvr>
-    <a:masterClrMapping/>
-  </p:clrMapOvr>
-  <p:timing>
-    <p:tnLst>
-      <p:par>
-        <p:cTn id="1" dur="indefinite" restart="never" nodeType="tmRoot"/>
-      </p:par>
-    </p:tnLst>
-  </p:timing>
-</p:sld>
-</file>
-
-<file path=ppt/slides/slide7.xml><?xml version="1.0" encoding="utf-8"?>
-<p:sld xmlns:a="http://schemas.openxmlformats.org/drawingml/2006/main" xmlns:r="http://schemas.openxmlformats.org/officeDocument/2006/relationships" xmlns:p="http://schemas.openxmlformats.org/presentationml/2006/main">
-  <p:cSld>
-    <p:bg>
-      <p:bgPr>
-        <a:solidFill>
-          <a:srgbClr val="0070C0"/>
-        </a:solidFill>
-        <a:effectLst/>
-      </p:bgPr>
-    </p:bg>
-    <p:spTree>
-      <p:nvGrpSpPr>
-        <p:cNvPr id="1" name=""/>
-        <p:cNvGrpSpPr/>
-        <p:nvPr/>
-      </p:nvGrpSpPr>
-      <p:grpSpPr>
-        <a:xfrm>
-          <a:off x="0" y="0"/>
-          <a:ext cx="0" cy="0"/>
-          <a:chOff x="0" y="0"/>
-          <a:chExt cx="0" cy="0"/>
-        </a:xfrm>
-      </p:grpSpPr>
-      <p:sp>
-        <p:nvSpPr>
-          <p:cNvPr id="4" name="Title 1"/>
-          <p:cNvSpPr>
-            <a:spLocks noGrp="1"/>
-          </p:cNvSpPr>
-          <p:nvPr>
-            <p:ph type="title"/>
-          </p:nvPr>
-        </p:nvSpPr>
-        <p:spPr>
-          <a:xfrm>
-            <a:off x="304800" y="1066800"/>
-            <a:ext cx="8229600" cy="1143000"/>
-          </a:xfrm>
-        </p:spPr>
-        <p:txBody>
-          <a:bodyPr>
-            <a:normAutofit fontScale="90000"/>
-          </a:bodyPr>
-          <a:lstStyle/>
-          <a:p>
-            <a:r>
-              <a:rPr lang="en-US" altLang="zh-CN" dirty="0">
-                <a:solidFill>
-                  <a:schemeClr val="bg1"/>
-                </a:solidFill>
-              </a:rPr>
-              <a:t>Duplicate and Rotate:: </a:t>
-            </a:r>
-            <a:r>
-              <a:rPr lang="en-US" altLang="zh-CN" dirty="0" smtClean="0">
-                <a:solidFill>
-                  <a:schemeClr val="bg1"/>
-                </a:solidFill>
-              </a:rPr>
-              <a:t>Multiple </a:t>
-            </a:r>
-            <a:r>
-              <a:rPr lang="en-US" altLang="zh-CN" dirty="0">
-                <a:solidFill>
-                  <a:schemeClr val="bg1"/>
-                </a:solidFill>
-              </a:rPr>
-              <a:t>Shape</a:t>
-            </a:r>
-            <a:endParaRPr lang="en-SG" dirty="0">
-              <a:solidFill>
-                <a:schemeClr val="bg1"/>
-              </a:solidFill>
-            </a:endParaRPr>
-          </a:p>
-        </p:txBody>
-      </p:sp>
-    </p:spTree>
-    <p:extLst>
-      <p:ext uri="{BB962C8B-B14F-4D97-AF65-F5344CB8AC3E}">
-        <p14:creationId xmlns:p14="http://schemas.microsoft.com/office/powerpoint/2010/main" val="2016151759"/>
+        <p14:creationId xmlns:p14="http://schemas.microsoft.com/office/powerpoint/2010/main" val="139879315"/>
       </p:ext>
     </p:extLst>
   </p:cSld>
@@ -10507,16 +12547,16 @@
       </p:grpSpPr>
       <p:sp>
         <p:nvSpPr>
-          <p:cNvPr id="11" name="Rectangle 1"/>
+          <p:cNvPr id="6" name="Triangle"/>
           <p:cNvSpPr/>
           <p:nvPr/>
         </p:nvSpPr>
         <p:spPr>
           <a:xfrm>
-            <a:off x="3429000" y="2438400"/>
-            <a:ext cx="2057400" cy="1371600"/>
+            <a:off x="3086100" y="3962400"/>
+            <a:ext cx="2743200" cy="2743200"/>
           </a:xfrm>
-          <a:prstGeom prst="rect">
+          <a:prstGeom prst="triangle">
             <a:avLst/>
           </a:prstGeom>
         </p:spPr>
@@ -10547,16 +12587,16 @@
       </p:sp>
       <p:sp>
         <p:nvSpPr>
-          <p:cNvPr id="14" name="Oval 2"/>
+          <p:cNvPr id="18" name="Triangle"/>
           <p:cNvSpPr/>
           <p:nvPr/>
         </p:nvSpPr>
         <p:spPr>
-          <a:xfrm rot="10848176">
-            <a:off x="1579648" y="2557934"/>
-            <a:ext cx="1066800" cy="1066800"/>
+          <a:xfrm rot="5272535">
+            <a:off x="877818" y="1834519"/>
+            <a:ext cx="2743200" cy="2743200"/>
           </a:xfrm>
-          <a:prstGeom prst="ellipse">
+          <a:prstGeom prst="triangle">
             <a:avLst/>
           </a:prstGeom>
         </p:spPr>
@@ -10587,7 +12627,93 @@
       </p:sp>
       <p:sp>
         <p:nvSpPr>
-          <p:cNvPr id="19" name="Oval 2"/>
+          <p:cNvPr id="16" name="Target"/>
+          <p:cNvSpPr/>
+          <p:nvPr/>
+        </p:nvSpPr>
+        <p:spPr>
+          <a:xfrm rot="10725280">
+            <a:off x="1579973" y="2641764"/>
+            <a:ext cx="1066800" cy="1066800"/>
+          </a:xfrm>
+          <a:prstGeom prst="ellipse">
+            <a:avLst/>
+          </a:prstGeom>
+          <a:solidFill>
+            <a:srgbClr val="00B050"/>
+          </a:solidFill>
+        </p:spPr>
+        <p:style>
+          <a:lnRef idx="2">
+            <a:schemeClr val="accent1">
+              <a:shade val="50000"/>
+            </a:schemeClr>
+          </a:lnRef>
+          <a:fillRef idx="1">
+            <a:schemeClr val="accent1"/>
+          </a:fillRef>
+          <a:effectRef idx="0">
+            <a:schemeClr val="accent1"/>
+          </a:effectRef>
+          <a:fontRef idx="minor">
+            <a:schemeClr val="lt1"/>
+          </a:fontRef>
+        </p:style>
+        <p:txBody>
+          <a:bodyPr rtlCol="0" anchor="ctr"/>
+          <a:lstStyle/>
+          <a:p>
+            <a:pPr algn="ctr"/>
+            <a:endParaRPr lang="zh-CN" altLang="en-US"/>
+          </a:p>
+        </p:txBody>
+      </p:sp>
+      <p:sp>
+        <p:nvSpPr>
+          <p:cNvPr id="14" name="Rectangle"/>
+          <p:cNvSpPr/>
+          <p:nvPr/>
+        </p:nvSpPr>
+        <p:spPr>
+          <a:xfrm>
+            <a:off x="3429000" y="2438400"/>
+            <a:ext cx="2057400" cy="1371600"/>
+          </a:xfrm>
+          <a:prstGeom prst="rect">
+            <a:avLst/>
+          </a:prstGeom>
+          <a:solidFill>
+            <a:srgbClr val="FF0000"/>
+          </a:solidFill>
+        </p:spPr>
+        <p:style>
+          <a:lnRef idx="2">
+            <a:schemeClr val="accent1">
+              <a:shade val="50000"/>
+            </a:schemeClr>
+          </a:lnRef>
+          <a:fillRef idx="1">
+            <a:schemeClr val="accent1"/>
+          </a:fillRef>
+          <a:effectRef idx="0">
+            <a:schemeClr val="accent1"/>
+          </a:effectRef>
+          <a:fontRef idx="minor">
+            <a:schemeClr val="lt1"/>
+          </a:fontRef>
+        </p:style>
+        <p:txBody>
+          <a:bodyPr rtlCol="0" anchor="ctr"/>
+          <a:lstStyle/>
+          <a:p>
+            <a:pPr algn="ctr"/>
+            <a:endParaRPr lang="zh-CN" altLang="en-US"/>
+          </a:p>
+        </p:txBody>
+      </p:sp>
+      <p:sp>
+        <p:nvSpPr>
+          <p:cNvPr id="17" name="Oval"/>
           <p:cNvSpPr/>
           <p:nvPr/>
         </p:nvSpPr>
@@ -10625,90 +12751,10 @@
           </a:p>
         </p:txBody>
       </p:sp>
-      <p:sp>
-        <p:nvSpPr>
-          <p:cNvPr id="20" name="Isosceles Triangle 3"/>
-          <p:cNvSpPr/>
-          <p:nvPr/>
-        </p:nvSpPr>
-        <p:spPr>
-          <a:xfrm>
-            <a:off x="3838956" y="4724400"/>
-            <a:ext cx="1237488" cy="1066800"/>
-          </a:xfrm>
-          <a:prstGeom prst="triangle">
-            <a:avLst/>
-          </a:prstGeom>
-        </p:spPr>
-        <p:style>
-          <a:lnRef idx="2">
-            <a:schemeClr val="accent1">
-              <a:shade val="50000"/>
-            </a:schemeClr>
-          </a:lnRef>
-          <a:fillRef idx="1">
-            <a:schemeClr val="accent1"/>
-          </a:fillRef>
-          <a:effectRef idx="0">
-            <a:schemeClr val="accent1"/>
-          </a:effectRef>
-          <a:fontRef idx="minor">
-            <a:schemeClr val="lt1"/>
-          </a:fontRef>
-        </p:style>
-        <p:txBody>
-          <a:bodyPr rtlCol="0" anchor="ctr"/>
-          <a:lstStyle/>
-          <a:p>
-            <a:pPr algn="ctr"/>
-            <a:endParaRPr lang="zh-CN" altLang="en-US"/>
-          </a:p>
-        </p:txBody>
-      </p:sp>
-      <p:sp>
-        <p:nvSpPr>
-          <p:cNvPr id="15" name="Isosceles Triangle 3"/>
-          <p:cNvSpPr/>
-          <p:nvPr/>
-        </p:nvSpPr>
-        <p:spPr>
-          <a:xfrm rot="10848176">
-            <a:off x="3868859" y="457409"/>
-            <a:ext cx="1237488" cy="1066800"/>
-          </a:xfrm>
-          <a:prstGeom prst="triangle">
-            <a:avLst/>
-          </a:prstGeom>
-        </p:spPr>
-        <p:style>
-          <a:lnRef idx="2">
-            <a:schemeClr val="accent1">
-              <a:shade val="50000"/>
-            </a:schemeClr>
-          </a:lnRef>
-          <a:fillRef idx="1">
-            <a:schemeClr val="accent1"/>
-          </a:fillRef>
-          <a:effectRef idx="0">
-            <a:schemeClr val="accent1"/>
-          </a:effectRef>
-          <a:fontRef idx="minor">
-            <a:schemeClr val="lt1"/>
-          </a:fontRef>
-        </p:style>
-        <p:txBody>
-          <a:bodyPr rtlCol="0" anchor="ctr"/>
-          <a:lstStyle/>
-          <a:p>
-            <a:pPr algn="ctr"/>
-            <a:endParaRPr lang="zh-CN" altLang="en-US"/>
-          </a:p>
-        </p:txBody>
-      </p:sp>
     </p:spTree>
     <p:extLst>
       <p:ext uri="{BB962C8B-B14F-4D97-AF65-F5344CB8AC3E}">
-        <p14:creationId xmlns:p14="http://schemas.microsoft.com/office/powerpoint/2010/main" val="3723317650"/>
+        <p14:creationId xmlns:p14="http://schemas.microsoft.com/office/powerpoint/2010/main" val="2296972090"/>
       </p:ext>
     </p:extLst>
   </p:cSld>
@@ -10728,6 +12774,14 @@
 <file path=ppt/slides/slide9.xml><?xml version="1.0" encoding="utf-8"?>
 <p:sld xmlns:a="http://schemas.openxmlformats.org/drawingml/2006/main" xmlns:r="http://schemas.openxmlformats.org/officeDocument/2006/relationships" xmlns:p="http://schemas.openxmlformats.org/presentationml/2006/main">
   <p:cSld>
+    <p:bg>
+      <p:bgPr>
+        <a:solidFill>
+          <a:srgbClr val="0070C0"/>
+        </a:solidFill>
+        <a:effectLst/>
+      </p:bgPr>
+    </p:bg>
     <p:spTree>
       <p:nvGrpSpPr>
         <p:cNvPr id="1" name=""/>
@@ -10744,368 +12798,54 @@
       </p:grpSpPr>
       <p:sp>
         <p:nvSpPr>
-          <p:cNvPr id="11" name="Rectangle 1"/>
-          <p:cNvSpPr/>
-          <p:nvPr/>
+          <p:cNvPr id="4" name="Title 1"/>
+          <p:cNvSpPr>
+            <a:spLocks noGrp="1"/>
+          </p:cNvSpPr>
+          <p:nvPr>
+            <p:ph type="title"/>
+          </p:nvPr>
         </p:nvSpPr>
         <p:spPr>
           <a:xfrm>
-            <a:off x="3429000" y="2438400"/>
-            <a:ext cx="2057400" cy="1371600"/>
+            <a:off x="304800" y="1066800"/>
+            <a:ext cx="8229600" cy="1143000"/>
           </a:xfrm>
-          <a:prstGeom prst="rect">
-            <a:avLst/>
-          </a:prstGeom>
         </p:spPr>
-        <p:style>
-          <a:lnRef idx="2">
-            <a:schemeClr val="accent1">
-              <a:shade val="50000"/>
-            </a:schemeClr>
-          </a:lnRef>
-          <a:fillRef idx="1">
-            <a:schemeClr val="accent1"/>
-          </a:fillRef>
-          <a:effectRef idx="0">
-            <a:schemeClr val="accent1"/>
-          </a:effectRef>
-          <a:fontRef idx="minor">
-            <a:schemeClr val="lt1"/>
-          </a:fontRef>
-        </p:style>
-        <p:txBody>
-          <a:bodyPr rtlCol="0" anchor="ctr"/>
-          <a:lstStyle/>
-          <a:p>
-            <a:pPr algn="ctr"/>
-            <a:endParaRPr lang="zh-CN" altLang="en-US"/>
-          </a:p>
-        </p:txBody>
-      </p:sp>
-      <p:sp>
-        <p:nvSpPr>
-          <p:cNvPr id="12" name="Oval 2"/>
-          <p:cNvSpPr/>
-          <p:nvPr/>
-        </p:nvSpPr>
-        <p:spPr>
-          <a:xfrm rot="13498768">
-            <a:off x="2265628" y="933306"/>
-            <a:ext cx="1066800" cy="1066800"/>
-          </a:xfrm>
-          <a:prstGeom prst="ellipse">
-            <a:avLst/>
-          </a:prstGeom>
-        </p:spPr>
-        <p:style>
-          <a:lnRef idx="2">
-            <a:schemeClr val="accent1">
-              <a:shade val="50000"/>
-            </a:schemeClr>
-          </a:lnRef>
-          <a:fillRef idx="1">
-            <a:schemeClr val="accent1"/>
-          </a:fillRef>
-          <a:effectRef idx="0">
-            <a:schemeClr val="accent1"/>
-          </a:effectRef>
-          <a:fontRef idx="minor">
-            <a:schemeClr val="lt1"/>
-          </a:fontRef>
-        </p:style>
-        <p:txBody>
-          <a:bodyPr rtlCol="0" anchor="ctr"/>
-          <a:lstStyle/>
-          <a:p>
-            <a:pPr algn="ctr"/>
-            <a:endParaRPr lang="zh-CN" altLang="en-US"/>
-          </a:p>
-        </p:txBody>
-      </p:sp>
-      <p:sp>
-        <p:nvSpPr>
-          <p:cNvPr id="13" name="Oval 2"/>
-          <p:cNvSpPr/>
-          <p:nvPr/>
-        </p:nvSpPr>
-        <p:spPr>
-          <a:xfrm>
-            <a:off x="6269182" y="2590800"/>
-            <a:ext cx="1066800" cy="1066800"/>
-          </a:xfrm>
-          <a:prstGeom prst="ellipse">
-            <a:avLst/>
-          </a:prstGeom>
-        </p:spPr>
-        <p:style>
-          <a:lnRef idx="2">
-            <a:schemeClr val="accent1">
-              <a:shade val="50000"/>
-            </a:schemeClr>
-          </a:lnRef>
-          <a:fillRef idx="1">
-            <a:schemeClr val="accent1"/>
-          </a:fillRef>
-          <a:effectRef idx="0">
-            <a:schemeClr val="accent1"/>
-          </a:effectRef>
-          <a:fontRef idx="minor">
-            <a:schemeClr val="lt1"/>
-          </a:fontRef>
-        </p:style>
-        <p:txBody>
-          <a:bodyPr rtlCol="0" anchor="ctr"/>
-          <a:lstStyle/>
-          <a:p>
-            <a:pPr algn="ctr"/>
-            <a:endParaRPr lang="zh-CN" altLang="en-US"/>
-          </a:p>
-        </p:txBody>
-      </p:sp>
-      <p:sp>
-        <p:nvSpPr>
-          <p:cNvPr id="14" name="Isosceles Triangle 3"/>
-          <p:cNvSpPr/>
-          <p:nvPr/>
-        </p:nvSpPr>
-        <p:spPr>
-          <a:xfrm>
-            <a:off x="3838956" y="4724400"/>
-            <a:ext cx="1237488" cy="1066800"/>
-          </a:xfrm>
-          <a:prstGeom prst="triangle">
-            <a:avLst/>
-          </a:prstGeom>
-        </p:spPr>
-        <p:style>
-          <a:lnRef idx="2">
-            <a:schemeClr val="accent1">
-              <a:shade val="50000"/>
-            </a:schemeClr>
-          </a:lnRef>
-          <a:fillRef idx="1">
-            <a:schemeClr val="accent1"/>
-          </a:fillRef>
-          <a:effectRef idx="0">
-            <a:schemeClr val="accent1"/>
-          </a:effectRef>
-          <a:fontRef idx="minor">
-            <a:schemeClr val="lt1"/>
-          </a:fontRef>
-        </p:style>
-        <p:txBody>
-          <a:bodyPr rtlCol="0" anchor="ctr"/>
-          <a:lstStyle/>
-          <a:p>
-            <a:pPr algn="ctr"/>
-            <a:endParaRPr lang="zh-CN" altLang="en-US"/>
-          </a:p>
-        </p:txBody>
-      </p:sp>
-      <p:sp>
-        <p:nvSpPr>
-          <p:cNvPr id="16" name="Isosceles Triangle 3"/>
-          <p:cNvSpPr/>
-          <p:nvPr/>
-        </p:nvSpPr>
-        <p:spPr>
-          <a:xfrm rot="10848176">
-            <a:off x="3868859" y="457409"/>
-            <a:ext cx="1237488" cy="1066800"/>
-          </a:xfrm>
-          <a:prstGeom prst="triangle">
-            <a:avLst/>
-          </a:prstGeom>
-        </p:spPr>
-        <p:style>
-          <a:lnRef idx="2">
-            <a:schemeClr val="accent1">
-              <a:shade val="50000"/>
-            </a:schemeClr>
-          </a:lnRef>
-          <a:fillRef idx="1">
-            <a:schemeClr val="accent1"/>
-          </a:fillRef>
-          <a:effectRef idx="0">
-            <a:schemeClr val="accent1"/>
-          </a:effectRef>
-          <a:fontRef idx="minor">
-            <a:schemeClr val="lt1"/>
-          </a:fontRef>
-        </p:style>
-        <p:txBody>
-          <a:bodyPr rtlCol="0" anchor="ctr"/>
-          <a:lstStyle/>
-          <a:p>
-            <a:pPr algn="ctr"/>
-            <a:endParaRPr lang="zh-CN" altLang="en-US"/>
-          </a:p>
-        </p:txBody>
-      </p:sp>
-      <p:sp>
-        <p:nvSpPr>
-          <p:cNvPr id="17" name="Oval 2"/>
-          <p:cNvSpPr/>
-          <p:nvPr/>
-        </p:nvSpPr>
-        <p:spPr>
-          <a:xfrm rot="10848176">
-            <a:off x="1579648" y="2557934"/>
-            <a:ext cx="1066800" cy="1066800"/>
-          </a:xfrm>
-          <a:prstGeom prst="ellipse">
-            <a:avLst/>
-          </a:prstGeom>
-        </p:spPr>
-        <p:style>
-          <a:lnRef idx="2">
-            <a:schemeClr val="accent1">
-              <a:shade val="50000"/>
-            </a:schemeClr>
-          </a:lnRef>
-          <a:fillRef idx="1">
-            <a:schemeClr val="accent1"/>
-          </a:fillRef>
-          <a:effectRef idx="0">
-            <a:schemeClr val="accent1"/>
-          </a:effectRef>
-          <a:fontRef idx="minor">
-            <a:schemeClr val="lt1"/>
-          </a:fontRef>
-        </p:style>
-        <p:txBody>
-          <a:bodyPr rtlCol="0" anchor="ctr"/>
-          <a:lstStyle/>
-          <a:p>
-            <a:pPr algn="ctr"/>
-            <a:endParaRPr lang="zh-CN" altLang="en-US"/>
-          </a:p>
-        </p:txBody>
-      </p:sp>
-      <p:sp>
-        <p:nvSpPr>
-          <p:cNvPr id="18" name="Isosceles Triangle 3"/>
-          <p:cNvSpPr/>
-          <p:nvPr/>
-        </p:nvSpPr>
-        <p:spPr>
-          <a:xfrm rot="2932399">
-            <a:off x="2231804" y="3994128"/>
-            <a:ext cx="1237488" cy="1066800"/>
-          </a:xfrm>
-          <a:prstGeom prst="triangle">
-            <a:avLst/>
-          </a:prstGeom>
-        </p:spPr>
-        <p:style>
-          <a:lnRef idx="2">
-            <a:schemeClr val="accent1">
-              <a:shade val="50000"/>
-            </a:schemeClr>
-          </a:lnRef>
-          <a:fillRef idx="1">
-            <a:schemeClr val="accent1"/>
-          </a:fillRef>
-          <a:effectRef idx="0">
-            <a:schemeClr val="accent1"/>
-          </a:effectRef>
-          <a:fontRef idx="minor">
-            <a:schemeClr val="lt1"/>
-          </a:fontRef>
-        </p:style>
-        <p:txBody>
-          <a:bodyPr rtlCol="0" anchor="ctr"/>
-          <a:lstStyle/>
-          <a:p>
-            <a:pPr algn="ctr"/>
-            <a:endParaRPr lang="zh-CN" altLang="en-US"/>
-          </a:p>
-        </p:txBody>
-      </p:sp>
-      <p:sp>
-        <p:nvSpPr>
-          <p:cNvPr id="19" name="Oval 2"/>
-          <p:cNvSpPr/>
-          <p:nvPr/>
-        </p:nvSpPr>
-        <p:spPr>
-          <a:xfrm rot="2932399">
-            <a:off x="5466586" y="4357103"/>
-            <a:ext cx="1066800" cy="1066800"/>
-          </a:xfrm>
-          <a:prstGeom prst="ellipse">
-            <a:avLst/>
-          </a:prstGeom>
-        </p:spPr>
-        <p:style>
-          <a:lnRef idx="2">
-            <a:schemeClr val="accent1">
-              <a:shade val="50000"/>
-            </a:schemeClr>
-          </a:lnRef>
-          <a:fillRef idx="1">
-            <a:schemeClr val="accent1"/>
-          </a:fillRef>
-          <a:effectRef idx="0">
-            <a:schemeClr val="accent1"/>
-          </a:effectRef>
-          <a:fontRef idx="minor">
-            <a:schemeClr val="lt1"/>
-          </a:fontRef>
-        </p:style>
-        <p:txBody>
-          <a:bodyPr rtlCol="0" anchor="ctr"/>
-          <a:lstStyle/>
-          <a:p>
-            <a:pPr algn="ctr"/>
-            <a:endParaRPr lang="zh-CN" altLang="en-US"/>
-          </a:p>
-        </p:txBody>
-      </p:sp>
-      <p:sp>
-        <p:nvSpPr>
-          <p:cNvPr id="15" name="Isosceles Triangle 3"/>
-          <p:cNvSpPr/>
-          <p:nvPr/>
-        </p:nvSpPr>
-        <p:spPr>
-          <a:xfrm rot="13498768">
-            <a:off x="5347102" y="1081574"/>
-            <a:ext cx="1237488" cy="1066800"/>
-          </a:xfrm>
-          <a:prstGeom prst="triangle">
-            <a:avLst/>
-          </a:prstGeom>
-        </p:spPr>
-        <p:style>
-          <a:lnRef idx="2">
-            <a:schemeClr val="accent1">
-              <a:shade val="50000"/>
-            </a:schemeClr>
-          </a:lnRef>
-          <a:fillRef idx="1">
-            <a:schemeClr val="accent1"/>
-          </a:fillRef>
-          <a:effectRef idx="0">
-            <a:schemeClr val="accent1"/>
-          </a:effectRef>
-          <a:fontRef idx="minor">
-            <a:schemeClr val="lt1"/>
-          </a:fontRef>
-        </p:style>
-        <p:txBody>
-          <a:bodyPr rtlCol="0" anchor="ctr"/>
-          <a:lstStyle/>
-          <a:p>
-            <a:pPr algn="ctr"/>
-            <a:endParaRPr lang="zh-CN" altLang="en-US"/>
+        <p:txBody>
+          <a:bodyPr>
+            <a:normAutofit fontScale="90000"/>
+          </a:bodyPr>
+          <a:lstStyle/>
+          <a:p>
+            <a:r>
+              <a:rPr lang="en-US" altLang="zh-CN" dirty="0">
+                <a:solidFill>
+                  <a:schemeClr val="bg1"/>
+                </a:solidFill>
+              </a:rPr>
+              <a:t>Duplicate and Rotate:: </a:t>
+            </a:r>
+            <a:r>
+              <a:rPr lang="en-US" altLang="zh-CN" dirty="0" smtClean="0">
+                <a:solidFill>
+                  <a:schemeClr val="bg1"/>
+                </a:solidFill>
+              </a:rPr>
+              <a:t>Multiple Shape (Fixed)</a:t>
+            </a:r>
+            <a:endParaRPr lang="en-SG" dirty="0">
+              <a:solidFill>
+                <a:schemeClr val="bg1"/>
+              </a:solidFill>
+            </a:endParaRPr>
           </a:p>
         </p:txBody>
       </p:sp>
     </p:spTree>
     <p:extLst>
       <p:ext uri="{BB962C8B-B14F-4D97-AF65-F5344CB8AC3E}">
-        <p14:creationId xmlns:p14="http://schemas.microsoft.com/office/powerpoint/2010/main" val="1763879570"/>
+        <p14:creationId xmlns:p14="http://schemas.microsoft.com/office/powerpoint/2010/main" val="2016151759"/>
       </p:ext>
     </p:extLst>
   </p:cSld>
@@ -11975,4 +13715,265 @@
   <a:objectDefaults/>
   <a:extraClrSchemeLst/>
 </a:theme>
+</file>
+
+<file path=ppt/theme/theme4.xml><?xml version="1.0" encoding="utf-8"?>
+<a:theme xmlns:a="http://schemas.openxmlformats.org/drawingml/2006/main" name="Office Theme">
+  <a:themeElements>
+    <a:clrScheme name="Office">
+      <a:dk1>
+        <a:sysClr val="windowText" lastClr="000000"/>
+      </a:dk1>
+      <a:lt1>
+        <a:sysClr val="window" lastClr="FFFFFF"/>
+      </a:lt1>
+      <a:dk2>
+        <a:srgbClr val="44546A"/>
+      </a:dk2>
+      <a:lt2>
+        <a:srgbClr val="E7E6E6"/>
+      </a:lt2>
+      <a:accent1>
+        <a:srgbClr val="5B9BD5"/>
+      </a:accent1>
+      <a:accent2>
+        <a:srgbClr val="ED7D31"/>
+      </a:accent2>
+      <a:accent3>
+        <a:srgbClr val="A5A5A5"/>
+      </a:accent3>
+      <a:accent4>
+        <a:srgbClr val="FFC000"/>
+      </a:accent4>
+      <a:accent5>
+        <a:srgbClr val="4472C4"/>
+      </a:accent5>
+      <a:accent6>
+        <a:srgbClr val="70AD47"/>
+      </a:accent6>
+      <a:hlink>
+        <a:srgbClr val="0563C1"/>
+      </a:hlink>
+      <a:folHlink>
+        <a:srgbClr val="954F72"/>
+      </a:folHlink>
+    </a:clrScheme>
+    <a:fontScheme name="Office">
+      <a:majorFont>
+        <a:latin typeface="Calibri Light" panose="020F0302020204030204"/>
+        <a:ea typeface=""/>
+        <a:cs typeface=""/>
+        <a:font script="Jpan" typeface="ＭＳ Ｐゴシック"/>
+        <a:font script="Hang" typeface="맑은 고딕"/>
+        <a:font script="Hans" typeface="宋体"/>
+        <a:font script="Hant" typeface="新細明體"/>
+        <a:font script="Arab" typeface="Times New Roman"/>
+        <a:font script="Hebr" typeface="Times New Roman"/>
+        <a:font script="Thai" typeface="Angsana New"/>
+        <a:font script="Ethi" typeface="Nyala"/>
+        <a:font script="Beng" typeface="Vrinda"/>
+        <a:font script="Gujr" typeface="Shruti"/>
+        <a:font script="Khmr" typeface="MoolBoran"/>
+        <a:font script="Knda" typeface="Tunga"/>
+        <a:font script="Guru" typeface="Raavi"/>
+        <a:font script="Cans" typeface="Euphemia"/>
+        <a:font script="Cher" typeface="Plantagenet Cherokee"/>
+        <a:font script="Yiii" typeface="Microsoft Yi Baiti"/>
+        <a:font script="Tibt" typeface="Microsoft Himalaya"/>
+        <a:font script="Thaa" typeface="MV Boli"/>
+        <a:font script="Deva" typeface="Mangal"/>
+        <a:font script="Telu" typeface="Gautami"/>
+        <a:font script="Taml" typeface="Latha"/>
+        <a:font script="Syrc" typeface="Estrangelo Edessa"/>
+        <a:font script="Orya" typeface="Kalinga"/>
+        <a:font script="Mlym" typeface="Kartika"/>
+        <a:font script="Laoo" typeface="DokChampa"/>
+        <a:font script="Sinh" typeface="Iskoola Pota"/>
+        <a:font script="Mong" typeface="Mongolian Baiti"/>
+        <a:font script="Viet" typeface="Times New Roman"/>
+        <a:font script="Uigh" typeface="Microsoft Uighur"/>
+        <a:font script="Geor" typeface="Sylfaen"/>
+      </a:majorFont>
+      <a:minorFont>
+        <a:latin typeface="Calibri" panose="020F0502020204030204"/>
+        <a:ea typeface=""/>
+        <a:cs typeface=""/>
+        <a:font script="Jpan" typeface="ＭＳ Ｐゴシック"/>
+        <a:font script="Hang" typeface="맑은 고딕"/>
+        <a:font script="Hans" typeface="宋体"/>
+        <a:font script="Hant" typeface="新細明體"/>
+        <a:font script="Arab" typeface="Arial"/>
+        <a:font script="Hebr" typeface="Arial"/>
+        <a:font script="Thai" typeface="Cordia New"/>
+        <a:font script="Ethi" typeface="Nyala"/>
+        <a:font script="Beng" typeface="Vrinda"/>
+        <a:font script="Gujr" typeface="Shruti"/>
+        <a:font script="Khmr" typeface="DaunPenh"/>
+        <a:font script="Knda" typeface="Tunga"/>
+        <a:font script="Guru" typeface="Raavi"/>
+        <a:font script="Cans" typeface="Euphemia"/>
+        <a:font script="Cher" typeface="Plantagenet Cherokee"/>
+        <a:font script="Yiii" typeface="Microsoft Yi Baiti"/>
+        <a:font script="Tibt" typeface="Microsoft Himalaya"/>
+        <a:font script="Thaa" typeface="MV Boli"/>
+        <a:font script="Deva" typeface="Mangal"/>
+        <a:font script="Telu" typeface="Gautami"/>
+        <a:font script="Taml" typeface="Latha"/>
+        <a:font script="Syrc" typeface="Estrangelo Edessa"/>
+        <a:font script="Orya" typeface="Kalinga"/>
+        <a:font script="Mlym" typeface="Kartika"/>
+        <a:font script="Laoo" typeface="DokChampa"/>
+        <a:font script="Sinh" typeface="Iskoola Pota"/>
+        <a:font script="Mong" typeface="Mongolian Baiti"/>
+        <a:font script="Viet" typeface="Arial"/>
+        <a:font script="Uigh" typeface="Microsoft Uighur"/>
+        <a:font script="Geor" typeface="Sylfaen"/>
+      </a:minorFont>
+    </a:fontScheme>
+    <a:fmtScheme name="Office">
+      <a:fillStyleLst>
+        <a:solidFill>
+          <a:schemeClr val="phClr"/>
+        </a:solidFill>
+        <a:gradFill rotWithShape="1">
+          <a:gsLst>
+            <a:gs pos="0">
+              <a:schemeClr val="phClr">
+                <a:lumMod val="110000"/>
+                <a:satMod val="105000"/>
+                <a:tint val="67000"/>
+              </a:schemeClr>
+            </a:gs>
+            <a:gs pos="50000">
+              <a:schemeClr val="phClr">
+                <a:lumMod val="105000"/>
+                <a:satMod val="103000"/>
+                <a:tint val="73000"/>
+              </a:schemeClr>
+            </a:gs>
+            <a:gs pos="100000">
+              <a:schemeClr val="phClr">
+                <a:lumMod val="105000"/>
+                <a:satMod val="109000"/>
+                <a:tint val="81000"/>
+              </a:schemeClr>
+            </a:gs>
+          </a:gsLst>
+          <a:lin ang="5400000" scaled="0"/>
+        </a:gradFill>
+        <a:gradFill rotWithShape="1">
+          <a:gsLst>
+            <a:gs pos="0">
+              <a:schemeClr val="phClr">
+                <a:satMod val="103000"/>
+                <a:lumMod val="102000"/>
+                <a:tint val="94000"/>
+              </a:schemeClr>
+            </a:gs>
+            <a:gs pos="50000">
+              <a:schemeClr val="phClr">
+                <a:satMod val="110000"/>
+                <a:lumMod val="100000"/>
+                <a:shade val="100000"/>
+              </a:schemeClr>
+            </a:gs>
+            <a:gs pos="100000">
+              <a:schemeClr val="phClr">
+                <a:lumMod val="99000"/>
+                <a:satMod val="120000"/>
+                <a:shade val="78000"/>
+              </a:schemeClr>
+            </a:gs>
+          </a:gsLst>
+          <a:lin ang="5400000" scaled="0"/>
+        </a:gradFill>
+      </a:fillStyleLst>
+      <a:lnStyleLst>
+        <a:ln w="6350" cap="flat" cmpd="sng" algn="ctr">
+          <a:solidFill>
+            <a:schemeClr val="phClr"/>
+          </a:solidFill>
+          <a:prstDash val="solid"/>
+          <a:miter lim="800000"/>
+        </a:ln>
+        <a:ln w="12700" cap="flat" cmpd="sng" algn="ctr">
+          <a:solidFill>
+            <a:schemeClr val="phClr"/>
+          </a:solidFill>
+          <a:prstDash val="solid"/>
+          <a:miter lim="800000"/>
+        </a:ln>
+        <a:ln w="19050" cap="flat" cmpd="sng" algn="ctr">
+          <a:solidFill>
+            <a:schemeClr val="phClr"/>
+          </a:solidFill>
+          <a:prstDash val="solid"/>
+          <a:miter lim="800000"/>
+        </a:ln>
+      </a:lnStyleLst>
+      <a:effectStyleLst>
+        <a:effectStyle>
+          <a:effectLst/>
+        </a:effectStyle>
+        <a:effectStyle>
+          <a:effectLst/>
+        </a:effectStyle>
+        <a:effectStyle>
+          <a:effectLst>
+            <a:outerShdw blurRad="57150" dist="19050" dir="5400000" algn="ctr" rotWithShape="0">
+              <a:srgbClr val="000000">
+                <a:alpha val="63000"/>
+              </a:srgbClr>
+            </a:outerShdw>
+          </a:effectLst>
+        </a:effectStyle>
+      </a:effectStyleLst>
+      <a:bgFillStyleLst>
+        <a:solidFill>
+          <a:schemeClr val="phClr"/>
+        </a:solidFill>
+        <a:solidFill>
+          <a:schemeClr val="phClr">
+            <a:tint val="95000"/>
+            <a:satMod val="170000"/>
+          </a:schemeClr>
+        </a:solidFill>
+        <a:gradFill rotWithShape="1">
+          <a:gsLst>
+            <a:gs pos="0">
+              <a:schemeClr val="phClr">
+                <a:tint val="93000"/>
+                <a:satMod val="150000"/>
+                <a:shade val="98000"/>
+                <a:lumMod val="102000"/>
+              </a:schemeClr>
+            </a:gs>
+            <a:gs pos="50000">
+              <a:schemeClr val="phClr">
+                <a:tint val="98000"/>
+                <a:satMod val="130000"/>
+                <a:shade val="90000"/>
+                <a:lumMod val="103000"/>
+              </a:schemeClr>
+            </a:gs>
+            <a:gs pos="100000">
+              <a:schemeClr val="phClr">
+                <a:shade val="63000"/>
+                <a:satMod val="120000"/>
+              </a:schemeClr>
+            </a:gs>
+          </a:gsLst>
+          <a:lin ang="5400000" scaled="0"/>
+        </a:gradFill>
+      </a:bgFillStyleLst>
+    </a:fmtScheme>
+  </a:themeElements>
+  <a:objectDefaults/>
+  <a:extraClrSchemeLst/>
+  <a:extLst>
+    <a:ext uri="{05A4C25C-085E-4340-85A3-A5531E510DB2}">
+      <thm15:themeFamily xmlns:thm15="http://schemas.microsoft.com/office/thememl/2012/main" name="Office Theme" id="{62F939B6-93AF-4DB8-9C6B-D6C7DFDC589F}" vid="{4A3C46E8-61CC-4603-A589-7422A47A8E4A}"/>
+    </a:ext>
+  </a:extLst>
+</a:theme>
 </file>
</xml_diff>